<commit_message>
[Update] Update requirement analysis
</commit_message>
<xml_diff>
--- a/report/Algorithm.pptx
+++ b/report/Algorithm.pptx
@@ -5,7 +5,7 @@
     <p:sldMasterId id="2147483648" r:id="rId1"/>
   </p:sldMasterIdLst>
   <p:notesMasterIdLst>
-    <p:notesMasterId r:id="rId17"/>
+    <p:notesMasterId r:id="rId22"/>
   </p:notesMasterIdLst>
   <p:sldIdLst>
     <p:sldId id="256" r:id="rId2"/>
@@ -21,8 +21,13 @@
     <p:sldId id="257" r:id="rId12"/>
     <p:sldId id="259" r:id="rId13"/>
     <p:sldId id="268" r:id="rId14"/>
-    <p:sldId id="269" r:id="rId15"/>
-    <p:sldId id="271" r:id="rId16"/>
+    <p:sldId id="272" r:id="rId15"/>
+    <p:sldId id="273" r:id="rId16"/>
+    <p:sldId id="274" r:id="rId17"/>
+    <p:sldId id="275" r:id="rId18"/>
+    <p:sldId id="276" r:id="rId19"/>
+    <p:sldId id="269" r:id="rId20"/>
+    <p:sldId id="271" r:id="rId21"/>
   </p:sldIdLst>
   <p:sldSz cx="12192000" cy="6858000"/>
   <p:notesSz cx="6858000" cy="9144000"/>
@@ -211,7 +216,7 @@
           <a:p>
             <a:fld id="{81B028E4-0D91-47C6-89A1-18BFD5B08F93}" type="datetimeFigureOut">
               <a:rPr lang="en-US" smtClean="0"/>
-              <a:t>5/8/2025</a:t>
+              <a:t>5/11/2025</a:t>
             </a:fld>
             <a:endParaRPr lang="en-US"/>
           </a:p>
@@ -601,6 +606,546 @@
   <p:cSld>
     <p:spTree>
       <p:nvGrpSpPr>
+        <p:cNvPr id="1" name="">
+          <a:extLst>
+            <a:ext uri="{FF2B5EF4-FFF2-40B4-BE49-F238E27FC236}">
+              <a16:creationId xmlns:a16="http://schemas.microsoft.com/office/drawing/2014/main" id="{F9BB15B1-5F81-B40E-5ED6-3994E2D61663}"/>
+            </a:ext>
+          </a:extLst>
+        </p:cNvPr>
+        <p:cNvGrpSpPr/>
+        <p:nvPr/>
+      </p:nvGrpSpPr>
+      <p:grpSpPr>
+        <a:xfrm>
+          <a:off x="0" y="0"/>
+          <a:ext cx="0" cy="0"/>
+          <a:chOff x="0" y="0"/>
+          <a:chExt cx="0" cy="0"/>
+        </a:xfrm>
+      </p:grpSpPr>
+      <p:sp>
+        <p:nvSpPr>
+          <p:cNvPr id="2" name="Slide Image Placeholder 1">
+            <a:extLst>
+              <a:ext uri="{FF2B5EF4-FFF2-40B4-BE49-F238E27FC236}">
+                <a16:creationId xmlns:a16="http://schemas.microsoft.com/office/drawing/2014/main" id="{1F35002F-0A87-7FA0-E71B-ACDBF9F6FC5F}"/>
+              </a:ext>
+            </a:extLst>
+          </p:cNvPr>
+          <p:cNvSpPr>
+            <a:spLocks noGrp="1" noRot="1" noChangeAspect="1"/>
+          </p:cNvSpPr>
+          <p:nvPr>
+            <p:ph type="sldImg"/>
+          </p:nvPr>
+        </p:nvSpPr>
+        <p:spPr/>
+      </p:sp>
+      <p:sp>
+        <p:nvSpPr>
+          <p:cNvPr id="3" name="Notes Placeholder 2">
+            <a:extLst>
+              <a:ext uri="{FF2B5EF4-FFF2-40B4-BE49-F238E27FC236}">
+                <a16:creationId xmlns:a16="http://schemas.microsoft.com/office/drawing/2014/main" id="{D9D60E22-7BAD-ED03-ACCA-C4AE1B69BEB6}"/>
+              </a:ext>
+            </a:extLst>
+          </p:cNvPr>
+          <p:cNvSpPr>
+            <a:spLocks noGrp="1"/>
+          </p:cNvSpPr>
+          <p:nvPr>
+            <p:ph type="body" idx="1"/>
+          </p:nvPr>
+        </p:nvSpPr>
+        <p:spPr/>
+        <p:txBody>
+          <a:bodyPr/>
+          <a:lstStyle/>
+          <a:p>
+            <a:endParaRPr lang="en-US" dirty="0"/>
+          </a:p>
+        </p:txBody>
+      </p:sp>
+      <p:sp>
+        <p:nvSpPr>
+          <p:cNvPr id="4" name="Slide Number Placeholder 3">
+            <a:extLst>
+              <a:ext uri="{FF2B5EF4-FFF2-40B4-BE49-F238E27FC236}">
+                <a16:creationId xmlns:a16="http://schemas.microsoft.com/office/drawing/2014/main" id="{08DAC7E8-A1A4-1DAD-0B62-647F326379BE}"/>
+              </a:ext>
+            </a:extLst>
+          </p:cNvPr>
+          <p:cNvSpPr>
+            <a:spLocks noGrp="1"/>
+          </p:cNvSpPr>
+          <p:nvPr>
+            <p:ph type="sldNum" sz="quarter" idx="5"/>
+          </p:nvPr>
+        </p:nvSpPr>
+        <p:spPr/>
+        <p:txBody>
+          <a:bodyPr/>
+          <a:lstStyle/>
+          <a:p>
+            <a:fld id="{AA1D0AE7-02E7-4ECD-8A34-B5A5CCDA1321}" type="slidenum">
+              <a:rPr lang="en-US" smtClean="0"/>
+              <a:t>14</a:t>
+            </a:fld>
+            <a:endParaRPr lang="en-US"/>
+          </a:p>
+        </p:txBody>
+      </p:sp>
+    </p:spTree>
+    <p:extLst>
+      <p:ext uri="{BB962C8B-B14F-4D97-AF65-F5344CB8AC3E}">
+        <p14:creationId xmlns:p14="http://schemas.microsoft.com/office/powerpoint/2010/main" val="2596095652"/>
+      </p:ext>
+    </p:extLst>
+  </p:cSld>
+  <p:clrMapOvr>
+    <a:masterClrMapping/>
+  </p:clrMapOvr>
+</p:notes>
+</file>
+
+<file path=ppt/notesSlides/notesSlide3.xml><?xml version="1.0" encoding="utf-8"?>
+<p:notes xmlns:a="http://schemas.openxmlformats.org/drawingml/2006/main" xmlns:r="http://schemas.openxmlformats.org/officeDocument/2006/relationships" xmlns:p="http://schemas.openxmlformats.org/presentationml/2006/main">
+  <p:cSld>
+    <p:spTree>
+      <p:nvGrpSpPr>
+        <p:cNvPr id="1" name="">
+          <a:extLst>
+            <a:ext uri="{FF2B5EF4-FFF2-40B4-BE49-F238E27FC236}">
+              <a16:creationId xmlns:a16="http://schemas.microsoft.com/office/drawing/2014/main" id="{BD73E827-E774-EC46-4F00-F785562D8B7D}"/>
+            </a:ext>
+          </a:extLst>
+        </p:cNvPr>
+        <p:cNvGrpSpPr/>
+        <p:nvPr/>
+      </p:nvGrpSpPr>
+      <p:grpSpPr>
+        <a:xfrm>
+          <a:off x="0" y="0"/>
+          <a:ext cx="0" cy="0"/>
+          <a:chOff x="0" y="0"/>
+          <a:chExt cx="0" cy="0"/>
+        </a:xfrm>
+      </p:grpSpPr>
+      <p:sp>
+        <p:nvSpPr>
+          <p:cNvPr id="2" name="Slide Image Placeholder 1">
+            <a:extLst>
+              <a:ext uri="{FF2B5EF4-FFF2-40B4-BE49-F238E27FC236}">
+                <a16:creationId xmlns:a16="http://schemas.microsoft.com/office/drawing/2014/main" id="{6CB40543-1503-C3E1-D475-084AAE6E6324}"/>
+              </a:ext>
+            </a:extLst>
+          </p:cNvPr>
+          <p:cNvSpPr>
+            <a:spLocks noGrp="1" noRot="1" noChangeAspect="1"/>
+          </p:cNvSpPr>
+          <p:nvPr>
+            <p:ph type="sldImg"/>
+          </p:nvPr>
+        </p:nvSpPr>
+        <p:spPr/>
+      </p:sp>
+      <p:sp>
+        <p:nvSpPr>
+          <p:cNvPr id="3" name="Notes Placeholder 2">
+            <a:extLst>
+              <a:ext uri="{FF2B5EF4-FFF2-40B4-BE49-F238E27FC236}">
+                <a16:creationId xmlns:a16="http://schemas.microsoft.com/office/drawing/2014/main" id="{29B13D55-2A4E-BA21-3D7D-0AD90EE8C246}"/>
+              </a:ext>
+            </a:extLst>
+          </p:cNvPr>
+          <p:cNvSpPr>
+            <a:spLocks noGrp="1"/>
+          </p:cNvSpPr>
+          <p:nvPr>
+            <p:ph type="body" idx="1"/>
+          </p:nvPr>
+        </p:nvSpPr>
+        <p:spPr/>
+        <p:txBody>
+          <a:bodyPr/>
+          <a:lstStyle/>
+          <a:p>
+            <a:endParaRPr lang="en-US" dirty="0"/>
+          </a:p>
+        </p:txBody>
+      </p:sp>
+      <p:sp>
+        <p:nvSpPr>
+          <p:cNvPr id="4" name="Slide Number Placeholder 3">
+            <a:extLst>
+              <a:ext uri="{FF2B5EF4-FFF2-40B4-BE49-F238E27FC236}">
+                <a16:creationId xmlns:a16="http://schemas.microsoft.com/office/drawing/2014/main" id="{41F7DB65-53BC-FC3B-E308-BE8AC35D590D}"/>
+              </a:ext>
+            </a:extLst>
+          </p:cNvPr>
+          <p:cNvSpPr>
+            <a:spLocks noGrp="1"/>
+          </p:cNvSpPr>
+          <p:nvPr>
+            <p:ph type="sldNum" sz="quarter" idx="5"/>
+          </p:nvPr>
+        </p:nvSpPr>
+        <p:spPr/>
+        <p:txBody>
+          <a:bodyPr/>
+          <a:lstStyle/>
+          <a:p>
+            <a:fld id="{AA1D0AE7-02E7-4ECD-8A34-B5A5CCDA1321}" type="slidenum">
+              <a:rPr lang="en-US" smtClean="0"/>
+              <a:t>15</a:t>
+            </a:fld>
+            <a:endParaRPr lang="en-US"/>
+          </a:p>
+        </p:txBody>
+      </p:sp>
+    </p:spTree>
+    <p:extLst>
+      <p:ext uri="{BB962C8B-B14F-4D97-AF65-F5344CB8AC3E}">
+        <p14:creationId xmlns:p14="http://schemas.microsoft.com/office/powerpoint/2010/main" val="3410174117"/>
+      </p:ext>
+    </p:extLst>
+  </p:cSld>
+  <p:clrMapOvr>
+    <a:masterClrMapping/>
+  </p:clrMapOvr>
+</p:notes>
+</file>
+
+<file path=ppt/notesSlides/notesSlide4.xml><?xml version="1.0" encoding="utf-8"?>
+<p:notes xmlns:a="http://schemas.openxmlformats.org/drawingml/2006/main" xmlns:r="http://schemas.openxmlformats.org/officeDocument/2006/relationships" xmlns:p="http://schemas.openxmlformats.org/presentationml/2006/main">
+  <p:cSld>
+    <p:spTree>
+      <p:nvGrpSpPr>
+        <p:cNvPr id="1" name="">
+          <a:extLst>
+            <a:ext uri="{FF2B5EF4-FFF2-40B4-BE49-F238E27FC236}">
+              <a16:creationId xmlns:a16="http://schemas.microsoft.com/office/drawing/2014/main" id="{A8A5DF3B-5C60-67DB-BF7B-977DADF032B1}"/>
+            </a:ext>
+          </a:extLst>
+        </p:cNvPr>
+        <p:cNvGrpSpPr/>
+        <p:nvPr/>
+      </p:nvGrpSpPr>
+      <p:grpSpPr>
+        <a:xfrm>
+          <a:off x="0" y="0"/>
+          <a:ext cx="0" cy="0"/>
+          <a:chOff x="0" y="0"/>
+          <a:chExt cx="0" cy="0"/>
+        </a:xfrm>
+      </p:grpSpPr>
+      <p:sp>
+        <p:nvSpPr>
+          <p:cNvPr id="2" name="Slide Image Placeholder 1">
+            <a:extLst>
+              <a:ext uri="{FF2B5EF4-FFF2-40B4-BE49-F238E27FC236}">
+                <a16:creationId xmlns:a16="http://schemas.microsoft.com/office/drawing/2014/main" id="{30E53952-903F-8E85-6281-DB8121C64524}"/>
+              </a:ext>
+            </a:extLst>
+          </p:cNvPr>
+          <p:cNvSpPr>
+            <a:spLocks noGrp="1" noRot="1" noChangeAspect="1"/>
+          </p:cNvSpPr>
+          <p:nvPr>
+            <p:ph type="sldImg"/>
+          </p:nvPr>
+        </p:nvSpPr>
+        <p:spPr/>
+      </p:sp>
+      <p:sp>
+        <p:nvSpPr>
+          <p:cNvPr id="3" name="Notes Placeholder 2">
+            <a:extLst>
+              <a:ext uri="{FF2B5EF4-FFF2-40B4-BE49-F238E27FC236}">
+                <a16:creationId xmlns:a16="http://schemas.microsoft.com/office/drawing/2014/main" id="{4E9044CE-680D-8768-5A33-0315EF3E6C24}"/>
+              </a:ext>
+            </a:extLst>
+          </p:cNvPr>
+          <p:cNvSpPr>
+            <a:spLocks noGrp="1"/>
+          </p:cNvSpPr>
+          <p:nvPr>
+            <p:ph type="body" idx="1"/>
+          </p:nvPr>
+        </p:nvSpPr>
+        <p:spPr/>
+        <p:txBody>
+          <a:bodyPr/>
+          <a:lstStyle/>
+          <a:p>
+            <a:endParaRPr lang="en-US" dirty="0"/>
+          </a:p>
+        </p:txBody>
+      </p:sp>
+      <p:sp>
+        <p:nvSpPr>
+          <p:cNvPr id="4" name="Slide Number Placeholder 3">
+            <a:extLst>
+              <a:ext uri="{FF2B5EF4-FFF2-40B4-BE49-F238E27FC236}">
+                <a16:creationId xmlns:a16="http://schemas.microsoft.com/office/drawing/2014/main" id="{4CE1E1A5-1D3A-8967-2FB8-703F8875798D}"/>
+              </a:ext>
+            </a:extLst>
+          </p:cNvPr>
+          <p:cNvSpPr>
+            <a:spLocks noGrp="1"/>
+          </p:cNvSpPr>
+          <p:nvPr>
+            <p:ph type="sldNum" sz="quarter" idx="5"/>
+          </p:nvPr>
+        </p:nvSpPr>
+        <p:spPr/>
+        <p:txBody>
+          <a:bodyPr/>
+          <a:lstStyle/>
+          <a:p>
+            <a:fld id="{AA1D0AE7-02E7-4ECD-8A34-B5A5CCDA1321}" type="slidenum">
+              <a:rPr lang="en-US" smtClean="0"/>
+              <a:t>16</a:t>
+            </a:fld>
+            <a:endParaRPr lang="en-US"/>
+          </a:p>
+        </p:txBody>
+      </p:sp>
+    </p:spTree>
+    <p:extLst>
+      <p:ext uri="{BB962C8B-B14F-4D97-AF65-F5344CB8AC3E}">
+        <p14:creationId xmlns:p14="http://schemas.microsoft.com/office/powerpoint/2010/main" val="2831988018"/>
+      </p:ext>
+    </p:extLst>
+  </p:cSld>
+  <p:clrMapOvr>
+    <a:masterClrMapping/>
+  </p:clrMapOvr>
+</p:notes>
+</file>
+
+<file path=ppt/notesSlides/notesSlide5.xml><?xml version="1.0" encoding="utf-8"?>
+<p:notes xmlns:a="http://schemas.openxmlformats.org/drawingml/2006/main" xmlns:r="http://schemas.openxmlformats.org/officeDocument/2006/relationships" xmlns:p="http://schemas.openxmlformats.org/presentationml/2006/main">
+  <p:cSld>
+    <p:spTree>
+      <p:nvGrpSpPr>
+        <p:cNvPr id="1" name="">
+          <a:extLst>
+            <a:ext uri="{FF2B5EF4-FFF2-40B4-BE49-F238E27FC236}">
+              <a16:creationId xmlns:a16="http://schemas.microsoft.com/office/drawing/2014/main" id="{0E5E7D0A-7A12-B7E0-1CAB-D331BB5E2C23}"/>
+            </a:ext>
+          </a:extLst>
+        </p:cNvPr>
+        <p:cNvGrpSpPr/>
+        <p:nvPr/>
+      </p:nvGrpSpPr>
+      <p:grpSpPr>
+        <a:xfrm>
+          <a:off x="0" y="0"/>
+          <a:ext cx="0" cy="0"/>
+          <a:chOff x="0" y="0"/>
+          <a:chExt cx="0" cy="0"/>
+        </a:xfrm>
+      </p:grpSpPr>
+      <p:sp>
+        <p:nvSpPr>
+          <p:cNvPr id="2" name="Slide Image Placeholder 1">
+            <a:extLst>
+              <a:ext uri="{FF2B5EF4-FFF2-40B4-BE49-F238E27FC236}">
+                <a16:creationId xmlns:a16="http://schemas.microsoft.com/office/drawing/2014/main" id="{7DA5A0F6-1F13-88B3-2105-A064DBCCAD87}"/>
+              </a:ext>
+            </a:extLst>
+          </p:cNvPr>
+          <p:cNvSpPr>
+            <a:spLocks noGrp="1" noRot="1" noChangeAspect="1"/>
+          </p:cNvSpPr>
+          <p:nvPr>
+            <p:ph type="sldImg"/>
+          </p:nvPr>
+        </p:nvSpPr>
+        <p:spPr/>
+      </p:sp>
+      <p:sp>
+        <p:nvSpPr>
+          <p:cNvPr id="3" name="Notes Placeholder 2">
+            <a:extLst>
+              <a:ext uri="{FF2B5EF4-FFF2-40B4-BE49-F238E27FC236}">
+                <a16:creationId xmlns:a16="http://schemas.microsoft.com/office/drawing/2014/main" id="{0D2A899C-58D1-D579-3277-5A111F166FA3}"/>
+              </a:ext>
+            </a:extLst>
+          </p:cNvPr>
+          <p:cNvSpPr>
+            <a:spLocks noGrp="1"/>
+          </p:cNvSpPr>
+          <p:nvPr>
+            <p:ph type="body" idx="1"/>
+          </p:nvPr>
+        </p:nvSpPr>
+        <p:spPr/>
+        <p:txBody>
+          <a:bodyPr/>
+          <a:lstStyle/>
+          <a:p>
+            <a:endParaRPr lang="en-US" dirty="0"/>
+          </a:p>
+        </p:txBody>
+      </p:sp>
+      <p:sp>
+        <p:nvSpPr>
+          <p:cNvPr id="4" name="Slide Number Placeholder 3">
+            <a:extLst>
+              <a:ext uri="{FF2B5EF4-FFF2-40B4-BE49-F238E27FC236}">
+                <a16:creationId xmlns:a16="http://schemas.microsoft.com/office/drawing/2014/main" id="{042753EF-3E22-EDB2-144D-A0DADCFFC245}"/>
+              </a:ext>
+            </a:extLst>
+          </p:cNvPr>
+          <p:cNvSpPr>
+            <a:spLocks noGrp="1"/>
+          </p:cNvSpPr>
+          <p:nvPr>
+            <p:ph type="sldNum" sz="quarter" idx="5"/>
+          </p:nvPr>
+        </p:nvSpPr>
+        <p:spPr/>
+        <p:txBody>
+          <a:bodyPr/>
+          <a:lstStyle/>
+          <a:p>
+            <a:fld id="{AA1D0AE7-02E7-4ECD-8A34-B5A5CCDA1321}" type="slidenum">
+              <a:rPr lang="en-US" smtClean="0"/>
+              <a:t>17</a:t>
+            </a:fld>
+            <a:endParaRPr lang="en-US"/>
+          </a:p>
+        </p:txBody>
+      </p:sp>
+    </p:spTree>
+    <p:extLst>
+      <p:ext uri="{BB962C8B-B14F-4D97-AF65-F5344CB8AC3E}">
+        <p14:creationId xmlns:p14="http://schemas.microsoft.com/office/powerpoint/2010/main" val="112291594"/>
+      </p:ext>
+    </p:extLst>
+  </p:cSld>
+  <p:clrMapOvr>
+    <a:masterClrMapping/>
+  </p:clrMapOvr>
+</p:notes>
+</file>
+
+<file path=ppt/notesSlides/notesSlide6.xml><?xml version="1.0" encoding="utf-8"?>
+<p:notes xmlns:a="http://schemas.openxmlformats.org/drawingml/2006/main" xmlns:r="http://schemas.openxmlformats.org/officeDocument/2006/relationships" xmlns:p="http://schemas.openxmlformats.org/presentationml/2006/main">
+  <p:cSld>
+    <p:spTree>
+      <p:nvGrpSpPr>
+        <p:cNvPr id="1" name="">
+          <a:extLst>
+            <a:ext uri="{FF2B5EF4-FFF2-40B4-BE49-F238E27FC236}">
+              <a16:creationId xmlns:a16="http://schemas.microsoft.com/office/drawing/2014/main" id="{1A7432D2-3A26-C6DA-75F7-E62ACDEC209B}"/>
+            </a:ext>
+          </a:extLst>
+        </p:cNvPr>
+        <p:cNvGrpSpPr/>
+        <p:nvPr/>
+      </p:nvGrpSpPr>
+      <p:grpSpPr>
+        <a:xfrm>
+          <a:off x="0" y="0"/>
+          <a:ext cx="0" cy="0"/>
+          <a:chOff x="0" y="0"/>
+          <a:chExt cx="0" cy="0"/>
+        </a:xfrm>
+      </p:grpSpPr>
+      <p:sp>
+        <p:nvSpPr>
+          <p:cNvPr id="2" name="Slide Image Placeholder 1">
+            <a:extLst>
+              <a:ext uri="{FF2B5EF4-FFF2-40B4-BE49-F238E27FC236}">
+                <a16:creationId xmlns:a16="http://schemas.microsoft.com/office/drawing/2014/main" id="{399DE55F-914B-45AC-03D2-243353C5A1C5}"/>
+              </a:ext>
+            </a:extLst>
+          </p:cNvPr>
+          <p:cNvSpPr>
+            <a:spLocks noGrp="1" noRot="1" noChangeAspect="1"/>
+          </p:cNvSpPr>
+          <p:nvPr>
+            <p:ph type="sldImg"/>
+          </p:nvPr>
+        </p:nvSpPr>
+        <p:spPr/>
+      </p:sp>
+      <p:sp>
+        <p:nvSpPr>
+          <p:cNvPr id="3" name="Notes Placeholder 2">
+            <a:extLst>
+              <a:ext uri="{FF2B5EF4-FFF2-40B4-BE49-F238E27FC236}">
+                <a16:creationId xmlns:a16="http://schemas.microsoft.com/office/drawing/2014/main" id="{AF0534E0-1237-A66A-FDF6-5047FA782E10}"/>
+              </a:ext>
+            </a:extLst>
+          </p:cNvPr>
+          <p:cNvSpPr>
+            <a:spLocks noGrp="1"/>
+          </p:cNvSpPr>
+          <p:nvPr>
+            <p:ph type="body" idx="1"/>
+          </p:nvPr>
+        </p:nvSpPr>
+        <p:spPr/>
+        <p:txBody>
+          <a:bodyPr/>
+          <a:lstStyle/>
+          <a:p>
+            <a:endParaRPr lang="en-US" dirty="0"/>
+          </a:p>
+        </p:txBody>
+      </p:sp>
+      <p:sp>
+        <p:nvSpPr>
+          <p:cNvPr id="4" name="Slide Number Placeholder 3">
+            <a:extLst>
+              <a:ext uri="{FF2B5EF4-FFF2-40B4-BE49-F238E27FC236}">
+                <a16:creationId xmlns:a16="http://schemas.microsoft.com/office/drawing/2014/main" id="{971B4C60-ED71-EEC4-3C6D-615D7C31759E}"/>
+              </a:ext>
+            </a:extLst>
+          </p:cNvPr>
+          <p:cNvSpPr>
+            <a:spLocks noGrp="1"/>
+          </p:cNvSpPr>
+          <p:nvPr>
+            <p:ph type="sldNum" sz="quarter" idx="5"/>
+          </p:nvPr>
+        </p:nvSpPr>
+        <p:spPr/>
+        <p:txBody>
+          <a:bodyPr/>
+          <a:lstStyle/>
+          <a:p>
+            <a:fld id="{AA1D0AE7-02E7-4ECD-8A34-B5A5CCDA1321}" type="slidenum">
+              <a:rPr lang="en-US" smtClean="0"/>
+              <a:t>18</a:t>
+            </a:fld>
+            <a:endParaRPr lang="en-US"/>
+          </a:p>
+        </p:txBody>
+      </p:sp>
+    </p:spTree>
+    <p:extLst>
+      <p:ext uri="{BB962C8B-B14F-4D97-AF65-F5344CB8AC3E}">
+        <p14:creationId xmlns:p14="http://schemas.microsoft.com/office/powerpoint/2010/main" val="811087690"/>
+      </p:ext>
+    </p:extLst>
+  </p:cSld>
+  <p:clrMapOvr>
+    <a:masterClrMapping/>
+  </p:clrMapOvr>
+</p:notes>
+</file>
+
+<file path=ppt/notesSlides/notesSlide7.xml><?xml version="1.0" encoding="utf-8"?>
+<p:notes xmlns:a="http://schemas.openxmlformats.org/drawingml/2006/main" xmlns:r="http://schemas.openxmlformats.org/officeDocument/2006/relationships" xmlns:p="http://schemas.openxmlformats.org/presentationml/2006/main">
+  <p:cSld>
+    <p:spTree>
+      <p:nvGrpSpPr>
         <p:cNvPr id="1" name=""/>
         <p:cNvGrpSpPr/>
         <p:nvPr/>
@@ -757,7 +1302,7 @@
           <a:p>
             <a:fld id="{AA1D0AE7-02E7-4ECD-8A34-B5A5CCDA1321}" type="slidenum">
               <a:rPr lang="en-US" smtClean="0"/>
-              <a:t>14</a:t>
+              <a:t>19</a:t>
             </a:fld>
             <a:endParaRPr lang="en-US"/>
           </a:p>
@@ -776,7 +1321,7 @@
 </p:notes>
 </file>
 
-<file path=ppt/notesSlides/notesSlide3.xml><?xml version="1.0" encoding="utf-8"?>
+<file path=ppt/notesSlides/notesSlide8.xml><?xml version="1.0" encoding="utf-8"?>
 <p:notes xmlns:a="http://schemas.openxmlformats.org/drawingml/2006/main" xmlns:r="http://schemas.openxmlformats.org/officeDocument/2006/relationships" xmlns:p="http://schemas.openxmlformats.org/presentationml/2006/main">
   <p:cSld>
     <p:spTree>
@@ -926,7 +1471,7 @@
           <a:p>
             <a:fld id="{AA1D0AE7-02E7-4ECD-8A34-B5A5CCDA1321}" type="slidenum">
               <a:rPr lang="en-US" smtClean="0"/>
-              <a:t>15</a:t>
+              <a:t>20</a:t>
             </a:fld>
             <a:endParaRPr lang="en-US"/>
           </a:p>
@@ -1092,7 +1637,7 @@
           <a:p>
             <a:fld id="{729DB911-48E5-4251-B130-A1A5C205802B}" type="datetimeFigureOut">
               <a:rPr lang="en-US" smtClean="0"/>
-              <a:t>5/8/2025</a:t>
+              <a:t>5/11/2025</a:t>
             </a:fld>
             <a:endParaRPr lang="en-US"/>
           </a:p>
@@ -1290,7 +1835,7 @@
           <a:p>
             <a:fld id="{729DB911-48E5-4251-B130-A1A5C205802B}" type="datetimeFigureOut">
               <a:rPr lang="en-US" smtClean="0"/>
-              <a:t>5/8/2025</a:t>
+              <a:t>5/11/2025</a:t>
             </a:fld>
             <a:endParaRPr lang="en-US"/>
           </a:p>
@@ -1498,7 +2043,7 @@
           <a:p>
             <a:fld id="{729DB911-48E5-4251-B130-A1A5C205802B}" type="datetimeFigureOut">
               <a:rPr lang="en-US" smtClean="0"/>
-              <a:t>5/8/2025</a:t>
+              <a:t>5/11/2025</a:t>
             </a:fld>
             <a:endParaRPr lang="en-US"/>
           </a:p>
@@ -1696,7 +2241,7 @@
           <a:p>
             <a:fld id="{729DB911-48E5-4251-B130-A1A5C205802B}" type="datetimeFigureOut">
               <a:rPr lang="en-US" smtClean="0"/>
-              <a:t>5/8/2025</a:t>
+              <a:t>5/11/2025</a:t>
             </a:fld>
             <a:endParaRPr lang="en-US"/>
           </a:p>
@@ -1971,7 +2516,7 @@
           <a:p>
             <a:fld id="{729DB911-48E5-4251-B130-A1A5C205802B}" type="datetimeFigureOut">
               <a:rPr lang="en-US" smtClean="0"/>
-              <a:t>5/8/2025</a:t>
+              <a:t>5/11/2025</a:t>
             </a:fld>
             <a:endParaRPr lang="en-US"/>
           </a:p>
@@ -2236,7 +2781,7 @@
           <a:p>
             <a:fld id="{729DB911-48E5-4251-B130-A1A5C205802B}" type="datetimeFigureOut">
               <a:rPr lang="en-US" smtClean="0"/>
-              <a:t>5/8/2025</a:t>
+              <a:t>5/11/2025</a:t>
             </a:fld>
             <a:endParaRPr lang="en-US"/>
           </a:p>
@@ -2648,7 +3193,7 @@
           <a:p>
             <a:fld id="{729DB911-48E5-4251-B130-A1A5C205802B}" type="datetimeFigureOut">
               <a:rPr lang="en-US" smtClean="0"/>
-              <a:t>5/8/2025</a:t>
+              <a:t>5/11/2025</a:t>
             </a:fld>
             <a:endParaRPr lang="en-US"/>
           </a:p>
@@ -2789,7 +3334,7 @@
           <a:p>
             <a:fld id="{729DB911-48E5-4251-B130-A1A5C205802B}" type="datetimeFigureOut">
               <a:rPr lang="en-US" smtClean="0"/>
-              <a:t>5/8/2025</a:t>
+              <a:t>5/11/2025</a:t>
             </a:fld>
             <a:endParaRPr lang="en-US"/>
           </a:p>
@@ -2902,7 +3447,7 @@
           <a:p>
             <a:fld id="{729DB911-48E5-4251-B130-A1A5C205802B}" type="datetimeFigureOut">
               <a:rPr lang="en-US" smtClean="0"/>
-              <a:t>5/8/2025</a:t>
+              <a:t>5/11/2025</a:t>
             </a:fld>
             <a:endParaRPr lang="en-US"/>
           </a:p>
@@ -3213,7 +3758,7 @@
           <a:p>
             <a:fld id="{729DB911-48E5-4251-B130-A1A5C205802B}" type="datetimeFigureOut">
               <a:rPr lang="en-US" smtClean="0"/>
-              <a:t>5/8/2025</a:t>
+              <a:t>5/11/2025</a:t>
             </a:fld>
             <a:endParaRPr lang="en-US"/>
           </a:p>
@@ -3501,7 +4046,7 @@
           <a:p>
             <a:fld id="{729DB911-48E5-4251-B130-A1A5C205802B}" type="datetimeFigureOut">
               <a:rPr lang="en-US" smtClean="0"/>
-              <a:t>5/8/2025</a:t>
+              <a:t>5/11/2025</a:t>
             </a:fld>
             <a:endParaRPr lang="en-US"/>
           </a:p>
@@ -3742,7 +4287,7 @@
           <a:p>
             <a:fld id="{729DB911-48E5-4251-B130-A1A5C205802B}" type="datetimeFigureOut">
               <a:rPr lang="en-US" smtClean="0"/>
-              <a:t>5/8/2025</a:t>
+              <a:t>5/11/2025</a:t>
             </a:fld>
             <a:endParaRPr lang="en-US"/>
           </a:p>
@@ -4518,8 +5063,8 @@
           </a:p>
         </p:txBody>
       </p:sp>
-      <mc:AlternateContent xmlns:mc="http://schemas.openxmlformats.org/markup-compatibility/2006" xmlns:a14="http://schemas.microsoft.com/office/drawing/2010/main">
-        <mc:Choice Requires="a14">
+      <mc:AlternateContent xmlns:mc="http://schemas.openxmlformats.org/markup-compatibility/2006">
+        <mc:Choice xmlns:a14="http://schemas.microsoft.com/office/drawing/2010/main" Requires="a14">
           <p:sp>
             <p:nvSpPr>
               <p:cNvPr id="3" name="Content Placeholder 2">
@@ -4705,7 +5250,7 @@
             </p:txBody>
           </p:sp>
         </mc:Choice>
-        <mc:Fallback xmlns="">
+        <mc:Fallback>
           <p:sp>
             <p:nvSpPr>
               <p:cNvPr id="3" name="Content Placeholder 2">
@@ -4872,7 +5417,7 @@
               <a:rPr lang="en-US" dirty="0">
                 <a:latin typeface="Arial (Body)"/>
               </a:rPr>
-              <a:t>Calculate MMD on the dataset</a:t>
+              <a:t>Calculate Kernel Matrix on the dataset</a:t>
             </a:r>
             <a:endParaRPr lang="vi-VN" dirty="0">
               <a:latin typeface="Arial (Body)"/>
@@ -7445,6 +7990,1313 @@
 </file>
 
 <file path=ppt/slides/slide14.xml><?xml version="1.0" encoding="utf-8"?>
+<p:sld xmlns:a="http://schemas.openxmlformats.org/drawingml/2006/main" xmlns:r="http://schemas.openxmlformats.org/officeDocument/2006/relationships" xmlns:p="http://schemas.openxmlformats.org/presentationml/2006/main">
+  <p:cSld>
+    <p:spTree>
+      <p:nvGrpSpPr>
+        <p:cNvPr id="1" name="">
+          <a:extLst>
+            <a:ext uri="{FF2B5EF4-FFF2-40B4-BE49-F238E27FC236}">
+              <a16:creationId xmlns:a16="http://schemas.microsoft.com/office/drawing/2014/main" id="{971CD5DA-39A7-5A62-F7DD-D0BF3B97ED6F}"/>
+            </a:ext>
+          </a:extLst>
+        </p:cNvPr>
+        <p:cNvGrpSpPr/>
+        <p:nvPr/>
+      </p:nvGrpSpPr>
+      <p:grpSpPr>
+        <a:xfrm>
+          <a:off x="0" y="0"/>
+          <a:ext cx="0" cy="0"/>
+          <a:chOff x="0" y="0"/>
+          <a:chExt cx="0" cy="0"/>
+        </a:xfrm>
+      </p:grpSpPr>
+      <p:sp>
+        <p:nvSpPr>
+          <p:cNvPr id="2" name="Title 1">
+            <a:extLst>
+              <a:ext uri="{FF2B5EF4-FFF2-40B4-BE49-F238E27FC236}">
+                <a16:creationId xmlns:a16="http://schemas.microsoft.com/office/drawing/2014/main" id="{86C34CEF-5DDF-EF9A-82FF-951C5E515970}"/>
+              </a:ext>
+            </a:extLst>
+          </p:cNvPr>
+          <p:cNvSpPr>
+            <a:spLocks noGrp="1"/>
+          </p:cNvSpPr>
+          <p:nvPr>
+            <p:ph type="title"/>
+          </p:nvPr>
+        </p:nvSpPr>
+        <p:spPr/>
+        <p:txBody>
+          <a:bodyPr/>
+          <a:lstStyle/>
+          <a:p>
+            <a:r>
+              <a:rPr lang="en-US" dirty="0" err="1"/>
+              <a:t>ShapeDD</a:t>
+            </a:r>
+            <a:endParaRPr lang="en-US" dirty="0"/>
+          </a:p>
+        </p:txBody>
+      </p:sp>
+      <p:sp>
+        <p:nvSpPr>
+          <p:cNvPr id="3" name="Content Placeholder 2">
+            <a:extLst>
+              <a:ext uri="{FF2B5EF4-FFF2-40B4-BE49-F238E27FC236}">
+                <a16:creationId xmlns:a16="http://schemas.microsoft.com/office/drawing/2014/main" id="{FED6C960-673F-E90B-99AD-92BB351A8A9E}"/>
+              </a:ext>
+            </a:extLst>
+          </p:cNvPr>
+          <p:cNvSpPr>
+            <a:spLocks noGrp="1"/>
+          </p:cNvSpPr>
+          <p:nvPr>
+            <p:ph idx="1"/>
+          </p:nvPr>
+        </p:nvSpPr>
+        <p:spPr>
+          <a:xfrm>
+            <a:off x="838200" y="1837127"/>
+            <a:ext cx="10515600" cy="4351338"/>
+          </a:xfrm>
+        </p:spPr>
+        <p:txBody>
+          <a:bodyPr>
+            <a:normAutofit/>
+          </a:bodyPr>
+          <a:lstStyle/>
+          <a:p>
+            <a:r>
+              <a:rPr lang="en-US" dirty="0">
+                <a:latin typeface="Arial (Body)"/>
+              </a:rPr>
+              <a:t>Calculating local statistics</a:t>
+            </a:r>
+          </a:p>
+          <a:p>
+            <a:pPr lvl="1"/>
+            <a:r>
+              <a:rPr lang="en-US" dirty="0">
+                <a:latin typeface="Arial (Body)"/>
+              </a:rPr>
+              <a:t>Multiplies the sliding window matrix (W) with the kernel matrix (K)</a:t>
+            </a:r>
+          </a:p>
+          <a:p>
+            <a:pPr lvl="1"/>
+            <a:r>
+              <a:rPr lang="en-US" dirty="0">
+                <a:latin typeface="Arial (Body)"/>
+              </a:rPr>
+              <a:t>For each window position, this weights the kernel similarities between points.</a:t>
+            </a:r>
+          </a:p>
+          <a:p>
+            <a:pPr lvl="1"/>
+            <a:r>
+              <a:rPr lang="en-US" dirty="0">
+                <a:latin typeface="Arial (Body)"/>
+              </a:rPr>
+              <a:t>Computes element-wise multiplication followed by summation along rows</a:t>
+            </a:r>
+          </a:p>
+          <a:p>
+            <a:pPr lvl="1"/>
+            <a:r>
+              <a:rPr lang="en-US" dirty="0">
+                <a:latin typeface="Arial (Body)"/>
+              </a:rPr>
+              <a:t>For each window position </a:t>
+            </a:r>
+            <a:r>
+              <a:rPr lang="en-US" dirty="0" err="1">
+                <a:latin typeface="Arial (Body)"/>
+              </a:rPr>
+              <a:t>i</a:t>
+            </a:r>
+            <a:r>
+              <a:rPr lang="en-US" dirty="0">
+                <a:latin typeface="Arial (Body)"/>
+              </a:rPr>
+              <a:t>, it calculates: </a:t>
+            </a:r>
+            <a:r>
+              <a:rPr lang="en-US" dirty="0" err="1">
+                <a:latin typeface="Arial (Body)"/>
+              </a:rPr>
+              <a:t>Σ_j</a:t>
+            </a:r>
+            <a:r>
+              <a:rPr lang="en-US" dirty="0">
+                <a:latin typeface="Arial (Body)"/>
+              </a:rPr>
+              <a:t> (WK)_</a:t>
+            </a:r>
+            <a:r>
+              <a:rPr lang="en-US" dirty="0" err="1">
+                <a:latin typeface="Arial (Body)"/>
+              </a:rPr>
+              <a:t>ij</a:t>
+            </a:r>
+            <a:r>
+              <a:rPr lang="en-US" dirty="0">
+                <a:latin typeface="Arial (Body)"/>
+              </a:rPr>
+              <a:t> </a:t>
+            </a:r>
+            <a:r>
+              <a:rPr lang="en-US" dirty="0" err="1">
+                <a:latin typeface="Arial (Body)"/>
+              </a:rPr>
+              <a:t>W_ij</a:t>
+            </a:r>
+            <a:endParaRPr lang="en-US" dirty="0">
+              <a:latin typeface="Arial (Body)"/>
+            </a:endParaRPr>
+          </a:p>
+          <a:p>
+            <a:pPr lvl="1"/>
+            <a:r>
+              <a:rPr lang="en-US" dirty="0">
+                <a:latin typeface="Arial (Body)"/>
+              </a:rPr>
+              <a:t>Result: A vector of length (n-2l1) containing test statistics</a:t>
+            </a:r>
+          </a:p>
+        </p:txBody>
+      </p:sp>
+    </p:spTree>
+    <p:extLst>
+      <p:ext uri="{BB962C8B-B14F-4D97-AF65-F5344CB8AC3E}">
+        <p14:creationId xmlns:p14="http://schemas.microsoft.com/office/powerpoint/2010/main" val="4040895750"/>
+      </p:ext>
+    </p:extLst>
+  </p:cSld>
+  <p:clrMapOvr>
+    <a:masterClrMapping/>
+  </p:clrMapOvr>
+</p:sld>
+</file>
+
+<file path=ppt/slides/slide15.xml><?xml version="1.0" encoding="utf-8"?>
+<p:sld xmlns:a="http://schemas.openxmlformats.org/drawingml/2006/main" xmlns:r="http://schemas.openxmlformats.org/officeDocument/2006/relationships" xmlns:p="http://schemas.openxmlformats.org/presentationml/2006/main">
+  <p:cSld>
+    <p:spTree>
+      <p:nvGrpSpPr>
+        <p:cNvPr id="1" name="">
+          <a:extLst>
+            <a:ext uri="{FF2B5EF4-FFF2-40B4-BE49-F238E27FC236}">
+              <a16:creationId xmlns:a16="http://schemas.microsoft.com/office/drawing/2014/main" id="{7307D2E9-6FD4-F81A-63AB-03BDD1BB3AC4}"/>
+            </a:ext>
+          </a:extLst>
+        </p:cNvPr>
+        <p:cNvGrpSpPr/>
+        <p:nvPr/>
+      </p:nvGrpSpPr>
+      <p:grpSpPr>
+        <a:xfrm>
+          <a:off x="0" y="0"/>
+          <a:ext cx="0" cy="0"/>
+          <a:chOff x="0" y="0"/>
+          <a:chExt cx="0" cy="0"/>
+        </a:xfrm>
+      </p:grpSpPr>
+      <p:sp>
+        <p:nvSpPr>
+          <p:cNvPr id="2" name="Title 1">
+            <a:extLst>
+              <a:ext uri="{FF2B5EF4-FFF2-40B4-BE49-F238E27FC236}">
+                <a16:creationId xmlns:a16="http://schemas.microsoft.com/office/drawing/2014/main" id="{8759C73F-F3EC-0CF0-2EA8-3929D9E98F50}"/>
+              </a:ext>
+            </a:extLst>
+          </p:cNvPr>
+          <p:cNvSpPr>
+            <a:spLocks noGrp="1"/>
+          </p:cNvSpPr>
+          <p:nvPr>
+            <p:ph type="title"/>
+          </p:nvPr>
+        </p:nvSpPr>
+        <p:spPr/>
+        <p:txBody>
+          <a:bodyPr/>
+          <a:lstStyle/>
+          <a:p>
+            <a:r>
+              <a:rPr lang="en-US" dirty="0" err="1"/>
+              <a:t>ShapeDD</a:t>
+            </a:r>
+            <a:endParaRPr lang="en-US" dirty="0"/>
+          </a:p>
+        </p:txBody>
+      </p:sp>
+      <p:sp>
+        <p:nvSpPr>
+          <p:cNvPr id="3" name="Content Placeholder 2">
+            <a:extLst>
+              <a:ext uri="{FF2B5EF4-FFF2-40B4-BE49-F238E27FC236}">
+                <a16:creationId xmlns:a16="http://schemas.microsoft.com/office/drawing/2014/main" id="{C99F27ED-DCCE-CB65-86F3-2DD2D83776D0}"/>
+              </a:ext>
+            </a:extLst>
+          </p:cNvPr>
+          <p:cNvSpPr>
+            <a:spLocks noGrp="1"/>
+          </p:cNvSpPr>
+          <p:nvPr>
+            <p:ph idx="1"/>
+          </p:nvPr>
+        </p:nvSpPr>
+        <p:spPr>
+          <a:xfrm>
+            <a:off x="838200" y="1837127"/>
+            <a:ext cx="10515600" cy="4351338"/>
+          </a:xfrm>
+        </p:spPr>
+        <p:txBody>
+          <a:bodyPr>
+            <a:normAutofit/>
+          </a:bodyPr>
+          <a:lstStyle/>
+          <a:p>
+            <a:r>
+              <a:rPr lang="en-US" dirty="0">
+                <a:latin typeface="Arial (Body)"/>
+              </a:rPr>
+              <a:t>Calculating local statistics</a:t>
+            </a:r>
+          </a:p>
+          <a:p>
+            <a:pPr lvl="1"/>
+            <a:r>
+              <a:rPr lang="en-US" dirty="0">
+                <a:latin typeface="Arial (Body)"/>
+              </a:rPr>
+              <a:t>Example for window position 0:</a:t>
+            </a:r>
+          </a:p>
+          <a:p>
+            <a:pPr lvl="1"/>
+            <a:r>
+              <a:rPr lang="en-US" dirty="0">
+                <a:latin typeface="Arial (Body)"/>
+              </a:rPr>
+              <a:t>stat[0] = weighted sum of kernel similarities, with positive weights for the first 3 points and negative weights for the next 3 points</a:t>
+            </a:r>
+          </a:p>
+          <a:p>
+            <a:pPr lvl="1"/>
+            <a:r>
+              <a:rPr lang="en-US" dirty="0">
+                <a:latin typeface="Arial (Body)"/>
+              </a:rPr>
+              <a:t>High positive values indicate the first half and second half of the window have different distributions</a:t>
+            </a:r>
+          </a:p>
+        </p:txBody>
+      </p:sp>
+    </p:spTree>
+    <p:extLst>
+      <p:ext uri="{BB962C8B-B14F-4D97-AF65-F5344CB8AC3E}">
+        <p14:creationId xmlns:p14="http://schemas.microsoft.com/office/powerpoint/2010/main" val="3554340134"/>
+      </p:ext>
+    </p:extLst>
+  </p:cSld>
+  <p:clrMapOvr>
+    <a:masterClrMapping/>
+  </p:clrMapOvr>
+</p:sld>
+</file>
+
+<file path=ppt/slides/slide16.xml><?xml version="1.0" encoding="utf-8"?>
+<p:sld xmlns:a="http://schemas.openxmlformats.org/drawingml/2006/main" xmlns:r="http://schemas.openxmlformats.org/officeDocument/2006/relationships" xmlns:p="http://schemas.openxmlformats.org/presentationml/2006/main">
+  <p:cSld>
+    <p:spTree>
+      <p:nvGrpSpPr>
+        <p:cNvPr id="1" name="">
+          <a:extLst>
+            <a:ext uri="{FF2B5EF4-FFF2-40B4-BE49-F238E27FC236}">
+              <a16:creationId xmlns:a16="http://schemas.microsoft.com/office/drawing/2014/main" id="{1D2F35AE-8814-8B8E-11ED-A2C249C8BED4}"/>
+            </a:ext>
+          </a:extLst>
+        </p:cNvPr>
+        <p:cNvGrpSpPr/>
+        <p:nvPr/>
+      </p:nvGrpSpPr>
+      <p:grpSpPr>
+        <a:xfrm>
+          <a:off x="0" y="0"/>
+          <a:ext cx="0" cy="0"/>
+          <a:chOff x="0" y="0"/>
+          <a:chExt cx="0" cy="0"/>
+        </a:xfrm>
+      </p:grpSpPr>
+      <p:sp>
+        <p:nvSpPr>
+          <p:cNvPr id="2" name="Title 1">
+            <a:extLst>
+              <a:ext uri="{FF2B5EF4-FFF2-40B4-BE49-F238E27FC236}">
+                <a16:creationId xmlns:a16="http://schemas.microsoft.com/office/drawing/2014/main" id="{C542BCB8-6931-4B92-3058-E2988EA492CB}"/>
+              </a:ext>
+            </a:extLst>
+          </p:cNvPr>
+          <p:cNvSpPr>
+            <a:spLocks noGrp="1"/>
+          </p:cNvSpPr>
+          <p:nvPr>
+            <p:ph type="title"/>
+          </p:nvPr>
+        </p:nvSpPr>
+        <p:spPr/>
+        <p:txBody>
+          <a:bodyPr/>
+          <a:lstStyle/>
+          <a:p>
+            <a:r>
+              <a:rPr lang="en-US" dirty="0" err="1"/>
+              <a:t>ShapeDD</a:t>
+            </a:r>
+            <a:endParaRPr lang="en-US" dirty="0"/>
+          </a:p>
+        </p:txBody>
+      </p:sp>
+      <p:sp>
+        <p:nvSpPr>
+          <p:cNvPr id="3" name="Content Placeholder 2">
+            <a:extLst>
+              <a:ext uri="{FF2B5EF4-FFF2-40B4-BE49-F238E27FC236}">
+                <a16:creationId xmlns:a16="http://schemas.microsoft.com/office/drawing/2014/main" id="{1B83E5EB-8BB2-06EE-3A05-4F8534F150D5}"/>
+              </a:ext>
+            </a:extLst>
+          </p:cNvPr>
+          <p:cNvSpPr>
+            <a:spLocks noGrp="1"/>
+          </p:cNvSpPr>
+          <p:nvPr>
+            <p:ph idx="1"/>
+          </p:nvPr>
+        </p:nvSpPr>
+        <p:spPr>
+          <a:xfrm>
+            <a:off x="838200" y="1837127"/>
+            <a:ext cx="10515600" cy="4351338"/>
+          </a:xfrm>
+        </p:spPr>
+        <p:txBody>
+          <a:bodyPr>
+            <a:normAutofit lnSpcReduction="10000"/>
+          </a:bodyPr>
+          <a:lstStyle/>
+          <a:p>
+            <a:pPr>
+              <a:spcBef>
+                <a:spcPts val="150"/>
+              </a:spcBef>
+              <a:spcAft>
+                <a:spcPts val="150"/>
+              </a:spcAft>
+              <a:buFont typeface="Arial" panose="020B0604020202020204" pitchFamily="34" charset="0"/>
+              <a:buChar char="•"/>
+            </a:pPr>
+            <a:r>
+              <a:rPr lang="en-US" dirty="0"/>
+              <a:t>This convolves the statistics with the same weight vector:</a:t>
+            </a:r>
+          </a:p>
+          <a:p>
+            <a:pPr>
+              <a:spcBef>
+                <a:spcPts val="150"/>
+              </a:spcBef>
+              <a:spcAft>
+                <a:spcPts val="150"/>
+              </a:spcAft>
+              <a:buFont typeface="Arial" panose="020B0604020202020204" pitchFamily="34" charset="0"/>
+              <a:buChar char="•"/>
+            </a:pPr>
+            <a:r>
+              <a:rPr lang="en-US" dirty="0">
+                <a:effectLst/>
+              </a:rPr>
+              <a:t>The convolution further enhances change points by applying the same weighting pattern</a:t>
+            </a:r>
+          </a:p>
+          <a:p>
+            <a:pPr>
+              <a:spcBef>
+                <a:spcPts val="150"/>
+              </a:spcBef>
+              <a:spcAft>
+                <a:spcPts val="150"/>
+              </a:spcAft>
+              <a:buFont typeface="Arial" panose="020B0604020202020204" pitchFamily="34" charset="0"/>
+              <a:buChar char="•"/>
+            </a:pPr>
+            <a:r>
+              <a:rPr lang="en-US" dirty="0">
+                <a:effectLst/>
+              </a:rPr>
+              <a:t>Length of </a:t>
+            </a:r>
+            <a:r>
+              <a:rPr lang="en-US" dirty="0">
+                <a:effectLst/>
+                <a:latin typeface="Consolas" panose="020B0609020204030204" pitchFamily="49" charset="0"/>
+              </a:rPr>
+              <a:t>shape</a:t>
+            </a:r>
+            <a:r>
+              <a:rPr lang="en-US" dirty="0">
+                <a:effectLst/>
+              </a:rPr>
+              <a:t> = (n-2</a:t>
+            </a:r>
+            <a:r>
+              <a:rPr lang="en-US" i="1" dirty="0">
+                <a:effectLst/>
+              </a:rPr>
+              <a:t>l1) + (2</a:t>
+            </a:r>
+            <a:r>
+              <a:rPr lang="en-US" dirty="0">
+                <a:effectLst/>
+              </a:rPr>
+              <a:t>l1-1) = n-1</a:t>
+            </a:r>
+          </a:p>
+          <a:p>
+            <a:pPr>
+              <a:spcBef>
+                <a:spcPts val="150"/>
+              </a:spcBef>
+              <a:spcAft>
+                <a:spcPts val="150"/>
+              </a:spcAft>
+              <a:buFont typeface="Arial" panose="020B0604020202020204" pitchFamily="34" charset="0"/>
+              <a:buChar char="•"/>
+            </a:pPr>
+            <a:r>
+              <a:rPr lang="en-US" dirty="0">
+                <a:effectLst/>
+              </a:rPr>
+              <a:t>It smooths the signal while preserving the significant peaks</a:t>
+            </a:r>
+          </a:p>
+          <a:p>
+            <a:pPr>
+              <a:spcBef>
+                <a:spcPts val="150"/>
+              </a:spcBef>
+              <a:spcAft>
+                <a:spcPts val="150"/>
+              </a:spcAft>
+              <a:buFont typeface="Arial" panose="020B0604020202020204" pitchFamily="34" charset="0"/>
+              <a:buChar char="•"/>
+            </a:pPr>
+            <a:r>
+              <a:rPr lang="en-US" dirty="0">
+                <a:effectLst/>
+              </a:rPr>
+              <a:t>Peaks in this signal correspond to potential distribution change points</a:t>
+            </a:r>
+          </a:p>
+          <a:p>
+            <a:pPr>
+              <a:buNone/>
+            </a:pPr>
+            <a:r>
+              <a:rPr lang="en-US" dirty="0"/>
+              <a:t>Example:</a:t>
+            </a:r>
+          </a:p>
+          <a:p>
+            <a:pPr>
+              <a:buNone/>
+            </a:pPr>
+            <a:r>
+              <a:rPr lang="en-US" dirty="0"/>
+              <a:t>If </a:t>
+            </a:r>
+            <a:r>
+              <a:rPr lang="en-US" dirty="0">
+                <a:effectLst/>
+                <a:latin typeface="Consolas" panose="020B0609020204030204" pitchFamily="49" charset="0"/>
+              </a:rPr>
+              <a:t>stat</a:t>
+            </a:r>
+            <a:r>
+              <a:rPr lang="en-US" dirty="0"/>
+              <a:t> shows increased values around position 10, convolution will create a distinctive peak pattern that's easier to detect in the next step.</a:t>
+            </a:r>
+            <a:endParaRPr lang="en-US" dirty="0">
+              <a:latin typeface="Arial (Body)"/>
+            </a:endParaRPr>
+          </a:p>
+        </p:txBody>
+      </p:sp>
+    </p:spTree>
+    <p:extLst>
+      <p:ext uri="{BB962C8B-B14F-4D97-AF65-F5344CB8AC3E}">
+        <p14:creationId xmlns:p14="http://schemas.microsoft.com/office/powerpoint/2010/main" val="3668717104"/>
+      </p:ext>
+    </p:extLst>
+  </p:cSld>
+  <p:clrMapOvr>
+    <a:masterClrMapping/>
+  </p:clrMapOvr>
+</p:sld>
+</file>
+
+<file path=ppt/slides/slide17.xml><?xml version="1.0" encoding="utf-8"?>
+<p:sld xmlns:a="http://schemas.openxmlformats.org/drawingml/2006/main" xmlns:r="http://schemas.openxmlformats.org/officeDocument/2006/relationships" xmlns:p="http://schemas.openxmlformats.org/presentationml/2006/main">
+  <p:cSld>
+    <p:spTree>
+      <p:nvGrpSpPr>
+        <p:cNvPr id="1" name="">
+          <a:extLst>
+            <a:ext uri="{FF2B5EF4-FFF2-40B4-BE49-F238E27FC236}">
+              <a16:creationId xmlns:a16="http://schemas.microsoft.com/office/drawing/2014/main" id="{41B5189B-E298-A9E6-369F-5269ECCDE93B}"/>
+            </a:ext>
+          </a:extLst>
+        </p:cNvPr>
+        <p:cNvGrpSpPr/>
+        <p:nvPr/>
+      </p:nvGrpSpPr>
+      <p:grpSpPr>
+        <a:xfrm>
+          <a:off x="0" y="0"/>
+          <a:ext cx="0" cy="0"/>
+          <a:chOff x="0" y="0"/>
+          <a:chExt cx="0" cy="0"/>
+        </a:xfrm>
+      </p:grpSpPr>
+      <p:sp>
+        <p:nvSpPr>
+          <p:cNvPr id="2" name="Title 1">
+            <a:extLst>
+              <a:ext uri="{FF2B5EF4-FFF2-40B4-BE49-F238E27FC236}">
+                <a16:creationId xmlns:a16="http://schemas.microsoft.com/office/drawing/2014/main" id="{5408E4B9-7FC3-1CB1-FCA1-5B03B4DBE3E5}"/>
+              </a:ext>
+            </a:extLst>
+          </p:cNvPr>
+          <p:cNvSpPr>
+            <a:spLocks noGrp="1"/>
+          </p:cNvSpPr>
+          <p:nvPr>
+            <p:ph type="title"/>
+          </p:nvPr>
+        </p:nvSpPr>
+        <p:spPr/>
+        <p:txBody>
+          <a:bodyPr/>
+          <a:lstStyle/>
+          <a:p>
+            <a:r>
+              <a:rPr lang="en-US" dirty="0" err="1"/>
+              <a:t>ShapeDD</a:t>
+            </a:r>
+            <a:endParaRPr lang="en-US" dirty="0"/>
+          </a:p>
+        </p:txBody>
+      </p:sp>
+      <p:sp>
+        <p:nvSpPr>
+          <p:cNvPr id="3" name="Content Placeholder 2">
+            <a:extLst>
+              <a:ext uri="{FF2B5EF4-FFF2-40B4-BE49-F238E27FC236}">
+                <a16:creationId xmlns:a16="http://schemas.microsoft.com/office/drawing/2014/main" id="{0DABE62F-F8DA-1B17-2AAC-E48B82D08FEE}"/>
+              </a:ext>
+            </a:extLst>
+          </p:cNvPr>
+          <p:cNvSpPr>
+            <a:spLocks noGrp="1"/>
+          </p:cNvSpPr>
+          <p:nvPr>
+            <p:ph idx="1"/>
+          </p:nvPr>
+        </p:nvSpPr>
+        <p:spPr>
+          <a:xfrm>
+            <a:off x="838200" y="1837127"/>
+            <a:ext cx="10515600" cy="4351338"/>
+          </a:xfrm>
+        </p:spPr>
+        <p:txBody>
+          <a:bodyPr>
+            <a:normAutofit fontScale="92500" lnSpcReduction="10000"/>
+          </a:bodyPr>
+          <a:lstStyle/>
+          <a:p>
+            <a:pPr>
+              <a:spcBef>
+                <a:spcPts val="150"/>
+              </a:spcBef>
+              <a:spcAft>
+                <a:spcPts val="150"/>
+              </a:spcAft>
+              <a:buFont typeface="Arial" panose="020B0604020202020204" pitchFamily="34" charset="0"/>
+              <a:buChar char="•"/>
+            </a:pPr>
+            <a:r>
+              <a:rPr lang="en-US" dirty="0"/>
+              <a:t>This multiplies adjacent values in the shape </a:t>
+            </a:r>
+            <a:r>
+              <a:rPr lang="en-US" dirty="0" err="1"/>
+              <a:t>signal:</a:t>
+            </a:r>
+            <a:r>
+              <a:rPr lang="en-US" dirty="0" err="1">
+                <a:effectLst/>
+                <a:latin typeface="Consolas" panose="020B0609020204030204" pitchFamily="49" charset="0"/>
+              </a:rPr>
+              <a:t>shape</a:t>
+            </a:r>
+            <a:r>
+              <a:rPr lang="en-US" dirty="0">
+                <a:effectLst/>
+                <a:latin typeface="Consolas" panose="020B0609020204030204" pitchFamily="49" charset="0"/>
+              </a:rPr>
+              <a:t>[:-1]</a:t>
+            </a:r>
+            <a:r>
+              <a:rPr lang="en-US" dirty="0">
+                <a:effectLst/>
+              </a:rPr>
+              <a:t> = all values except the last one</a:t>
+            </a:r>
+          </a:p>
+          <a:p>
+            <a:pPr>
+              <a:spcBef>
+                <a:spcPts val="150"/>
+              </a:spcBef>
+              <a:spcAft>
+                <a:spcPts val="150"/>
+              </a:spcAft>
+              <a:buFont typeface="Arial" panose="020B0604020202020204" pitchFamily="34" charset="0"/>
+              <a:buChar char="•"/>
+            </a:pPr>
+            <a:r>
+              <a:rPr lang="en-US" dirty="0">
+                <a:effectLst/>
+                <a:latin typeface="Consolas" panose="020B0609020204030204" pitchFamily="49" charset="0"/>
+              </a:rPr>
+              <a:t>shape[1:]</a:t>
+            </a:r>
+            <a:r>
+              <a:rPr lang="en-US" dirty="0">
+                <a:effectLst/>
+              </a:rPr>
+              <a:t> = all values except the first one</a:t>
+            </a:r>
+          </a:p>
+          <a:p>
+            <a:pPr>
+              <a:spcBef>
+                <a:spcPts val="150"/>
+              </a:spcBef>
+              <a:spcAft>
+                <a:spcPts val="150"/>
+              </a:spcAft>
+              <a:buFont typeface="Arial" panose="020B0604020202020204" pitchFamily="34" charset="0"/>
+              <a:buChar char="•"/>
+            </a:pPr>
+            <a:r>
+              <a:rPr lang="en-US" dirty="0" err="1">
+                <a:effectLst/>
+                <a:latin typeface="Consolas" panose="020B0609020204030204" pitchFamily="49" charset="0"/>
+              </a:rPr>
+              <a:t>shape_prime</a:t>
+            </a:r>
+            <a:r>
+              <a:rPr lang="en-US" dirty="0">
+                <a:effectLst/>
+              </a:rPr>
+              <a:t> = element-wise product of these vectors</a:t>
+            </a:r>
+          </a:p>
+          <a:p>
+            <a:pPr>
+              <a:spcBef>
+                <a:spcPts val="150"/>
+              </a:spcBef>
+              <a:spcAft>
+                <a:spcPts val="150"/>
+              </a:spcAft>
+              <a:buFont typeface="Arial" panose="020B0604020202020204" pitchFamily="34" charset="0"/>
+              <a:buChar char="•"/>
+            </a:pPr>
+            <a:r>
+              <a:rPr lang="en-US" dirty="0">
+                <a:effectLst/>
+              </a:rPr>
+              <a:t>When adjacent values have different signs, their product will be negative</a:t>
+            </a:r>
+          </a:p>
+          <a:p>
+            <a:pPr>
+              <a:buNone/>
+            </a:pPr>
+            <a:r>
+              <a:rPr lang="en-US" dirty="0"/>
+              <a:t>Example:</a:t>
+            </a:r>
+          </a:p>
+          <a:p>
+            <a:pPr>
+              <a:buNone/>
+            </a:pPr>
+            <a:r>
+              <a:rPr lang="en-US" dirty="0"/>
+              <a:t>If </a:t>
+            </a:r>
+            <a:r>
+              <a:rPr lang="en-US" dirty="0">
+                <a:effectLst/>
+                <a:latin typeface="Consolas" panose="020B0609020204030204" pitchFamily="49" charset="0"/>
+              </a:rPr>
+              <a:t>shape</a:t>
+            </a:r>
+            <a:r>
+              <a:rPr lang="en-US" dirty="0"/>
+              <a:t> = [0.1, 0.3, 0.5, 0.2, -0.1, -0.3, -0.2, 0.1]</a:t>
+            </a:r>
+          </a:p>
+          <a:p>
+            <a:pPr>
+              <a:buNone/>
+            </a:pPr>
+            <a:r>
+              <a:rPr lang="en-US" dirty="0" err="1">
+                <a:effectLst/>
+                <a:latin typeface="Consolas" panose="020B0609020204030204" pitchFamily="49" charset="0"/>
+              </a:rPr>
+              <a:t>shape_prime</a:t>
+            </a:r>
+            <a:r>
+              <a:rPr lang="en-US" dirty="0"/>
+              <a:t> = [0.03, 0.15, 0.1, -0.02, 0.03, 0.06, -0.02]</a:t>
+            </a:r>
+          </a:p>
+          <a:p>
+            <a:pPr>
+              <a:buNone/>
+            </a:pPr>
+            <a:r>
+              <a:rPr lang="en-US" dirty="0"/>
+              <a:t>Negative values (-0.02, -0.02) indicate sign changes at positions 3→4 and 6→7.</a:t>
+            </a:r>
+            <a:endParaRPr lang="en-US" dirty="0">
+              <a:latin typeface="Arial (Body)"/>
+            </a:endParaRPr>
+          </a:p>
+        </p:txBody>
+      </p:sp>
+    </p:spTree>
+    <p:extLst>
+      <p:ext uri="{BB962C8B-B14F-4D97-AF65-F5344CB8AC3E}">
+        <p14:creationId xmlns:p14="http://schemas.microsoft.com/office/powerpoint/2010/main" val="683143087"/>
+      </p:ext>
+    </p:extLst>
+  </p:cSld>
+  <p:clrMapOvr>
+    <a:masterClrMapping/>
+  </p:clrMapOvr>
+</p:sld>
+</file>
+
+<file path=ppt/slides/slide18.xml><?xml version="1.0" encoding="utf-8"?>
+<p:sld xmlns:a="http://schemas.openxmlformats.org/drawingml/2006/main" xmlns:r="http://schemas.openxmlformats.org/officeDocument/2006/relationships" xmlns:p="http://schemas.openxmlformats.org/presentationml/2006/main">
+  <p:cSld>
+    <p:spTree>
+      <p:nvGrpSpPr>
+        <p:cNvPr id="1" name="">
+          <a:extLst>
+            <a:ext uri="{FF2B5EF4-FFF2-40B4-BE49-F238E27FC236}">
+              <a16:creationId xmlns:a16="http://schemas.microsoft.com/office/drawing/2014/main" id="{BB6E93B6-448E-EE23-42F2-69770FCDB9C3}"/>
+            </a:ext>
+          </a:extLst>
+        </p:cNvPr>
+        <p:cNvGrpSpPr/>
+        <p:nvPr/>
+      </p:nvGrpSpPr>
+      <p:grpSpPr>
+        <a:xfrm>
+          <a:off x="0" y="0"/>
+          <a:ext cx="0" cy="0"/>
+          <a:chOff x="0" y="0"/>
+          <a:chExt cx="0" cy="0"/>
+        </a:xfrm>
+      </p:grpSpPr>
+      <p:sp>
+        <p:nvSpPr>
+          <p:cNvPr id="2" name="Title 1">
+            <a:extLst>
+              <a:ext uri="{FF2B5EF4-FFF2-40B4-BE49-F238E27FC236}">
+                <a16:creationId xmlns:a16="http://schemas.microsoft.com/office/drawing/2014/main" id="{62EFCE74-6E48-79B9-7441-E1D00B40EEA0}"/>
+              </a:ext>
+            </a:extLst>
+          </p:cNvPr>
+          <p:cNvSpPr>
+            <a:spLocks noGrp="1"/>
+          </p:cNvSpPr>
+          <p:nvPr>
+            <p:ph type="title"/>
+          </p:nvPr>
+        </p:nvSpPr>
+        <p:spPr/>
+        <p:txBody>
+          <a:bodyPr/>
+          <a:lstStyle/>
+          <a:p>
+            <a:r>
+              <a:rPr lang="en-US" dirty="0" err="1"/>
+              <a:t>ShapeDD</a:t>
+            </a:r>
+            <a:endParaRPr lang="en-US" dirty="0"/>
+          </a:p>
+        </p:txBody>
+      </p:sp>
+      <p:sp>
+        <p:nvSpPr>
+          <p:cNvPr id="3" name="Content Placeholder 2">
+            <a:extLst>
+              <a:ext uri="{FF2B5EF4-FFF2-40B4-BE49-F238E27FC236}">
+                <a16:creationId xmlns:a16="http://schemas.microsoft.com/office/drawing/2014/main" id="{003B7287-669E-B886-4B17-BDE2EEB81DF1}"/>
+              </a:ext>
+            </a:extLst>
+          </p:cNvPr>
+          <p:cNvSpPr>
+            <a:spLocks noGrp="1"/>
+          </p:cNvSpPr>
+          <p:nvPr>
+            <p:ph idx="1"/>
+          </p:nvPr>
+        </p:nvSpPr>
+        <p:spPr>
+          <a:xfrm>
+            <a:off x="838200" y="1837127"/>
+            <a:ext cx="10515600" cy="4351338"/>
+          </a:xfrm>
+        </p:spPr>
+        <p:txBody>
+          <a:bodyPr>
+            <a:normAutofit fontScale="62500" lnSpcReduction="20000"/>
+          </a:bodyPr>
+          <a:lstStyle/>
+          <a:p>
+            <a:pPr>
+              <a:spcBef>
+                <a:spcPts val="150"/>
+              </a:spcBef>
+              <a:spcAft>
+                <a:spcPts val="150"/>
+              </a:spcAft>
+              <a:buFont typeface="+mj-lt"/>
+              <a:buAutoNum type="arabicPeriod"/>
+            </a:pPr>
+            <a:r>
+              <a:rPr lang="en-US" dirty="0"/>
+              <a:t>For each detected change </a:t>
+            </a:r>
+            <a:r>
+              <a:rPr lang="en-US" dirty="0" err="1"/>
+              <a:t>point:</a:t>
+            </a:r>
+            <a:r>
+              <a:rPr lang="en-US" dirty="0" err="1">
+                <a:effectLst/>
+              </a:rPr>
+              <a:t>We</a:t>
+            </a:r>
+            <a:r>
+              <a:rPr lang="en-US" dirty="0">
+                <a:effectLst/>
+              </a:rPr>
+              <a:t> only process those where </a:t>
+            </a:r>
+            <a:r>
+              <a:rPr lang="en-US" dirty="0">
+                <a:effectLst/>
+                <a:latin typeface="Consolas" panose="020B0609020204030204" pitchFamily="49" charset="0"/>
+              </a:rPr>
+              <a:t>shape[pos] &gt; 0</a:t>
+            </a:r>
+            <a:r>
+              <a:rPr lang="en-US" dirty="0">
+                <a:effectLst/>
+              </a:rPr>
+              <a:t> (transitions from positive to negative)</a:t>
+            </a:r>
+          </a:p>
+          <a:p>
+            <a:pPr>
+              <a:spcBef>
+                <a:spcPts val="150"/>
+              </a:spcBef>
+              <a:spcAft>
+                <a:spcPts val="150"/>
+              </a:spcAft>
+              <a:buFont typeface="+mj-lt"/>
+              <a:buAutoNum type="arabicPeriod" startAt="2"/>
+            </a:pPr>
+            <a:r>
+              <a:rPr lang="en-US" dirty="0">
+                <a:effectLst/>
+              </a:rPr>
+              <a:t>We store the shape value in the first column of </a:t>
+            </a:r>
+            <a:r>
+              <a:rPr lang="en-US" dirty="0">
+                <a:effectLst/>
+                <a:latin typeface="Consolas" panose="020B0609020204030204" pitchFamily="49" charset="0"/>
+              </a:rPr>
+              <a:t>res</a:t>
+            </a:r>
+            <a:endParaRPr lang="en-US" dirty="0">
+              <a:effectLst/>
+            </a:endParaRPr>
+          </a:p>
+          <a:p>
+            <a:pPr>
+              <a:spcBef>
+                <a:spcPts val="150"/>
+              </a:spcBef>
+              <a:spcAft>
+                <a:spcPts val="150"/>
+              </a:spcAft>
+              <a:buFont typeface="+mj-lt"/>
+              <a:buAutoNum type="arabicPeriod" startAt="3"/>
+            </a:pPr>
+            <a:r>
+              <a:rPr lang="en-US" dirty="0">
+                <a:effectLst/>
+              </a:rPr>
+              <a:t>We define a window of size </a:t>
+            </a:r>
+            <a:r>
+              <a:rPr lang="en-US" dirty="0">
+                <a:effectLst/>
+                <a:latin typeface="Consolas" panose="020B0609020204030204" pitchFamily="49" charset="0"/>
+              </a:rPr>
+              <a:t>l2</a:t>
+            </a:r>
+            <a:r>
+              <a:rPr lang="en-US" dirty="0">
+                <a:effectLst/>
+              </a:rPr>
+              <a:t> centered at the change point</a:t>
+            </a:r>
+          </a:p>
+          <a:p>
+            <a:pPr>
+              <a:spcBef>
+                <a:spcPts val="150"/>
+              </a:spcBef>
+              <a:spcAft>
+                <a:spcPts val="150"/>
+              </a:spcAft>
+              <a:buFont typeface="+mj-lt"/>
+              <a:buAutoNum type="arabicPeriod" startAt="4"/>
+            </a:pPr>
+            <a:r>
+              <a:rPr lang="en-US" dirty="0">
+                <a:effectLst/>
+              </a:rPr>
+              <a:t>We call the MMD function to perform a statistical test:</a:t>
+            </a:r>
+          </a:p>
+          <a:p>
+            <a:pPr>
+              <a:spcBef>
+                <a:spcPts val="150"/>
+              </a:spcBef>
+              <a:spcAft>
+                <a:spcPts val="150"/>
+              </a:spcAft>
+              <a:buFont typeface="Arial" panose="020B0604020202020204" pitchFamily="34" charset="0"/>
+              <a:buChar char="•"/>
+            </a:pPr>
+            <a:r>
+              <a:rPr lang="en-US" dirty="0">
+                <a:effectLst/>
+              </a:rPr>
+              <a:t>It compares the distribution of points before and after position </a:t>
+            </a:r>
+            <a:r>
+              <a:rPr lang="en-US" dirty="0">
+                <a:effectLst/>
+                <a:latin typeface="Consolas" panose="020B0609020204030204" pitchFamily="49" charset="0"/>
+              </a:rPr>
+              <a:t>pos-a</a:t>
+            </a:r>
+            <a:r>
+              <a:rPr lang="en-US" dirty="0">
+                <a:effectLst/>
+              </a:rPr>
+              <a:t> within the window</a:t>
+            </a:r>
+          </a:p>
+          <a:p>
+            <a:pPr>
+              <a:spcBef>
+                <a:spcPts val="150"/>
+              </a:spcBef>
+              <a:spcAft>
+                <a:spcPts val="150"/>
+              </a:spcAft>
+              <a:buFont typeface="Arial" panose="020B0604020202020204" pitchFamily="34" charset="0"/>
+              <a:buChar char="•"/>
+            </a:pPr>
+            <a:r>
+              <a:rPr lang="en-US" dirty="0">
+                <a:effectLst/>
+              </a:rPr>
+              <a:t>Returns [MMD statistic, p-value]</a:t>
+            </a:r>
+          </a:p>
+          <a:p>
+            <a:pPr>
+              <a:spcBef>
+                <a:spcPts val="150"/>
+              </a:spcBef>
+              <a:spcAft>
+                <a:spcPts val="150"/>
+              </a:spcAft>
+              <a:buFont typeface="Arial" panose="020B0604020202020204" pitchFamily="34" charset="0"/>
+              <a:buChar char="•"/>
+            </a:pPr>
+            <a:r>
+              <a:rPr lang="en-US" dirty="0">
+                <a:effectLst/>
+              </a:rPr>
+              <a:t>These are stored in columns 1 and 2 of </a:t>
+            </a:r>
+            <a:r>
+              <a:rPr lang="en-US" dirty="0">
+                <a:effectLst/>
+                <a:latin typeface="Consolas" panose="020B0609020204030204" pitchFamily="49" charset="0"/>
+              </a:rPr>
+              <a:t>res</a:t>
+            </a:r>
+            <a:endParaRPr lang="en-US" dirty="0">
+              <a:effectLst/>
+            </a:endParaRPr>
+          </a:p>
+          <a:p>
+            <a:pPr>
+              <a:spcBef>
+                <a:spcPts val="150"/>
+              </a:spcBef>
+              <a:spcAft>
+                <a:spcPts val="150"/>
+              </a:spcAft>
+              <a:buFont typeface="Arial" panose="020B0604020202020204" pitchFamily="34" charset="0"/>
+              <a:buChar char="•"/>
+            </a:pPr>
+            <a:r>
+              <a:rPr lang="en-US" dirty="0" err="1"/>
+              <a:t>Example:For</a:t>
+            </a:r>
+            <a:r>
+              <a:rPr lang="en-US" dirty="0"/>
+              <a:t> a change point at position 10:</a:t>
+            </a:r>
+            <a:r>
+              <a:rPr lang="en-US" dirty="0">
+                <a:effectLst/>
+              </a:rPr>
+              <a:t>Window: points 7-13 (assuming l2=6)</a:t>
+            </a:r>
+          </a:p>
+          <a:p>
+            <a:pPr>
+              <a:spcBef>
+                <a:spcPts val="150"/>
+              </a:spcBef>
+              <a:spcAft>
+                <a:spcPts val="150"/>
+              </a:spcAft>
+              <a:buFont typeface="Arial" panose="020B0604020202020204" pitchFamily="34" charset="0"/>
+              <a:buChar char="•"/>
+            </a:pPr>
+            <a:r>
+              <a:rPr lang="en-US" dirty="0">
+                <a:effectLst/>
+              </a:rPr>
+              <a:t>MMD test compares points 7-9 vs. 10-13</a:t>
+            </a:r>
+          </a:p>
+          <a:p>
+            <a:pPr>
+              <a:spcBef>
+                <a:spcPts val="150"/>
+              </a:spcBef>
+              <a:spcAft>
+                <a:spcPts val="150"/>
+              </a:spcAft>
+              <a:buFont typeface="Arial" panose="020B0604020202020204" pitchFamily="34" charset="0"/>
+              <a:buChar char="•"/>
+            </a:pPr>
+            <a:r>
+              <a:rPr lang="en-US" dirty="0">
+                <a:effectLst/>
+              </a:rPr>
+              <a:t>If p-value is low (e.g., 0.01), we have strong evidence of concept drift</a:t>
+            </a:r>
+          </a:p>
+          <a:p>
+            <a:pPr>
+              <a:spcBef>
+                <a:spcPts val="150"/>
+              </a:spcBef>
+              <a:spcAft>
+                <a:spcPts val="150"/>
+              </a:spcAft>
+              <a:buFont typeface="Arial" panose="020B0604020202020204" pitchFamily="34" charset="0"/>
+              <a:buChar char="•"/>
+            </a:pPr>
+            <a:r>
+              <a:rPr lang="en-US" dirty="0">
+                <a:effectLst/>
+              </a:rPr>
+              <a:t>Result row at position 10: [</a:t>
+            </a:r>
+            <a:r>
+              <a:rPr lang="en-US" dirty="0" err="1">
+                <a:effectLst/>
+              </a:rPr>
+              <a:t>shape_value</a:t>
+            </a:r>
+            <a:r>
+              <a:rPr lang="en-US" dirty="0">
+                <a:effectLst/>
+              </a:rPr>
+              <a:t>, </a:t>
+            </a:r>
+            <a:r>
+              <a:rPr lang="en-US" dirty="0" err="1">
+                <a:effectLst/>
+              </a:rPr>
+              <a:t>mmd_statistic</a:t>
+            </a:r>
+            <a:r>
+              <a:rPr lang="en-US" dirty="0">
+                <a:effectLst/>
+              </a:rPr>
+              <a:t>, 0.01]</a:t>
+            </a:r>
+          </a:p>
+          <a:p>
+            <a:pPr>
+              <a:spcBef>
+                <a:spcPts val="150"/>
+              </a:spcBef>
+              <a:spcAft>
+                <a:spcPts val="150"/>
+              </a:spcAft>
+              <a:buFont typeface="+mj-lt"/>
+              <a:buAutoNum type="arabicPeriod"/>
+            </a:pPr>
+            <a:r>
+              <a:rPr lang="en-US" dirty="0"/>
+              <a:t>The final </a:t>
+            </a:r>
+            <a:r>
+              <a:rPr lang="en-US" dirty="0">
+                <a:effectLst/>
+                <a:latin typeface="Consolas" panose="020B0609020204030204" pitchFamily="49" charset="0"/>
+              </a:rPr>
+              <a:t>res</a:t>
+            </a:r>
+            <a:r>
+              <a:rPr lang="en-US" dirty="0"/>
+              <a:t> matrix gives three key pieces of information for each data </a:t>
+            </a:r>
+            <a:r>
+              <a:rPr lang="en-US" dirty="0" err="1"/>
+              <a:t>point:</a:t>
+            </a:r>
+            <a:r>
+              <a:rPr lang="en-US" dirty="0" err="1">
+                <a:effectLst/>
+              </a:rPr>
+              <a:t>Shape</a:t>
+            </a:r>
+            <a:r>
+              <a:rPr lang="en-US" dirty="0">
+                <a:effectLst/>
+              </a:rPr>
+              <a:t> value (strength of the change signal)</a:t>
+            </a:r>
+          </a:p>
+          <a:p>
+            <a:pPr>
+              <a:spcBef>
+                <a:spcPts val="150"/>
+              </a:spcBef>
+              <a:spcAft>
+                <a:spcPts val="150"/>
+              </a:spcAft>
+              <a:buFont typeface="+mj-lt"/>
+              <a:buAutoNum type="arabicPeriod" startAt="2"/>
+            </a:pPr>
+            <a:r>
+              <a:rPr lang="en-US" dirty="0">
+                <a:effectLst/>
+              </a:rPr>
+              <a:t>MMD statistic (distance between distributions)</a:t>
+            </a:r>
+          </a:p>
+          <a:p>
+            <a:pPr>
+              <a:spcBef>
+                <a:spcPts val="150"/>
+              </a:spcBef>
+              <a:spcAft>
+                <a:spcPts val="150"/>
+              </a:spcAft>
+              <a:buFont typeface="+mj-lt"/>
+              <a:buAutoNum type="arabicPeriod" startAt="3"/>
+            </a:pPr>
+            <a:r>
+              <a:rPr lang="en-US" dirty="0">
+                <a:effectLst/>
+              </a:rPr>
+              <a:t>p-value (statistical significance)</a:t>
+            </a:r>
+          </a:p>
+          <a:p>
+            <a:pPr>
+              <a:buNone/>
+            </a:pPr>
+            <a:r>
+              <a:rPr lang="en-US" dirty="0"/>
+              <a:t>Points with high shape values and low p-values represent the most reliable concept drift points.</a:t>
+            </a:r>
+            <a:endParaRPr lang="en-US" dirty="0">
+              <a:latin typeface="Arial (Body)"/>
+            </a:endParaRPr>
+          </a:p>
+        </p:txBody>
+      </p:sp>
+    </p:spTree>
+    <p:extLst>
+      <p:ext uri="{BB962C8B-B14F-4D97-AF65-F5344CB8AC3E}">
+        <p14:creationId xmlns:p14="http://schemas.microsoft.com/office/powerpoint/2010/main" val="2234376617"/>
+      </p:ext>
+    </p:extLst>
+  </p:cSld>
+  <p:clrMapOvr>
+    <a:masterClrMapping/>
+  </p:clrMapOvr>
+</p:sld>
+</file>
+
+<file path=ppt/slides/slide19.xml><?xml version="1.0" encoding="utf-8"?>
 <p:sld xmlns:a="http://schemas.openxmlformats.org/drawingml/2006/main" xmlns:r="http://schemas.openxmlformats.org/officeDocument/2006/relationships" xmlns:p="http://schemas.openxmlformats.org/presentationml/2006/main" show="0">
   <p:cSld>
     <p:spTree>
@@ -7588,150 +9440,6 @@
     <p:extLst>
       <p:ext uri="{BB962C8B-B14F-4D97-AF65-F5344CB8AC3E}">
         <p14:creationId xmlns:p14="http://schemas.microsoft.com/office/powerpoint/2010/main" val="3056561995"/>
-      </p:ext>
-    </p:extLst>
-  </p:cSld>
-  <p:clrMapOvr>
-    <a:masterClrMapping/>
-  </p:clrMapOvr>
-</p:sld>
-</file>
-
-<file path=ppt/slides/slide15.xml><?xml version="1.0" encoding="utf-8"?>
-<p:sld xmlns:a="http://schemas.openxmlformats.org/drawingml/2006/main" xmlns:r="http://schemas.openxmlformats.org/officeDocument/2006/relationships" xmlns:p="http://schemas.openxmlformats.org/presentationml/2006/main">
-  <p:cSld>
-    <p:spTree>
-      <p:nvGrpSpPr>
-        <p:cNvPr id="1" name="">
-          <a:extLst>
-            <a:ext uri="{FF2B5EF4-FFF2-40B4-BE49-F238E27FC236}">
-              <a16:creationId xmlns:a16="http://schemas.microsoft.com/office/drawing/2014/main" id="{A1FA361D-7EE9-E7E5-92A4-0F82AD125FB9}"/>
-            </a:ext>
-          </a:extLst>
-        </p:cNvPr>
-        <p:cNvGrpSpPr/>
-        <p:nvPr/>
-      </p:nvGrpSpPr>
-      <p:grpSpPr>
-        <a:xfrm>
-          <a:off x="0" y="0"/>
-          <a:ext cx="0" cy="0"/>
-          <a:chOff x="0" y="0"/>
-          <a:chExt cx="0" cy="0"/>
-        </a:xfrm>
-      </p:grpSpPr>
-      <p:sp>
-        <p:nvSpPr>
-          <p:cNvPr id="2" name="Title 1">
-            <a:extLst>
-              <a:ext uri="{FF2B5EF4-FFF2-40B4-BE49-F238E27FC236}">
-                <a16:creationId xmlns:a16="http://schemas.microsoft.com/office/drawing/2014/main" id="{9F752AB1-6900-6CDB-184A-18F23CF94764}"/>
-              </a:ext>
-            </a:extLst>
-          </p:cNvPr>
-          <p:cNvSpPr>
-            <a:spLocks noGrp="1"/>
-          </p:cNvSpPr>
-          <p:nvPr>
-            <p:ph type="title"/>
-          </p:nvPr>
-        </p:nvSpPr>
-        <p:spPr/>
-        <p:txBody>
-          <a:bodyPr/>
-          <a:lstStyle/>
-          <a:p>
-            <a:r>
-              <a:rPr lang="en-US" dirty="0" err="1"/>
-              <a:t>ShapeDD</a:t>
-            </a:r>
-            <a:endParaRPr lang="en-US" dirty="0"/>
-          </a:p>
-        </p:txBody>
-      </p:sp>
-      <p:sp>
-        <p:nvSpPr>
-          <p:cNvPr id="3" name="Content Placeholder 2">
-            <a:extLst>
-              <a:ext uri="{FF2B5EF4-FFF2-40B4-BE49-F238E27FC236}">
-                <a16:creationId xmlns:a16="http://schemas.microsoft.com/office/drawing/2014/main" id="{5FD64614-3281-9DDE-D2CC-F50F8AB456A2}"/>
-              </a:ext>
-            </a:extLst>
-          </p:cNvPr>
-          <p:cNvSpPr>
-            <a:spLocks noGrp="1"/>
-          </p:cNvSpPr>
-          <p:nvPr>
-            <p:ph idx="1"/>
-          </p:nvPr>
-        </p:nvSpPr>
-        <p:spPr>
-          <a:xfrm>
-            <a:off x="838200" y="1837127"/>
-            <a:ext cx="10515600" cy="4351338"/>
-          </a:xfrm>
-        </p:spPr>
-        <p:txBody>
-          <a:bodyPr>
-            <a:normAutofit/>
-          </a:bodyPr>
-          <a:lstStyle/>
-          <a:p>
-            <a:r>
-              <a:rPr lang="vi-VN" dirty="0">
-                <a:latin typeface="Arial (Body)"/>
-              </a:rPr>
-              <a:t>Kết quả stat là một vector chiều (n-2*l1,).</a:t>
-            </a:r>
-          </a:p>
-          <a:p>
-            <a:pPr lvl="1"/>
-            <a:r>
-              <a:rPr lang="vi-VN" dirty="0">
-                <a:latin typeface="Arial (Body)"/>
-              </a:rPr>
-              <a:t>Stat thu được sẽ được tích chập với w như một bộ lọc, giúp nổi bật sự thay đổi của dữ liệu -&gt; Tạo ra </a:t>
-            </a:r>
-            <a:r>
-              <a:rPr lang="vi-VN" b="1" dirty="0">
-                <a:latin typeface="Arial (Body)"/>
-              </a:rPr>
-              <a:t>shape</a:t>
-            </a:r>
-            <a:r>
-              <a:rPr lang="vi-VN" dirty="0">
-                <a:latin typeface="Arial (Body)"/>
-              </a:rPr>
-              <a:t> value.</a:t>
-            </a:r>
-          </a:p>
-          <a:p>
-            <a:pPr lvl="1"/>
-            <a:r>
-              <a:rPr lang="vi-VN" dirty="0">
-                <a:latin typeface="Arial (Body)"/>
-              </a:rPr>
-              <a:t>Shape_prime </a:t>
-            </a:r>
-            <a:r>
-              <a:rPr lang="en-US" dirty="0">
-                <a:latin typeface="Arial (Body)"/>
-              </a:rPr>
-              <a:t>= shape[1:]*shape[:-1]</a:t>
-            </a:r>
-            <a:r>
-              <a:rPr lang="vi-VN" dirty="0">
-                <a:latin typeface="Arial (Body)"/>
-              </a:rPr>
-              <a:t> -&gt; phát hiện sự thay đổi về dấu của các giá trị -&gt; thể hiện sự thay đổi về sự tương đồng của dữ liệu để từ đó tính toán MMD trên lân cận của dữ liệu lúc đó.</a:t>
-            </a:r>
-          </a:p>
-        </p:txBody>
-      </p:sp>
-    </p:spTree>
-    <p:extLst>
-      <p:ext uri="{BB962C8B-B14F-4D97-AF65-F5344CB8AC3E}">
-        <p14:creationId xmlns:p14="http://schemas.microsoft.com/office/powerpoint/2010/main" val="190315629"/>
       </p:ext>
     </p:extLst>
   </p:cSld>
@@ -7880,6 +9588,150 @@
     <p:extLst>
       <p:ext uri="{BB962C8B-B14F-4D97-AF65-F5344CB8AC3E}">
         <p14:creationId xmlns:p14="http://schemas.microsoft.com/office/powerpoint/2010/main" val="1942983129"/>
+      </p:ext>
+    </p:extLst>
+  </p:cSld>
+  <p:clrMapOvr>
+    <a:masterClrMapping/>
+  </p:clrMapOvr>
+</p:sld>
+</file>
+
+<file path=ppt/slides/slide20.xml><?xml version="1.0" encoding="utf-8"?>
+<p:sld xmlns:a="http://schemas.openxmlformats.org/drawingml/2006/main" xmlns:r="http://schemas.openxmlformats.org/officeDocument/2006/relationships" xmlns:p="http://schemas.openxmlformats.org/presentationml/2006/main">
+  <p:cSld>
+    <p:spTree>
+      <p:nvGrpSpPr>
+        <p:cNvPr id="1" name="">
+          <a:extLst>
+            <a:ext uri="{FF2B5EF4-FFF2-40B4-BE49-F238E27FC236}">
+              <a16:creationId xmlns:a16="http://schemas.microsoft.com/office/drawing/2014/main" id="{A1FA361D-7EE9-E7E5-92A4-0F82AD125FB9}"/>
+            </a:ext>
+          </a:extLst>
+        </p:cNvPr>
+        <p:cNvGrpSpPr/>
+        <p:nvPr/>
+      </p:nvGrpSpPr>
+      <p:grpSpPr>
+        <a:xfrm>
+          <a:off x="0" y="0"/>
+          <a:ext cx="0" cy="0"/>
+          <a:chOff x="0" y="0"/>
+          <a:chExt cx="0" cy="0"/>
+        </a:xfrm>
+      </p:grpSpPr>
+      <p:sp>
+        <p:nvSpPr>
+          <p:cNvPr id="2" name="Title 1">
+            <a:extLst>
+              <a:ext uri="{FF2B5EF4-FFF2-40B4-BE49-F238E27FC236}">
+                <a16:creationId xmlns:a16="http://schemas.microsoft.com/office/drawing/2014/main" id="{9F752AB1-6900-6CDB-184A-18F23CF94764}"/>
+              </a:ext>
+            </a:extLst>
+          </p:cNvPr>
+          <p:cNvSpPr>
+            <a:spLocks noGrp="1"/>
+          </p:cNvSpPr>
+          <p:nvPr>
+            <p:ph type="title"/>
+          </p:nvPr>
+        </p:nvSpPr>
+        <p:spPr/>
+        <p:txBody>
+          <a:bodyPr/>
+          <a:lstStyle/>
+          <a:p>
+            <a:r>
+              <a:rPr lang="en-US" dirty="0" err="1"/>
+              <a:t>ShapeDD</a:t>
+            </a:r>
+            <a:endParaRPr lang="en-US" dirty="0"/>
+          </a:p>
+        </p:txBody>
+      </p:sp>
+      <p:sp>
+        <p:nvSpPr>
+          <p:cNvPr id="3" name="Content Placeholder 2">
+            <a:extLst>
+              <a:ext uri="{FF2B5EF4-FFF2-40B4-BE49-F238E27FC236}">
+                <a16:creationId xmlns:a16="http://schemas.microsoft.com/office/drawing/2014/main" id="{5FD64614-3281-9DDE-D2CC-F50F8AB456A2}"/>
+              </a:ext>
+            </a:extLst>
+          </p:cNvPr>
+          <p:cNvSpPr>
+            <a:spLocks noGrp="1"/>
+          </p:cNvSpPr>
+          <p:nvPr>
+            <p:ph idx="1"/>
+          </p:nvPr>
+        </p:nvSpPr>
+        <p:spPr>
+          <a:xfrm>
+            <a:off x="838200" y="1837127"/>
+            <a:ext cx="10515600" cy="4351338"/>
+          </a:xfrm>
+        </p:spPr>
+        <p:txBody>
+          <a:bodyPr>
+            <a:normAutofit/>
+          </a:bodyPr>
+          <a:lstStyle/>
+          <a:p>
+            <a:r>
+              <a:rPr lang="vi-VN" dirty="0">
+                <a:latin typeface="Arial (Body)"/>
+              </a:rPr>
+              <a:t>Kết quả stat là một vector chiều (n-2*l1,).</a:t>
+            </a:r>
+          </a:p>
+          <a:p>
+            <a:pPr lvl="1"/>
+            <a:r>
+              <a:rPr lang="vi-VN" dirty="0">
+                <a:latin typeface="Arial (Body)"/>
+              </a:rPr>
+              <a:t>Stat thu được sẽ được tích chập với w như một bộ lọc, giúp nổi bật sự thay đổi của dữ liệu -&gt; Tạo ra </a:t>
+            </a:r>
+            <a:r>
+              <a:rPr lang="vi-VN" b="1" dirty="0">
+                <a:latin typeface="Arial (Body)"/>
+              </a:rPr>
+              <a:t>shape</a:t>
+            </a:r>
+            <a:r>
+              <a:rPr lang="vi-VN" dirty="0">
+                <a:latin typeface="Arial (Body)"/>
+              </a:rPr>
+              <a:t> value.</a:t>
+            </a:r>
+          </a:p>
+          <a:p>
+            <a:pPr lvl="1"/>
+            <a:r>
+              <a:rPr lang="vi-VN" dirty="0">
+                <a:latin typeface="Arial (Body)"/>
+              </a:rPr>
+              <a:t>Shape_prime </a:t>
+            </a:r>
+            <a:r>
+              <a:rPr lang="en-US" dirty="0">
+                <a:latin typeface="Arial (Body)"/>
+              </a:rPr>
+              <a:t>= shape[1:]*shape[:-1]</a:t>
+            </a:r>
+            <a:r>
+              <a:rPr lang="vi-VN" dirty="0">
+                <a:latin typeface="Arial (Body)"/>
+              </a:rPr>
+              <a:t> -&gt; phát hiện sự thay đổi về dấu của các giá trị -&gt; thể hiện sự thay đổi về sự tương đồng của dữ liệu để từ đó tính toán MMD trên lân cận của dữ liệu lúc đó.</a:t>
+            </a:r>
+          </a:p>
+        </p:txBody>
+      </p:sp>
+    </p:spTree>
+    <p:extLst>
+      <p:ext uri="{BB962C8B-B14F-4D97-AF65-F5344CB8AC3E}">
+        <p14:creationId xmlns:p14="http://schemas.microsoft.com/office/powerpoint/2010/main" val="190315629"/>
       </p:ext>
     </p:extLst>
   </p:cSld>

</xml_diff>

<commit_message>
[Update] Update the presentation and algorithm
</commit_message>
<xml_diff>
--- a/report/Algorithm.pptx
+++ b/report/Algorithm.pptx
@@ -5,7 +5,7 @@
     <p:sldMasterId id="2147483648" r:id="rId1"/>
   </p:sldMasterIdLst>
   <p:notesMasterIdLst>
-    <p:notesMasterId r:id="rId22"/>
+    <p:notesMasterId r:id="rId24"/>
   </p:notesMasterIdLst>
   <p:sldIdLst>
     <p:sldId id="256" r:id="rId2"/>
@@ -22,12 +22,14 @@
     <p:sldId id="259" r:id="rId13"/>
     <p:sldId id="268" r:id="rId14"/>
     <p:sldId id="272" r:id="rId15"/>
-    <p:sldId id="273" r:id="rId16"/>
-    <p:sldId id="274" r:id="rId17"/>
-    <p:sldId id="275" r:id="rId18"/>
-    <p:sldId id="276" r:id="rId19"/>
-    <p:sldId id="269" r:id="rId20"/>
-    <p:sldId id="271" r:id="rId21"/>
+    <p:sldId id="277" r:id="rId16"/>
+    <p:sldId id="278" r:id="rId17"/>
+    <p:sldId id="273" r:id="rId18"/>
+    <p:sldId id="274" r:id="rId19"/>
+    <p:sldId id="275" r:id="rId20"/>
+    <p:sldId id="276" r:id="rId21"/>
+    <p:sldId id="269" r:id="rId22"/>
+    <p:sldId id="271" r:id="rId23"/>
   </p:sldIdLst>
   <p:sldSz cx="12192000" cy="6858000"/>
   <p:notesSz cx="6858000" cy="9144000"/>
@@ -216,7 +218,7 @@
           <a:p>
             <a:fld id="{81B028E4-0D91-47C6-89A1-18BFD5B08F93}" type="datetimeFigureOut">
               <a:rPr lang="en-US" smtClean="0"/>
-              <a:t>5/11/2025</a:t>
+              <a:t>5/12/2025</a:t>
             </a:fld>
             <a:endParaRPr lang="en-US"/>
           </a:p>
@@ -601,6 +603,175 @@
 </p:notes>
 </file>
 
+<file path=ppt/notesSlides/notesSlide10.xml><?xml version="1.0" encoding="utf-8"?>
+<p:notes xmlns:a="http://schemas.openxmlformats.org/drawingml/2006/main" xmlns:r="http://schemas.openxmlformats.org/officeDocument/2006/relationships" xmlns:p="http://schemas.openxmlformats.org/presentationml/2006/main">
+  <p:cSld>
+    <p:spTree>
+      <p:nvGrpSpPr>
+        <p:cNvPr id="1" name="">
+          <a:extLst>
+            <a:ext uri="{FF2B5EF4-FFF2-40B4-BE49-F238E27FC236}">
+              <a16:creationId xmlns:a16="http://schemas.microsoft.com/office/drawing/2014/main" id="{79A69C6F-4739-22C9-1B41-C4A863490B0D}"/>
+            </a:ext>
+          </a:extLst>
+        </p:cNvPr>
+        <p:cNvGrpSpPr/>
+        <p:nvPr/>
+      </p:nvGrpSpPr>
+      <p:grpSpPr>
+        <a:xfrm>
+          <a:off x="0" y="0"/>
+          <a:ext cx="0" cy="0"/>
+          <a:chOff x="0" y="0"/>
+          <a:chExt cx="0" cy="0"/>
+        </a:xfrm>
+      </p:grpSpPr>
+      <p:sp>
+        <p:nvSpPr>
+          <p:cNvPr id="2" name="Slide Image Placeholder 1">
+            <a:extLst>
+              <a:ext uri="{FF2B5EF4-FFF2-40B4-BE49-F238E27FC236}">
+                <a16:creationId xmlns:a16="http://schemas.microsoft.com/office/drawing/2014/main" id="{E055D59B-EC9C-7B03-D334-B7E64353FA50}"/>
+              </a:ext>
+            </a:extLst>
+          </p:cNvPr>
+          <p:cNvSpPr>
+            <a:spLocks noGrp="1" noRot="1" noChangeAspect="1"/>
+          </p:cNvSpPr>
+          <p:nvPr>
+            <p:ph type="sldImg"/>
+          </p:nvPr>
+        </p:nvSpPr>
+        <p:spPr/>
+      </p:sp>
+      <p:sp>
+        <p:nvSpPr>
+          <p:cNvPr id="3" name="Notes Placeholder 2">
+            <a:extLst>
+              <a:ext uri="{FF2B5EF4-FFF2-40B4-BE49-F238E27FC236}">
+                <a16:creationId xmlns:a16="http://schemas.microsoft.com/office/drawing/2014/main" id="{FE5A1B5A-E416-F326-041D-5E93436D74CF}"/>
+              </a:ext>
+            </a:extLst>
+          </p:cNvPr>
+          <p:cNvSpPr>
+            <a:spLocks noGrp="1"/>
+          </p:cNvSpPr>
+          <p:nvPr>
+            <p:ph type="body" idx="1"/>
+          </p:nvPr>
+        </p:nvSpPr>
+        <p:spPr/>
+        <p:txBody>
+          <a:bodyPr/>
+          <a:lstStyle/>
+          <a:p>
+            <a:pPr>
+              <a:buNone/>
+            </a:pPr>
+            <a:r>
+              <a:rPr lang="vi-VN" dirty="0"/>
+              <a:t>w có thể được hiểu là một </a:t>
+            </a:r>
+            <a:r>
+              <a:rPr lang="vi-VN" b="1" dirty="0"/>
+              <a:t>kernel</a:t>
+            </a:r>
+            <a:r>
+              <a:rPr lang="vi-VN" dirty="0"/>
+              <a:t> có vai trò như một bộ lọc hoặc cửa sổ. Nếu w chứa các giá trị như [0.5, 0.5, -0.5, -0.5], nó có thể giúp tạo ra sự khác biệt giữa các nhóm dữ liệu theo cách mà sự thay đổi mạnh mẽ trong stat sẽ bị làm mượt hoặc ổn định khi áp dụng.</a:t>
+            </a:r>
+          </a:p>
+          <a:p>
+            <a:pPr>
+              <a:buFont typeface="Arial" panose="020B0604020202020204" pitchFamily="34" charset="0"/>
+              <a:buChar char="•"/>
+            </a:pPr>
+            <a:r>
+              <a:rPr lang="vi-VN" b="1" dirty="0"/>
+              <a:t>Cửa sổ (Windowing):</a:t>
+            </a:r>
+            <a:r>
+              <a:rPr lang="vi-VN" dirty="0"/>
+              <a:t> w có thể là một </a:t>
+            </a:r>
+            <a:r>
+              <a:rPr lang="vi-VN" b="1" dirty="0"/>
+              <a:t>cửa sổ trượt</a:t>
+            </a:r>
+            <a:r>
+              <a:rPr lang="vi-VN" dirty="0"/>
+              <a:t> giúp kiểm tra các phần của dữ liệu. Việc chập stat với w giúp tính toán một giá trị trung bình có trọng số của các giá trị xung quanh, loại bỏ những thay đổi đột ngột không đáng kể.</a:t>
+            </a:r>
+          </a:p>
+          <a:p>
+            <a:pPr>
+              <a:buFont typeface="Arial" panose="020B0604020202020204" pitchFamily="34" charset="0"/>
+              <a:buChar char="•"/>
+            </a:pPr>
+            <a:r>
+              <a:rPr lang="vi-VN" b="1" dirty="0"/>
+              <a:t>Phân tích chuỗi thời gian (Time series analysis):</a:t>
+            </a:r>
+            <a:r>
+              <a:rPr lang="vi-VN" dirty="0"/>
+              <a:t> Trong các bài toán chuỗi thời gian, việc </a:t>
+            </a:r>
+            <a:r>
+              <a:rPr lang="vi-VN" b="1" dirty="0"/>
+              <a:t>chập (smoothing)</a:t>
+            </a:r>
+            <a:r>
+              <a:rPr lang="vi-VN" dirty="0"/>
+              <a:t> với một kernel có thể giúp giảm sự biến động ngẫu nhiên và làm nổi bật các xu hướng chính.</a:t>
+            </a:r>
+          </a:p>
+          <a:p>
+            <a:endParaRPr lang="en-US" dirty="0"/>
+          </a:p>
+        </p:txBody>
+      </p:sp>
+      <p:sp>
+        <p:nvSpPr>
+          <p:cNvPr id="4" name="Slide Number Placeholder 3">
+            <a:extLst>
+              <a:ext uri="{FF2B5EF4-FFF2-40B4-BE49-F238E27FC236}">
+                <a16:creationId xmlns:a16="http://schemas.microsoft.com/office/drawing/2014/main" id="{A94C80D8-DE8C-1E3B-D950-A93A098F967D}"/>
+              </a:ext>
+            </a:extLst>
+          </p:cNvPr>
+          <p:cNvSpPr>
+            <a:spLocks noGrp="1"/>
+          </p:cNvSpPr>
+          <p:nvPr>
+            <p:ph type="sldNum" sz="quarter" idx="5"/>
+          </p:nvPr>
+        </p:nvSpPr>
+        <p:spPr/>
+        <p:txBody>
+          <a:bodyPr/>
+          <a:lstStyle/>
+          <a:p>
+            <a:fld id="{AA1D0AE7-02E7-4ECD-8A34-B5A5CCDA1321}" type="slidenum">
+              <a:rPr lang="en-US" smtClean="0"/>
+              <a:t>22</a:t>
+            </a:fld>
+            <a:endParaRPr lang="en-US"/>
+          </a:p>
+        </p:txBody>
+      </p:sp>
+    </p:spTree>
+    <p:extLst>
+      <p:ext uri="{BB962C8B-B14F-4D97-AF65-F5344CB8AC3E}">
+        <p14:creationId xmlns:p14="http://schemas.microsoft.com/office/powerpoint/2010/main" val="164317339"/>
+      </p:ext>
+    </p:extLst>
+  </p:cSld>
+  <p:clrMapOvr>
+    <a:masterClrMapping/>
+  </p:clrMapOvr>
+</p:notes>
+</file>
+
 <file path=ppt/notesSlides/notesSlide2.xml><?xml version="1.0" encoding="utf-8"?>
 <p:notes xmlns:a="http://schemas.openxmlformats.org/drawingml/2006/main" xmlns:r="http://schemas.openxmlformats.org/officeDocument/2006/relationships" xmlns:p="http://schemas.openxmlformats.org/presentationml/2006/main">
   <p:cSld>
@@ -717,6 +888,222 @@
         <p:cNvPr id="1" name="">
           <a:extLst>
             <a:ext uri="{FF2B5EF4-FFF2-40B4-BE49-F238E27FC236}">
+              <a16:creationId xmlns:a16="http://schemas.microsoft.com/office/drawing/2014/main" id="{F29FC084-F033-7632-44B5-EF81187CF355}"/>
+            </a:ext>
+          </a:extLst>
+        </p:cNvPr>
+        <p:cNvGrpSpPr/>
+        <p:nvPr/>
+      </p:nvGrpSpPr>
+      <p:grpSpPr>
+        <a:xfrm>
+          <a:off x="0" y="0"/>
+          <a:ext cx="0" cy="0"/>
+          <a:chOff x="0" y="0"/>
+          <a:chExt cx="0" cy="0"/>
+        </a:xfrm>
+      </p:grpSpPr>
+      <p:sp>
+        <p:nvSpPr>
+          <p:cNvPr id="2" name="Slide Image Placeholder 1">
+            <a:extLst>
+              <a:ext uri="{FF2B5EF4-FFF2-40B4-BE49-F238E27FC236}">
+                <a16:creationId xmlns:a16="http://schemas.microsoft.com/office/drawing/2014/main" id="{91F25DC0-5493-BB3A-31EA-D25E85C230D7}"/>
+              </a:ext>
+            </a:extLst>
+          </p:cNvPr>
+          <p:cNvSpPr>
+            <a:spLocks noGrp="1" noRot="1" noChangeAspect="1"/>
+          </p:cNvSpPr>
+          <p:nvPr>
+            <p:ph type="sldImg"/>
+          </p:nvPr>
+        </p:nvSpPr>
+        <p:spPr/>
+      </p:sp>
+      <p:sp>
+        <p:nvSpPr>
+          <p:cNvPr id="3" name="Notes Placeholder 2">
+            <a:extLst>
+              <a:ext uri="{FF2B5EF4-FFF2-40B4-BE49-F238E27FC236}">
+                <a16:creationId xmlns:a16="http://schemas.microsoft.com/office/drawing/2014/main" id="{81FA9CF9-4CC3-7C48-AF6D-83EB541F0675}"/>
+              </a:ext>
+            </a:extLst>
+          </p:cNvPr>
+          <p:cNvSpPr>
+            <a:spLocks noGrp="1"/>
+          </p:cNvSpPr>
+          <p:nvPr>
+            <p:ph type="body" idx="1"/>
+          </p:nvPr>
+        </p:nvSpPr>
+        <p:spPr/>
+        <p:txBody>
+          <a:bodyPr/>
+          <a:lstStyle/>
+          <a:p>
+            <a:endParaRPr lang="en-US" dirty="0"/>
+          </a:p>
+        </p:txBody>
+      </p:sp>
+      <p:sp>
+        <p:nvSpPr>
+          <p:cNvPr id="4" name="Slide Number Placeholder 3">
+            <a:extLst>
+              <a:ext uri="{FF2B5EF4-FFF2-40B4-BE49-F238E27FC236}">
+                <a16:creationId xmlns:a16="http://schemas.microsoft.com/office/drawing/2014/main" id="{C5616D59-3801-9030-3B7D-E1DBE175020D}"/>
+              </a:ext>
+            </a:extLst>
+          </p:cNvPr>
+          <p:cNvSpPr>
+            <a:spLocks noGrp="1"/>
+          </p:cNvSpPr>
+          <p:nvPr>
+            <p:ph type="sldNum" sz="quarter" idx="5"/>
+          </p:nvPr>
+        </p:nvSpPr>
+        <p:spPr/>
+        <p:txBody>
+          <a:bodyPr/>
+          <a:lstStyle/>
+          <a:p>
+            <a:fld id="{AA1D0AE7-02E7-4ECD-8A34-B5A5CCDA1321}" type="slidenum">
+              <a:rPr lang="en-US" smtClean="0"/>
+              <a:t>15</a:t>
+            </a:fld>
+            <a:endParaRPr lang="en-US"/>
+          </a:p>
+        </p:txBody>
+      </p:sp>
+    </p:spTree>
+    <p:extLst>
+      <p:ext uri="{BB962C8B-B14F-4D97-AF65-F5344CB8AC3E}">
+        <p14:creationId xmlns:p14="http://schemas.microsoft.com/office/powerpoint/2010/main" val="4090656628"/>
+      </p:ext>
+    </p:extLst>
+  </p:cSld>
+  <p:clrMapOvr>
+    <a:masterClrMapping/>
+  </p:clrMapOvr>
+</p:notes>
+</file>
+
+<file path=ppt/notesSlides/notesSlide4.xml><?xml version="1.0" encoding="utf-8"?>
+<p:notes xmlns:a="http://schemas.openxmlformats.org/drawingml/2006/main" xmlns:r="http://schemas.openxmlformats.org/officeDocument/2006/relationships" xmlns:p="http://schemas.openxmlformats.org/presentationml/2006/main">
+  <p:cSld>
+    <p:spTree>
+      <p:nvGrpSpPr>
+        <p:cNvPr id="1" name="">
+          <a:extLst>
+            <a:ext uri="{FF2B5EF4-FFF2-40B4-BE49-F238E27FC236}">
+              <a16:creationId xmlns:a16="http://schemas.microsoft.com/office/drawing/2014/main" id="{859E222A-9D52-1DF1-216B-E9DB7BD97D31}"/>
+            </a:ext>
+          </a:extLst>
+        </p:cNvPr>
+        <p:cNvGrpSpPr/>
+        <p:nvPr/>
+      </p:nvGrpSpPr>
+      <p:grpSpPr>
+        <a:xfrm>
+          <a:off x="0" y="0"/>
+          <a:ext cx="0" cy="0"/>
+          <a:chOff x="0" y="0"/>
+          <a:chExt cx="0" cy="0"/>
+        </a:xfrm>
+      </p:grpSpPr>
+      <p:sp>
+        <p:nvSpPr>
+          <p:cNvPr id="2" name="Slide Image Placeholder 1">
+            <a:extLst>
+              <a:ext uri="{FF2B5EF4-FFF2-40B4-BE49-F238E27FC236}">
+                <a16:creationId xmlns:a16="http://schemas.microsoft.com/office/drawing/2014/main" id="{4F99B00C-7A00-2769-46D3-1086949632AA}"/>
+              </a:ext>
+            </a:extLst>
+          </p:cNvPr>
+          <p:cNvSpPr>
+            <a:spLocks noGrp="1" noRot="1" noChangeAspect="1"/>
+          </p:cNvSpPr>
+          <p:nvPr>
+            <p:ph type="sldImg"/>
+          </p:nvPr>
+        </p:nvSpPr>
+        <p:spPr/>
+      </p:sp>
+      <p:sp>
+        <p:nvSpPr>
+          <p:cNvPr id="3" name="Notes Placeholder 2">
+            <a:extLst>
+              <a:ext uri="{FF2B5EF4-FFF2-40B4-BE49-F238E27FC236}">
+                <a16:creationId xmlns:a16="http://schemas.microsoft.com/office/drawing/2014/main" id="{8E3FA8D9-83F3-FF37-71DB-6A2AFC9BCCA0}"/>
+              </a:ext>
+            </a:extLst>
+          </p:cNvPr>
+          <p:cNvSpPr>
+            <a:spLocks noGrp="1"/>
+          </p:cNvSpPr>
+          <p:nvPr>
+            <p:ph type="body" idx="1"/>
+          </p:nvPr>
+        </p:nvSpPr>
+        <p:spPr/>
+        <p:txBody>
+          <a:bodyPr/>
+          <a:lstStyle/>
+          <a:p>
+            <a:endParaRPr lang="en-US" dirty="0"/>
+          </a:p>
+        </p:txBody>
+      </p:sp>
+      <p:sp>
+        <p:nvSpPr>
+          <p:cNvPr id="4" name="Slide Number Placeholder 3">
+            <a:extLst>
+              <a:ext uri="{FF2B5EF4-FFF2-40B4-BE49-F238E27FC236}">
+                <a16:creationId xmlns:a16="http://schemas.microsoft.com/office/drawing/2014/main" id="{0A674E2D-A6CA-F96E-752F-BC3DF1FA37E6}"/>
+              </a:ext>
+            </a:extLst>
+          </p:cNvPr>
+          <p:cNvSpPr>
+            <a:spLocks noGrp="1"/>
+          </p:cNvSpPr>
+          <p:nvPr>
+            <p:ph type="sldNum" sz="quarter" idx="5"/>
+          </p:nvPr>
+        </p:nvSpPr>
+        <p:spPr/>
+        <p:txBody>
+          <a:bodyPr/>
+          <a:lstStyle/>
+          <a:p>
+            <a:fld id="{AA1D0AE7-02E7-4ECD-8A34-B5A5CCDA1321}" type="slidenum">
+              <a:rPr lang="en-US" smtClean="0"/>
+              <a:t>16</a:t>
+            </a:fld>
+            <a:endParaRPr lang="en-US"/>
+          </a:p>
+        </p:txBody>
+      </p:sp>
+    </p:spTree>
+    <p:extLst>
+      <p:ext uri="{BB962C8B-B14F-4D97-AF65-F5344CB8AC3E}">
+        <p14:creationId xmlns:p14="http://schemas.microsoft.com/office/powerpoint/2010/main" val="3919977219"/>
+      </p:ext>
+    </p:extLst>
+  </p:cSld>
+  <p:clrMapOvr>
+    <a:masterClrMapping/>
+  </p:clrMapOvr>
+</p:notes>
+</file>
+
+<file path=ppt/notesSlides/notesSlide5.xml><?xml version="1.0" encoding="utf-8"?>
+<p:notes xmlns:a="http://schemas.openxmlformats.org/drawingml/2006/main" xmlns:r="http://schemas.openxmlformats.org/officeDocument/2006/relationships" xmlns:p="http://schemas.openxmlformats.org/presentationml/2006/main">
+  <p:cSld>
+    <p:spTree>
+      <p:nvGrpSpPr>
+        <p:cNvPr id="1" name="">
+          <a:extLst>
+            <a:ext uri="{FF2B5EF4-FFF2-40B4-BE49-F238E27FC236}">
               <a16:creationId xmlns:a16="http://schemas.microsoft.com/office/drawing/2014/main" id="{BD73E827-E774-EC46-4F00-F785562D8B7D}"/>
             </a:ext>
           </a:extLst>
@@ -798,7 +1185,7 @@
           <a:p>
             <a:fld id="{AA1D0AE7-02E7-4ECD-8A34-B5A5CCDA1321}" type="slidenum">
               <a:rPr lang="en-US" smtClean="0"/>
-              <a:t>15</a:t>
+              <a:t>17</a:t>
             </a:fld>
             <a:endParaRPr lang="en-US"/>
           </a:p>
@@ -817,7 +1204,7 @@
 </p:notes>
 </file>
 
-<file path=ppt/notesSlides/notesSlide4.xml><?xml version="1.0" encoding="utf-8"?>
+<file path=ppt/notesSlides/notesSlide6.xml><?xml version="1.0" encoding="utf-8"?>
 <p:notes xmlns:a="http://schemas.openxmlformats.org/drawingml/2006/main" xmlns:r="http://schemas.openxmlformats.org/officeDocument/2006/relationships" xmlns:p="http://schemas.openxmlformats.org/presentationml/2006/main">
   <p:cSld>
     <p:spTree>
@@ -906,7 +1293,7 @@
           <a:p>
             <a:fld id="{AA1D0AE7-02E7-4ECD-8A34-B5A5CCDA1321}" type="slidenum">
               <a:rPr lang="en-US" smtClean="0"/>
-              <a:t>16</a:t>
+              <a:t>18</a:t>
             </a:fld>
             <a:endParaRPr lang="en-US"/>
           </a:p>
@@ -925,7 +1312,7 @@
 </p:notes>
 </file>
 
-<file path=ppt/notesSlides/notesSlide5.xml><?xml version="1.0" encoding="utf-8"?>
+<file path=ppt/notesSlides/notesSlide7.xml><?xml version="1.0" encoding="utf-8"?>
 <p:notes xmlns:a="http://schemas.openxmlformats.org/drawingml/2006/main" xmlns:r="http://schemas.openxmlformats.org/officeDocument/2006/relationships" xmlns:p="http://schemas.openxmlformats.org/presentationml/2006/main">
   <p:cSld>
     <p:spTree>
@@ -1014,7 +1401,7 @@
           <a:p>
             <a:fld id="{AA1D0AE7-02E7-4ECD-8A34-B5A5CCDA1321}" type="slidenum">
               <a:rPr lang="en-US" smtClean="0"/>
-              <a:t>17</a:t>
+              <a:t>19</a:t>
             </a:fld>
             <a:endParaRPr lang="en-US"/>
           </a:p>
@@ -1033,7 +1420,7 @@
 </p:notes>
 </file>
 
-<file path=ppt/notesSlides/notesSlide6.xml><?xml version="1.0" encoding="utf-8"?>
+<file path=ppt/notesSlides/notesSlide8.xml><?xml version="1.0" encoding="utf-8"?>
 <p:notes xmlns:a="http://schemas.openxmlformats.org/drawingml/2006/main" xmlns:r="http://schemas.openxmlformats.org/officeDocument/2006/relationships" xmlns:p="http://schemas.openxmlformats.org/presentationml/2006/main">
   <p:cSld>
     <p:spTree>
@@ -1122,7 +1509,7 @@
           <a:p>
             <a:fld id="{AA1D0AE7-02E7-4ECD-8A34-B5A5CCDA1321}" type="slidenum">
               <a:rPr lang="en-US" smtClean="0"/>
-              <a:t>18</a:t>
+              <a:t>20</a:t>
             </a:fld>
             <a:endParaRPr lang="en-US"/>
           </a:p>
@@ -1141,7 +1528,7 @@
 </p:notes>
 </file>
 
-<file path=ppt/notesSlides/notesSlide7.xml><?xml version="1.0" encoding="utf-8"?>
+<file path=ppt/notesSlides/notesSlide9.xml><?xml version="1.0" encoding="utf-8"?>
 <p:notes xmlns:a="http://schemas.openxmlformats.org/drawingml/2006/main" xmlns:r="http://schemas.openxmlformats.org/officeDocument/2006/relationships" xmlns:p="http://schemas.openxmlformats.org/presentationml/2006/main">
   <p:cSld>
     <p:spTree>
@@ -1302,7 +1689,7 @@
           <a:p>
             <a:fld id="{AA1D0AE7-02E7-4ECD-8A34-B5A5CCDA1321}" type="slidenum">
               <a:rPr lang="en-US" smtClean="0"/>
-              <a:t>19</a:t>
+              <a:t>21</a:t>
             </a:fld>
             <a:endParaRPr lang="en-US"/>
           </a:p>
@@ -1312,175 +1699,6 @@
     <p:extLst>
       <p:ext uri="{BB962C8B-B14F-4D97-AF65-F5344CB8AC3E}">
         <p14:creationId xmlns:p14="http://schemas.microsoft.com/office/powerpoint/2010/main" val="1686039309"/>
-      </p:ext>
-    </p:extLst>
-  </p:cSld>
-  <p:clrMapOvr>
-    <a:masterClrMapping/>
-  </p:clrMapOvr>
-</p:notes>
-</file>
-
-<file path=ppt/notesSlides/notesSlide8.xml><?xml version="1.0" encoding="utf-8"?>
-<p:notes xmlns:a="http://schemas.openxmlformats.org/drawingml/2006/main" xmlns:r="http://schemas.openxmlformats.org/officeDocument/2006/relationships" xmlns:p="http://schemas.openxmlformats.org/presentationml/2006/main">
-  <p:cSld>
-    <p:spTree>
-      <p:nvGrpSpPr>
-        <p:cNvPr id="1" name="">
-          <a:extLst>
-            <a:ext uri="{FF2B5EF4-FFF2-40B4-BE49-F238E27FC236}">
-              <a16:creationId xmlns:a16="http://schemas.microsoft.com/office/drawing/2014/main" id="{79A69C6F-4739-22C9-1B41-C4A863490B0D}"/>
-            </a:ext>
-          </a:extLst>
-        </p:cNvPr>
-        <p:cNvGrpSpPr/>
-        <p:nvPr/>
-      </p:nvGrpSpPr>
-      <p:grpSpPr>
-        <a:xfrm>
-          <a:off x="0" y="0"/>
-          <a:ext cx="0" cy="0"/>
-          <a:chOff x="0" y="0"/>
-          <a:chExt cx="0" cy="0"/>
-        </a:xfrm>
-      </p:grpSpPr>
-      <p:sp>
-        <p:nvSpPr>
-          <p:cNvPr id="2" name="Slide Image Placeholder 1">
-            <a:extLst>
-              <a:ext uri="{FF2B5EF4-FFF2-40B4-BE49-F238E27FC236}">
-                <a16:creationId xmlns:a16="http://schemas.microsoft.com/office/drawing/2014/main" id="{E055D59B-EC9C-7B03-D334-B7E64353FA50}"/>
-              </a:ext>
-            </a:extLst>
-          </p:cNvPr>
-          <p:cNvSpPr>
-            <a:spLocks noGrp="1" noRot="1" noChangeAspect="1"/>
-          </p:cNvSpPr>
-          <p:nvPr>
-            <p:ph type="sldImg"/>
-          </p:nvPr>
-        </p:nvSpPr>
-        <p:spPr/>
-      </p:sp>
-      <p:sp>
-        <p:nvSpPr>
-          <p:cNvPr id="3" name="Notes Placeholder 2">
-            <a:extLst>
-              <a:ext uri="{FF2B5EF4-FFF2-40B4-BE49-F238E27FC236}">
-                <a16:creationId xmlns:a16="http://schemas.microsoft.com/office/drawing/2014/main" id="{FE5A1B5A-E416-F326-041D-5E93436D74CF}"/>
-              </a:ext>
-            </a:extLst>
-          </p:cNvPr>
-          <p:cNvSpPr>
-            <a:spLocks noGrp="1"/>
-          </p:cNvSpPr>
-          <p:nvPr>
-            <p:ph type="body" idx="1"/>
-          </p:nvPr>
-        </p:nvSpPr>
-        <p:spPr/>
-        <p:txBody>
-          <a:bodyPr/>
-          <a:lstStyle/>
-          <a:p>
-            <a:pPr>
-              <a:buNone/>
-            </a:pPr>
-            <a:r>
-              <a:rPr lang="vi-VN" dirty="0"/>
-              <a:t>w có thể được hiểu là một </a:t>
-            </a:r>
-            <a:r>
-              <a:rPr lang="vi-VN" b="1" dirty="0"/>
-              <a:t>kernel</a:t>
-            </a:r>
-            <a:r>
-              <a:rPr lang="vi-VN" dirty="0"/>
-              <a:t> có vai trò như một bộ lọc hoặc cửa sổ. Nếu w chứa các giá trị như [0.5, 0.5, -0.5, -0.5], nó có thể giúp tạo ra sự khác biệt giữa các nhóm dữ liệu theo cách mà sự thay đổi mạnh mẽ trong stat sẽ bị làm mượt hoặc ổn định khi áp dụng.</a:t>
-            </a:r>
-          </a:p>
-          <a:p>
-            <a:pPr>
-              <a:buFont typeface="Arial" panose="020B0604020202020204" pitchFamily="34" charset="0"/>
-              <a:buChar char="•"/>
-            </a:pPr>
-            <a:r>
-              <a:rPr lang="vi-VN" b="1" dirty="0"/>
-              <a:t>Cửa sổ (Windowing):</a:t>
-            </a:r>
-            <a:r>
-              <a:rPr lang="vi-VN" dirty="0"/>
-              <a:t> w có thể là một </a:t>
-            </a:r>
-            <a:r>
-              <a:rPr lang="vi-VN" b="1" dirty="0"/>
-              <a:t>cửa sổ trượt</a:t>
-            </a:r>
-            <a:r>
-              <a:rPr lang="vi-VN" dirty="0"/>
-              <a:t> giúp kiểm tra các phần của dữ liệu. Việc chập stat với w giúp tính toán một giá trị trung bình có trọng số của các giá trị xung quanh, loại bỏ những thay đổi đột ngột không đáng kể.</a:t>
-            </a:r>
-          </a:p>
-          <a:p>
-            <a:pPr>
-              <a:buFont typeface="Arial" panose="020B0604020202020204" pitchFamily="34" charset="0"/>
-              <a:buChar char="•"/>
-            </a:pPr>
-            <a:r>
-              <a:rPr lang="vi-VN" b="1" dirty="0"/>
-              <a:t>Phân tích chuỗi thời gian (Time series analysis):</a:t>
-            </a:r>
-            <a:r>
-              <a:rPr lang="vi-VN" dirty="0"/>
-              <a:t> Trong các bài toán chuỗi thời gian, việc </a:t>
-            </a:r>
-            <a:r>
-              <a:rPr lang="vi-VN" b="1" dirty="0"/>
-              <a:t>chập (smoothing)</a:t>
-            </a:r>
-            <a:r>
-              <a:rPr lang="vi-VN" dirty="0"/>
-              <a:t> với một kernel có thể giúp giảm sự biến động ngẫu nhiên và làm nổi bật các xu hướng chính.</a:t>
-            </a:r>
-          </a:p>
-          <a:p>
-            <a:endParaRPr lang="en-US" dirty="0"/>
-          </a:p>
-        </p:txBody>
-      </p:sp>
-      <p:sp>
-        <p:nvSpPr>
-          <p:cNvPr id="4" name="Slide Number Placeholder 3">
-            <a:extLst>
-              <a:ext uri="{FF2B5EF4-FFF2-40B4-BE49-F238E27FC236}">
-                <a16:creationId xmlns:a16="http://schemas.microsoft.com/office/drawing/2014/main" id="{A94C80D8-DE8C-1E3B-D950-A93A098F967D}"/>
-              </a:ext>
-            </a:extLst>
-          </p:cNvPr>
-          <p:cNvSpPr>
-            <a:spLocks noGrp="1"/>
-          </p:cNvSpPr>
-          <p:nvPr>
-            <p:ph type="sldNum" sz="quarter" idx="5"/>
-          </p:nvPr>
-        </p:nvSpPr>
-        <p:spPr/>
-        <p:txBody>
-          <a:bodyPr/>
-          <a:lstStyle/>
-          <a:p>
-            <a:fld id="{AA1D0AE7-02E7-4ECD-8A34-B5A5CCDA1321}" type="slidenum">
-              <a:rPr lang="en-US" smtClean="0"/>
-              <a:t>20</a:t>
-            </a:fld>
-            <a:endParaRPr lang="en-US"/>
-          </a:p>
-        </p:txBody>
-      </p:sp>
-    </p:spTree>
-    <p:extLst>
-      <p:ext uri="{BB962C8B-B14F-4D97-AF65-F5344CB8AC3E}">
-        <p14:creationId xmlns:p14="http://schemas.microsoft.com/office/powerpoint/2010/main" val="164317339"/>
       </p:ext>
     </p:extLst>
   </p:cSld>
@@ -1637,7 +1855,7 @@
           <a:p>
             <a:fld id="{729DB911-48E5-4251-B130-A1A5C205802B}" type="datetimeFigureOut">
               <a:rPr lang="en-US" smtClean="0"/>
-              <a:t>5/11/2025</a:t>
+              <a:t>5/12/2025</a:t>
             </a:fld>
             <a:endParaRPr lang="en-US"/>
           </a:p>
@@ -1835,7 +2053,7 @@
           <a:p>
             <a:fld id="{729DB911-48E5-4251-B130-A1A5C205802B}" type="datetimeFigureOut">
               <a:rPr lang="en-US" smtClean="0"/>
-              <a:t>5/11/2025</a:t>
+              <a:t>5/12/2025</a:t>
             </a:fld>
             <a:endParaRPr lang="en-US"/>
           </a:p>
@@ -2043,7 +2261,7 @@
           <a:p>
             <a:fld id="{729DB911-48E5-4251-B130-A1A5C205802B}" type="datetimeFigureOut">
               <a:rPr lang="en-US" smtClean="0"/>
-              <a:t>5/11/2025</a:t>
+              <a:t>5/12/2025</a:t>
             </a:fld>
             <a:endParaRPr lang="en-US"/>
           </a:p>
@@ -2241,7 +2459,7 @@
           <a:p>
             <a:fld id="{729DB911-48E5-4251-B130-A1A5C205802B}" type="datetimeFigureOut">
               <a:rPr lang="en-US" smtClean="0"/>
-              <a:t>5/11/2025</a:t>
+              <a:t>5/12/2025</a:t>
             </a:fld>
             <a:endParaRPr lang="en-US"/>
           </a:p>
@@ -2516,7 +2734,7 @@
           <a:p>
             <a:fld id="{729DB911-48E5-4251-B130-A1A5C205802B}" type="datetimeFigureOut">
               <a:rPr lang="en-US" smtClean="0"/>
-              <a:t>5/11/2025</a:t>
+              <a:t>5/12/2025</a:t>
             </a:fld>
             <a:endParaRPr lang="en-US"/>
           </a:p>
@@ -2781,7 +2999,7 @@
           <a:p>
             <a:fld id="{729DB911-48E5-4251-B130-A1A5C205802B}" type="datetimeFigureOut">
               <a:rPr lang="en-US" smtClean="0"/>
-              <a:t>5/11/2025</a:t>
+              <a:t>5/12/2025</a:t>
             </a:fld>
             <a:endParaRPr lang="en-US"/>
           </a:p>
@@ -3193,7 +3411,7 @@
           <a:p>
             <a:fld id="{729DB911-48E5-4251-B130-A1A5C205802B}" type="datetimeFigureOut">
               <a:rPr lang="en-US" smtClean="0"/>
-              <a:t>5/11/2025</a:t>
+              <a:t>5/12/2025</a:t>
             </a:fld>
             <a:endParaRPr lang="en-US"/>
           </a:p>
@@ -3334,7 +3552,7 @@
           <a:p>
             <a:fld id="{729DB911-48E5-4251-B130-A1A5C205802B}" type="datetimeFigureOut">
               <a:rPr lang="en-US" smtClean="0"/>
-              <a:t>5/11/2025</a:t>
+              <a:t>5/12/2025</a:t>
             </a:fld>
             <a:endParaRPr lang="en-US"/>
           </a:p>
@@ -3447,7 +3665,7 @@
           <a:p>
             <a:fld id="{729DB911-48E5-4251-B130-A1A5C205802B}" type="datetimeFigureOut">
               <a:rPr lang="en-US" smtClean="0"/>
-              <a:t>5/11/2025</a:t>
+              <a:t>5/12/2025</a:t>
             </a:fld>
             <a:endParaRPr lang="en-US"/>
           </a:p>
@@ -3758,7 +3976,7 @@
           <a:p>
             <a:fld id="{729DB911-48E5-4251-B130-A1A5C205802B}" type="datetimeFigureOut">
               <a:rPr lang="en-US" smtClean="0"/>
-              <a:t>5/11/2025</a:t>
+              <a:t>5/12/2025</a:t>
             </a:fld>
             <a:endParaRPr lang="en-US"/>
           </a:p>
@@ -4046,7 +4264,7 @@
           <a:p>
             <a:fld id="{729DB911-48E5-4251-B130-A1A5C205802B}" type="datetimeFigureOut">
               <a:rPr lang="en-US" smtClean="0"/>
-              <a:t>5/11/2025</a:t>
+              <a:t>5/12/2025</a:t>
             </a:fld>
             <a:endParaRPr lang="en-US"/>
           </a:p>
@@ -4287,7 +4505,7 @@
           <a:p>
             <a:fld id="{729DB911-48E5-4251-B130-A1A5C205802B}" type="datetimeFigureOut">
               <a:rPr lang="en-US" smtClean="0"/>
-              <a:t>5/11/2025</a:t>
+              <a:t>5/12/2025</a:t>
             </a:fld>
             <a:endParaRPr lang="en-US"/>
           </a:p>
@@ -5084,7 +5302,7 @@
             <p:spPr/>
             <p:txBody>
               <a:bodyPr>
-                <a:normAutofit fontScale="92500" lnSpcReduction="10000"/>
+                <a:normAutofit fontScale="70000" lnSpcReduction="20000"/>
               </a:bodyPr>
               <a:lstStyle/>
               <a:p>
@@ -5159,6 +5377,232 @@
                 </a:endParaRPr>
               </a:p>
               <a:p>
+                <a:pPr marL="0" indent="0">
+                  <a:buNone/>
+                </a:pPr>
+                <a14:m>
+                  <m:oMathPara xmlns:m="http://schemas.openxmlformats.org/officeDocument/2006/math">
+                    <m:oMathParaPr>
+                      <m:jc m:val="center"/>
+                    </m:oMathParaPr>
+                    <m:oMath xmlns:m="http://schemas.openxmlformats.org/officeDocument/2006/math">
+                      <m:r>
+                        <a:rPr lang="en-US" b="0" i="1" smtClean="0">
+                          <a:latin typeface="Cambria Math" panose="02040503050406030204" pitchFamily="18" charset="0"/>
+                        </a:rPr>
+                        <m:t>𝑤</m:t>
+                      </m:r>
+                      <m:d>
+                        <m:dPr>
+                          <m:ctrlPr>
+                            <a:rPr lang="en-US" b="0" i="1" smtClean="0">
+                              <a:latin typeface="Cambria Math" panose="02040503050406030204" pitchFamily="18" charset="0"/>
+                            </a:rPr>
+                          </m:ctrlPr>
+                        </m:dPr>
+                        <m:e>
+                          <m:r>
+                            <a:rPr lang="en-US" b="0" i="1" smtClean="0">
+                              <a:latin typeface="Cambria Math" panose="02040503050406030204" pitchFamily="18" charset="0"/>
+                            </a:rPr>
+                            <m:t>𝑡</m:t>
+                          </m:r>
+                        </m:e>
+                      </m:d>
+                      <m:r>
+                        <a:rPr lang="en-US" b="0" i="1" smtClean="0">
+                          <a:latin typeface="Cambria Math" panose="02040503050406030204" pitchFamily="18" charset="0"/>
+                        </a:rPr>
+                        <m:t>= </m:t>
+                      </m:r>
+                      <m:d>
+                        <m:dPr>
+                          <m:begChr m:val="{"/>
+                          <m:endChr m:val=""/>
+                          <m:ctrlPr>
+                            <a:rPr lang="en-US" b="0" i="1" smtClean="0">
+                              <a:latin typeface="Cambria Math" panose="02040503050406030204" pitchFamily="18" charset="0"/>
+                            </a:rPr>
+                          </m:ctrlPr>
+                        </m:dPr>
+                        <m:e>
+                          <m:eqArr>
+                            <m:eqArrPr>
+                              <m:ctrlPr>
+                                <a:rPr lang="en-US" b="0" i="1" smtClean="0">
+                                  <a:latin typeface="Cambria Math" panose="02040503050406030204" pitchFamily="18" charset="0"/>
+                                </a:rPr>
+                              </m:ctrlPr>
+                            </m:eqArrPr>
+                            <m:e>
+                              <m:f>
+                                <m:fPr>
+                                  <m:ctrlPr>
+                                    <a:rPr lang="en-US" b="0" i="1" smtClean="0">
+                                      <a:latin typeface="Cambria Math" panose="02040503050406030204" pitchFamily="18" charset="0"/>
+                                    </a:rPr>
+                                  </m:ctrlPr>
+                                </m:fPr>
+                                <m:num>
+                                  <m:r>
+                                    <a:rPr lang="en-US" b="0" i="1" smtClean="0">
+                                      <a:latin typeface="Cambria Math" panose="02040503050406030204" pitchFamily="18" charset="0"/>
+                                    </a:rPr>
+                                    <m:t>−1</m:t>
+                                  </m:r>
+                                </m:num>
+                                <m:den>
+                                  <m:r>
+                                    <a:rPr lang="en-US" b="0" i="1" smtClean="0">
+                                      <a:latin typeface="Cambria Math" panose="02040503050406030204" pitchFamily="18" charset="0"/>
+                                    </a:rPr>
+                                    <m:t>𝑙</m:t>
+                                  </m:r>
+                                </m:den>
+                              </m:f>
+                              <m:r>
+                                <a:rPr lang="en-US" b="0" i="1" smtClean="0">
+                                  <a:latin typeface="Cambria Math" panose="02040503050406030204" pitchFamily="18" charset="0"/>
+                                </a:rPr>
+                                <m:t> </m:t>
+                              </m:r>
+                              <m:r>
+                                <a:rPr lang="en-US" b="0" i="1" smtClean="0">
+                                  <a:latin typeface="Cambria Math" panose="02040503050406030204" pitchFamily="18" charset="0"/>
+                                </a:rPr>
+                                <m:t>𝑓𝑜𝑟</m:t>
+                              </m:r>
+                              <m:r>
+                                <a:rPr lang="en-US" b="0" i="1" smtClean="0">
+                                  <a:latin typeface="Cambria Math" panose="02040503050406030204" pitchFamily="18" charset="0"/>
+                                </a:rPr>
+                                <m:t> −2</m:t>
+                              </m:r>
+                              <m:r>
+                                <a:rPr lang="en-US" b="0" i="1" smtClean="0">
+                                  <a:latin typeface="Cambria Math" panose="02040503050406030204" pitchFamily="18" charset="0"/>
+                                </a:rPr>
+                                <m:t>𝑙</m:t>
+                              </m:r>
+                              <m:r>
+                                <a:rPr lang="en-US" b="0" i="1" smtClean="0">
+                                  <a:latin typeface="Cambria Math" panose="02040503050406030204" pitchFamily="18" charset="0"/>
+                                </a:rPr>
+                                <m:t> ≤</m:t>
+                              </m:r>
+                              <m:r>
+                                <a:rPr lang="en-US" b="0" i="1" smtClean="0">
+                                  <a:latin typeface="Cambria Math" panose="02040503050406030204" pitchFamily="18" charset="0"/>
+                                  <a:ea typeface="Cambria Math" panose="02040503050406030204" pitchFamily="18" charset="0"/>
+                                </a:rPr>
+                                <m:t>𝑡</m:t>
+                              </m:r>
+                              <m:r>
+                                <a:rPr lang="en-US" b="0" i="1" smtClean="0">
+                                  <a:latin typeface="Cambria Math" panose="02040503050406030204" pitchFamily="18" charset="0"/>
+                                  <a:ea typeface="Cambria Math" panose="02040503050406030204" pitchFamily="18" charset="0"/>
+                                </a:rPr>
+                                <m:t> &lt;−</m:t>
+                              </m:r>
+                              <m:r>
+                                <a:rPr lang="en-US" b="0" i="1" smtClean="0">
+                                  <a:latin typeface="Cambria Math" panose="02040503050406030204" pitchFamily="18" charset="0"/>
+                                  <a:ea typeface="Cambria Math" panose="02040503050406030204" pitchFamily="18" charset="0"/>
+                                </a:rPr>
+                                <m:t>𝑙</m:t>
+                              </m:r>
+                            </m:e>
+                            <m:e>
+                              <m:f>
+                                <m:fPr>
+                                  <m:ctrlPr>
+                                    <a:rPr lang="en-US" i="1">
+                                      <a:latin typeface="Cambria Math" panose="02040503050406030204" pitchFamily="18" charset="0"/>
+                                    </a:rPr>
+                                  </m:ctrlPr>
+                                </m:fPr>
+                                <m:num>
+                                  <m:r>
+                                    <a:rPr lang="en-US" i="1">
+                                      <a:latin typeface="Cambria Math" panose="02040503050406030204" pitchFamily="18" charset="0"/>
+                                    </a:rPr>
+                                    <m:t>−1</m:t>
+                                  </m:r>
+                                </m:num>
+                                <m:den>
+                                  <m:r>
+                                    <a:rPr lang="en-US" i="1">
+                                      <a:latin typeface="Cambria Math" panose="02040503050406030204" pitchFamily="18" charset="0"/>
+                                    </a:rPr>
+                                    <m:t>𝑙</m:t>
+                                  </m:r>
+                                </m:den>
+                              </m:f>
+                              <m:r>
+                                <a:rPr lang="en-US" b="0" i="1" smtClean="0">
+                                  <a:latin typeface="Cambria Math" panose="02040503050406030204" pitchFamily="18" charset="0"/>
+                                </a:rPr>
+                                <m:t>     </m:t>
+                              </m:r>
+                              <m:r>
+                                <a:rPr lang="en-US" b="0" i="1" smtClean="0">
+                                  <a:latin typeface="Cambria Math" panose="02040503050406030204" pitchFamily="18" charset="0"/>
+                                </a:rPr>
+                                <m:t>𝑓𝑜𝑟</m:t>
+                              </m:r>
+                              <m:r>
+                                <a:rPr lang="en-US" b="0" i="1" smtClean="0">
+                                  <a:latin typeface="Cambria Math" panose="02040503050406030204" pitchFamily="18" charset="0"/>
+                                </a:rPr>
+                                <m:t> −</m:t>
+                              </m:r>
+                              <m:r>
+                                <a:rPr lang="en-US" i="1">
+                                  <a:latin typeface="Cambria Math" panose="02040503050406030204" pitchFamily="18" charset="0"/>
+                                </a:rPr>
+                                <m:t>𝑙</m:t>
+                              </m:r>
+                              <m:r>
+                                <a:rPr lang="en-US" i="1">
+                                  <a:latin typeface="Cambria Math" panose="02040503050406030204" pitchFamily="18" charset="0"/>
+                                </a:rPr>
+                                <m:t> ≤</m:t>
+                              </m:r>
+                              <m:r>
+                                <a:rPr lang="en-US" i="1">
+                                  <a:latin typeface="Cambria Math" panose="02040503050406030204" pitchFamily="18" charset="0"/>
+                                  <a:ea typeface="Cambria Math" panose="02040503050406030204" pitchFamily="18" charset="0"/>
+                                </a:rPr>
+                                <m:t>𝑡</m:t>
+                              </m:r>
+                              <m:r>
+                                <a:rPr lang="en-US" i="1">
+                                  <a:latin typeface="Cambria Math" panose="02040503050406030204" pitchFamily="18" charset="0"/>
+                                  <a:ea typeface="Cambria Math" panose="02040503050406030204" pitchFamily="18" charset="0"/>
+                                </a:rPr>
+                                <m:t> &lt;0</m:t>
+                              </m:r>
+                            </m:e>
+                            <m:e>
+                              <m:r>
+                                <a:rPr lang="en-US" b="0" i="1" smtClean="0">
+                                  <a:latin typeface="Cambria Math" panose="02040503050406030204" pitchFamily="18" charset="0"/>
+                                </a:rPr>
+                                <m:t>0                  </m:t>
+                              </m:r>
+                              <m:r>
+                                <a:rPr lang="en-US" b="0" i="1" smtClean="0">
+                                  <a:latin typeface="Cambria Math" panose="02040503050406030204" pitchFamily="18" charset="0"/>
+                                </a:rPr>
+                                <m:t>𝑜𝑡h𝑒𝑟𝑤𝑖𝑠𝑒</m:t>
+                              </m:r>
+                            </m:e>
+                          </m:eqArr>
+                        </m:e>
+                      </m:d>
+                    </m:oMath>
+                  </m:oMathPara>
+                </a14:m>
                 <a:endParaRPr lang="vi-VN" dirty="0">
                   <a:latin typeface="Arial (Body)"/>
                 </a:endParaRPr>
@@ -5271,7 +5715,7 @@
               <a:blipFill>
                 <a:blip r:embed="rId2"/>
                 <a:stretch>
-                  <a:fillRect l="-928" t="-3081" r="-1275"/>
+                  <a:fillRect l="-522" t="-2661"/>
                 </a:stretch>
               </a:blipFill>
             </p:spPr>
@@ -5290,36 +5734,6 @@
           </p:sp>
         </mc:Fallback>
       </mc:AlternateContent>
-      <p:pic>
-        <p:nvPicPr>
-          <p:cNvPr id="8" name="Picture 7">
-            <a:extLst>
-              <a:ext uri="{FF2B5EF4-FFF2-40B4-BE49-F238E27FC236}">
-                <a16:creationId xmlns:a16="http://schemas.microsoft.com/office/drawing/2014/main" id="{373F909B-0DB1-A8F6-6BE7-A65DB8ACBC70}"/>
-              </a:ext>
-            </a:extLst>
-          </p:cNvPr>
-          <p:cNvPicPr>
-            <a:picLocks noChangeAspect="1"/>
-          </p:cNvPicPr>
-          <p:nvPr/>
-        </p:nvPicPr>
-        <p:blipFill>
-          <a:blip r:embed="rId3"/>
-          <a:stretch>
-            <a:fillRect/>
-          </a:stretch>
-        </p:blipFill>
-        <p:spPr>
-          <a:xfrm>
-            <a:off x="3843818" y="3467614"/>
-            <a:ext cx="4504363" cy="1377739"/>
-          </a:xfrm>
-          <a:prstGeom prst="rect">
-            <a:avLst/>
-          </a:prstGeom>
-        </p:spPr>
-      </p:pic>
     </p:spTree>
     <p:extLst>
       <p:ext uri="{BB962C8B-B14F-4D97-AF65-F5344CB8AC3E}">
@@ -5441,7 +5855,22 @@
               <a:rPr lang="vi-VN" dirty="0">
                 <a:latin typeface="Arial (Body)"/>
               </a:rPr>
-              <a:t> to get the Kernel matrix (K) </a:t>
+              <a:t> to get the Kernel matrix (</a:t>
+            </a:r>
+            <a:r>
+              <a:rPr lang="vi-VN" dirty="0">
+                <a:solidFill>
+                  <a:srgbClr val="FF0000"/>
+                </a:solidFill>
+                <a:latin typeface="Arial (Body)"/>
+              </a:rPr>
+              <a:t>K</a:t>
+            </a:r>
+            <a:r>
+              <a:rPr lang="vi-VN" dirty="0">
+                <a:latin typeface="Arial (Body)"/>
+              </a:rPr>
+              <a:t>) </a:t>
             </a:r>
             <a:r>
               <a:rPr lang="vi-VN" b="1" dirty="0">
@@ -5467,7 +5896,37 @@
               <a:rPr lang="vi-VN" dirty="0">
                 <a:latin typeface="Arial (Body)"/>
               </a:rPr>
-              <a:t>Creating a weighted matrix (W) with a weigted function from previous (w) to make a sliding window.</a:t>
+              <a:t>Creating a weighted matrix (</a:t>
+            </a:r>
+            <a:r>
+              <a:rPr lang="vi-VN" dirty="0">
+                <a:solidFill>
+                  <a:srgbClr val="FF0000"/>
+                </a:solidFill>
+                <a:latin typeface="Arial (Body)"/>
+              </a:rPr>
+              <a:t>W</a:t>
+            </a:r>
+            <a:r>
+              <a:rPr lang="vi-VN" dirty="0">
+                <a:latin typeface="Arial (Body)"/>
+              </a:rPr>
+              <a:t>) with a weigted function from previous (</a:t>
+            </a:r>
+            <a:r>
+              <a:rPr lang="vi-VN" dirty="0">
+                <a:solidFill>
+                  <a:srgbClr val="FF0000"/>
+                </a:solidFill>
+                <a:latin typeface="Arial (Body)"/>
+              </a:rPr>
+              <a:t>w</a:t>
+            </a:r>
+            <a:r>
+              <a:rPr lang="vi-VN" dirty="0">
+                <a:latin typeface="Arial (Body)"/>
+              </a:rPr>
+              <a:t>) to make a sliding window.</a:t>
             </a:r>
           </a:p>
         </p:txBody>
@@ -8060,7 +8519,7 @@
         <p:spPr>
           <a:xfrm>
             <a:off x="838200" y="1837127"/>
-            <a:ext cx="10515600" cy="4351338"/>
+            <a:ext cx="10515600" cy="3081382"/>
           </a:xfrm>
         </p:spPr>
         <p:txBody>
@@ -8079,19 +8538,40 @@
           <a:p>
             <a:pPr lvl="1"/>
             <a:r>
+              <a:rPr lang="en-US" b="1" dirty="0">
+                <a:latin typeface="Arial (Body)"/>
+              </a:rPr>
+              <a:t>Multiplies</a:t>
+            </a:r>
+            <a:r>
               <a:rPr lang="en-US" dirty="0">
                 <a:latin typeface="Arial (Body)"/>
               </a:rPr>
-              <a:t>Multiplies the sliding window matrix (W) with the kernel matrix (K)</a:t>
-            </a:r>
-          </a:p>
-          <a:p>
-            <a:pPr lvl="1"/>
+              <a:t> the sliding window </a:t>
+            </a:r>
+            <a:r>
+              <a:rPr lang="en-US" b="1" dirty="0">
+                <a:solidFill>
+                  <a:srgbClr val="FF0000"/>
+                </a:solidFill>
+                <a:latin typeface="Arial (Body)"/>
+              </a:rPr>
+              <a:t>matrix (W)</a:t>
+            </a:r>
             <a:r>
               <a:rPr lang="en-US" dirty="0">
                 <a:latin typeface="Arial (Body)"/>
               </a:rPr>
-              <a:t>For each window position, this weights the kernel similarities between points.</a:t>
+              <a:t> with the </a:t>
+            </a:r>
+            <a:r>
+              <a:rPr lang="en-US" b="1" dirty="0">
+                <a:solidFill>
+                  <a:srgbClr val="FF0000"/>
+                </a:solidFill>
+                <a:latin typeface="Arial (Body)"/>
+              </a:rPr>
+              <a:t>kernel matrix (K)</a:t>
             </a:r>
           </a:p>
           <a:p>
@@ -8100,71 +8580,63 @@
               <a:rPr lang="en-US" dirty="0">
                 <a:latin typeface="Arial (Body)"/>
               </a:rPr>
-              <a:t>Computes element-wise multiplication followed by summation along rows</a:t>
-            </a:r>
-          </a:p>
-          <a:p>
-            <a:pPr lvl="1"/>
+              <a:t>For each window position, this </a:t>
+            </a:r>
+            <a:r>
+              <a:rPr lang="en-US" b="1" dirty="0">
+                <a:latin typeface="Arial (Body)"/>
+              </a:rPr>
+              <a:t>weights the kernel similarities between points</a:t>
+            </a:r>
             <a:r>
               <a:rPr lang="en-US" dirty="0">
                 <a:latin typeface="Arial (Body)"/>
               </a:rPr>
-              <a:t>For each window position </a:t>
-            </a:r>
-            <a:r>
-              <a:rPr lang="en-US" dirty="0" err="1">
-                <a:latin typeface="Arial (Body)"/>
-              </a:rPr>
-              <a:t>i</a:t>
-            </a:r>
+              <a:t>.</a:t>
+            </a:r>
+          </a:p>
+          <a:p>
+            <a:pPr lvl="1"/>
             <a:r>
               <a:rPr lang="en-US" dirty="0">
                 <a:latin typeface="Arial (Body)"/>
               </a:rPr>
-              <a:t>, it calculates: </a:t>
-            </a:r>
-            <a:r>
-              <a:rPr lang="en-US" dirty="0" err="1">
+              <a:t>Computes element-wise multiplication followed by summation along </a:t>
+            </a:r>
+            <a:r>
+              <a:rPr lang="vi-VN" dirty="0">
                 <a:latin typeface="Arial (Body)"/>
               </a:rPr>
-              <a:t>Σ_j</a:t>
+              <a:t>rows.</a:t>
+            </a:r>
+          </a:p>
+          <a:p>
+            <a:pPr marL="0" indent="0" algn="ctr">
+              <a:buNone/>
+            </a:pPr>
+            <a:r>
+              <a:rPr lang="vi-VN" dirty="0"/>
+              <a:t>Stat[i] = (W </a:t>
+            </a:r>
+            <a:r>
+              <a:rPr lang="vi-VN" dirty="0">
+                <a:latin typeface="Arial (Body)"/>
+              </a:rPr>
+              <a:t>K)</a:t>
+            </a:r>
+            <a:r>
+              <a:rPr lang="vi-VN" dirty="0"/>
+              <a:t> W</a:t>
             </a:r>
             <a:r>
               <a:rPr lang="en-US" dirty="0">
                 <a:latin typeface="Arial (Body)"/>
               </a:rPr>
-              <a:t> (WK)_</a:t>
-            </a:r>
-            <a:r>
-              <a:rPr lang="en-US" dirty="0" err="1">
-                <a:latin typeface="Arial (Body)"/>
-              </a:rPr>
-              <a:t>ij</a:t>
-            </a:r>
-            <a:r>
-              <a:rPr lang="en-US" dirty="0">
-                <a:latin typeface="Arial (Body)"/>
-              </a:rPr>
-              <a:t> </a:t>
-            </a:r>
-            <a:r>
-              <a:rPr lang="en-US" dirty="0" err="1">
-                <a:latin typeface="Arial (Body)"/>
-              </a:rPr>
-              <a:t>W_ij</a:t>
-            </a:r>
-            <a:endParaRPr lang="en-US" dirty="0">
+              <a:t>ᵀ</a:t>
+            </a:r>
+            <a:endParaRPr lang="vi-VN" dirty="0">
               <a:latin typeface="Arial (Body)"/>
             </a:endParaRPr>
-          </a:p>
-          <a:p>
-            <a:pPr lvl="1"/>
-            <a:r>
-              <a:rPr lang="en-US" dirty="0">
-                <a:latin typeface="Arial (Body)"/>
-              </a:rPr>
-              <a:t>Result: A vector of length (n-2l1) containing test statistics</a:t>
-            </a:r>
           </a:p>
         </p:txBody>
       </p:sp>
@@ -8183,6 +8655,357 @@
 
 <file path=ppt/slides/slide15.xml><?xml version="1.0" encoding="utf-8"?>
 <p:sld xmlns:a="http://schemas.openxmlformats.org/drawingml/2006/main" xmlns:r="http://schemas.openxmlformats.org/officeDocument/2006/relationships" xmlns:p="http://schemas.openxmlformats.org/presentationml/2006/main">
+  <p:cSld>
+    <p:spTree>
+      <p:nvGrpSpPr>
+        <p:cNvPr id="1" name="">
+          <a:extLst>
+            <a:ext uri="{FF2B5EF4-FFF2-40B4-BE49-F238E27FC236}">
+              <a16:creationId xmlns:a16="http://schemas.microsoft.com/office/drawing/2014/main" id="{8733DE09-92C6-0A57-1C9F-B386A9CE7925}"/>
+            </a:ext>
+          </a:extLst>
+        </p:cNvPr>
+        <p:cNvGrpSpPr/>
+        <p:nvPr/>
+      </p:nvGrpSpPr>
+      <p:grpSpPr>
+        <a:xfrm>
+          <a:off x="0" y="0"/>
+          <a:ext cx="0" cy="0"/>
+          <a:chOff x="0" y="0"/>
+          <a:chExt cx="0" cy="0"/>
+        </a:xfrm>
+      </p:grpSpPr>
+      <p:sp>
+        <p:nvSpPr>
+          <p:cNvPr id="2" name="Title 1">
+            <a:extLst>
+              <a:ext uri="{FF2B5EF4-FFF2-40B4-BE49-F238E27FC236}">
+                <a16:creationId xmlns:a16="http://schemas.microsoft.com/office/drawing/2014/main" id="{C05D22E2-67E0-01E4-FBCF-C85246116D20}"/>
+              </a:ext>
+            </a:extLst>
+          </p:cNvPr>
+          <p:cNvSpPr>
+            <a:spLocks noGrp="1"/>
+          </p:cNvSpPr>
+          <p:nvPr>
+            <p:ph type="title"/>
+          </p:nvPr>
+        </p:nvSpPr>
+        <p:spPr/>
+        <p:txBody>
+          <a:bodyPr/>
+          <a:lstStyle/>
+          <a:p>
+            <a:r>
+              <a:rPr lang="en-US" dirty="0" err="1"/>
+              <a:t>ShapeDD</a:t>
+            </a:r>
+            <a:endParaRPr lang="en-US" dirty="0"/>
+          </a:p>
+        </p:txBody>
+      </p:sp>
+      <p:sp>
+        <p:nvSpPr>
+          <p:cNvPr id="3" name="Content Placeholder 2">
+            <a:extLst>
+              <a:ext uri="{FF2B5EF4-FFF2-40B4-BE49-F238E27FC236}">
+                <a16:creationId xmlns:a16="http://schemas.microsoft.com/office/drawing/2014/main" id="{F70454AF-6500-7789-5EC1-394CD028CCCE}"/>
+              </a:ext>
+            </a:extLst>
+          </p:cNvPr>
+          <p:cNvSpPr>
+            <a:spLocks noGrp="1"/>
+          </p:cNvSpPr>
+          <p:nvPr>
+            <p:ph idx="1"/>
+          </p:nvPr>
+        </p:nvSpPr>
+        <p:spPr>
+          <a:xfrm>
+            <a:off x="838200" y="1837127"/>
+            <a:ext cx="10515600" cy="4351338"/>
+          </a:xfrm>
+        </p:spPr>
+        <p:txBody>
+          <a:bodyPr>
+            <a:normAutofit/>
+          </a:bodyPr>
+          <a:lstStyle/>
+          <a:p>
+            <a:r>
+              <a:rPr lang="en-US" dirty="0">
+                <a:latin typeface="Arial (Body)"/>
+              </a:rPr>
+              <a:t>Statistical meaning:</a:t>
+            </a:r>
+          </a:p>
+          <a:p>
+            <a:pPr lvl="1"/>
+            <a:r>
+              <a:rPr lang="en-US" dirty="0">
+                <a:latin typeface="Arial (Body)"/>
+              </a:rPr>
+              <a:t>This operation computes a </a:t>
+            </a:r>
+            <a:r>
+              <a:rPr lang="en-US" b="1" dirty="0">
+                <a:latin typeface="Arial (Body)"/>
+              </a:rPr>
+              <a:t>quadratic form </a:t>
+            </a:r>
+            <a:r>
+              <a:rPr lang="en-US" dirty="0">
+                <a:latin typeface="Arial (Body)"/>
+              </a:rPr>
+              <a:t>that represents the </a:t>
+            </a:r>
+            <a:r>
+              <a:rPr lang="en-US" b="1" dirty="0">
+                <a:latin typeface="Arial (Body)"/>
+              </a:rPr>
+              <a:t>MMD (Maximum Mean Discrepancy)</a:t>
+            </a:r>
+            <a:r>
+              <a:rPr lang="en-US" dirty="0">
+                <a:latin typeface="Arial (Body)"/>
+              </a:rPr>
+              <a:t> statistic:</a:t>
+            </a:r>
+          </a:p>
+          <a:p>
+            <a:pPr lvl="1"/>
+            <a:r>
+              <a:rPr lang="en-US" dirty="0">
+                <a:latin typeface="Arial (Body)"/>
+              </a:rPr>
+              <a:t>In matrix notation, it calculates </a:t>
+            </a:r>
+            <a:r>
+              <a:rPr lang="en-US" dirty="0" err="1">
+                <a:latin typeface="Arial (Body)"/>
+              </a:rPr>
+              <a:t>wᵀKw</a:t>
+            </a:r>
+            <a:r>
+              <a:rPr lang="en-US" dirty="0">
+                <a:latin typeface="Arial (Body)"/>
+              </a:rPr>
+              <a:t> for each window position, where:</a:t>
+            </a:r>
+          </a:p>
+          <a:p>
+            <a:pPr lvl="2"/>
+            <a:r>
+              <a:rPr lang="en-US" dirty="0">
+                <a:latin typeface="Arial (Body)"/>
+              </a:rPr>
+              <a:t>w is a row of the W matrix (the weights for that window)</a:t>
+            </a:r>
+          </a:p>
+          <a:p>
+            <a:pPr lvl="2"/>
+            <a:r>
+              <a:rPr lang="en-US" dirty="0">
+                <a:latin typeface="Arial (Body)"/>
+              </a:rPr>
+              <a:t>K is the kernel matrix (similarity between all data points)</a:t>
+            </a:r>
+          </a:p>
+        </p:txBody>
+      </p:sp>
+    </p:spTree>
+    <p:extLst>
+      <p:ext uri="{BB962C8B-B14F-4D97-AF65-F5344CB8AC3E}">
+        <p14:creationId xmlns:p14="http://schemas.microsoft.com/office/powerpoint/2010/main" val="2082856447"/>
+      </p:ext>
+    </p:extLst>
+  </p:cSld>
+  <p:clrMapOvr>
+    <a:masterClrMapping/>
+  </p:clrMapOvr>
+</p:sld>
+</file>
+
+<file path=ppt/slides/slide16.xml><?xml version="1.0" encoding="utf-8"?>
+<p:sld xmlns:a="http://schemas.openxmlformats.org/drawingml/2006/main" xmlns:r="http://schemas.openxmlformats.org/officeDocument/2006/relationships" xmlns:p="http://schemas.openxmlformats.org/presentationml/2006/main">
+  <p:cSld>
+    <p:spTree>
+      <p:nvGrpSpPr>
+        <p:cNvPr id="1" name="">
+          <a:extLst>
+            <a:ext uri="{FF2B5EF4-FFF2-40B4-BE49-F238E27FC236}">
+              <a16:creationId xmlns:a16="http://schemas.microsoft.com/office/drawing/2014/main" id="{126D48EC-F468-C21B-998B-869089929BB3}"/>
+            </a:ext>
+          </a:extLst>
+        </p:cNvPr>
+        <p:cNvGrpSpPr/>
+        <p:nvPr/>
+      </p:nvGrpSpPr>
+      <p:grpSpPr>
+        <a:xfrm>
+          <a:off x="0" y="0"/>
+          <a:ext cx="0" cy="0"/>
+          <a:chOff x="0" y="0"/>
+          <a:chExt cx="0" cy="0"/>
+        </a:xfrm>
+      </p:grpSpPr>
+      <p:sp>
+        <p:nvSpPr>
+          <p:cNvPr id="2" name="Title 1">
+            <a:extLst>
+              <a:ext uri="{FF2B5EF4-FFF2-40B4-BE49-F238E27FC236}">
+                <a16:creationId xmlns:a16="http://schemas.microsoft.com/office/drawing/2014/main" id="{386AF4C5-417E-4B21-35D4-E7A8F08BA7D4}"/>
+              </a:ext>
+            </a:extLst>
+          </p:cNvPr>
+          <p:cNvSpPr>
+            <a:spLocks noGrp="1"/>
+          </p:cNvSpPr>
+          <p:nvPr>
+            <p:ph type="title"/>
+          </p:nvPr>
+        </p:nvSpPr>
+        <p:spPr/>
+        <p:txBody>
+          <a:bodyPr/>
+          <a:lstStyle/>
+          <a:p>
+            <a:r>
+              <a:rPr lang="en-US"/>
+              <a:t>ShapeDD</a:t>
+            </a:r>
+            <a:endParaRPr lang="en-US" dirty="0"/>
+          </a:p>
+        </p:txBody>
+      </p:sp>
+      <p:sp>
+        <p:nvSpPr>
+          <p:cNvPr id="3" name="Content Placeholder 2">
+            <a:extLst>
+              <a:ext uri="{FF2B5EF4-FFF2-40B4-BE49-F238E27FC236}">
+                <a16:creationId xmlns:a16="http://schemas.microsoft.com/office/drawing/2014/main" id="{87DC171E-62A0-AC1E-7EB0-FC764C4256F7}"/>
+              </a:ext>
+            </a:extLst>
+          </p:cNvPr>
+          <p:cNvSpPr>
+            <a:spLocks noGrp="1"/>
+          </p:cNvSpPr>
+          <p:nvPr>
+            <p:ph idx="1"/>
+          </p:nvPr>
+        </p:nvSpPr>
+        <p:spPr>
+          <a:xfrm>
+            <a:off x="838200" y="1837127"/>
+            <a:ext cx="10515600" cy="4351338"/>
+          </a:xfrm>
+        </p:spPr>
+        <p:txBody>
+          <a:bodyPr>
+            <a:normAutofit/>
+          </a:bodyPr>
+          <a:lstStyle/>
+          <a:p>
+            <a:r>
+              <a:rPr lang="en-US" dirty="0">
+                <a:latin typeface="Arial (Body)"/>
+              </a:rPr>
+              <a:t>Statistical meaning:</a:t>
+            </a:r>
+          </a:p>
+          <a:p>
+            <a:pPr lvl="1"/>
+            <a:r>
+              <a:rPr lang="en-US" dirty="0">
+                <a:latin typeface="Arial (Body)"/>
+              </a:rPr>
+              <a:t>Since the weights sum to zero and are +1/l1 for the first half and -1/l1 for the second half:</a:t>
+            </a:r>
+          </a:p>
+          <a:p>
+            <a:pPr lvl="2"/>
+            <a:r>
+              <a:rPr lang="en-US" dirty="0">
+                <a:latin typeface="Arial (Body)"/>
+              </a:rPr>
+              <a:t>Positive values in the kernel between similar points in the same half contribute positively</a:t>
+            </a:r>
+          </a:p>
+          <a:p>
+            <a:pPr lvl="2"/>
+            <a:r>
+              <a:rPr lang="en-US" dirty="0">
+                <a:latin typeface="Arial (Body)"/>
+              </a:rPr>
+              <a:t>Positive values in the kernel between points in different halves contribute negatively</a:t>
+            </a:r>
+          </a:p>
+          <a:p>
+            <a:pPr lvl="1"/>
+            <a:r>
+              <a:rPr lang="en-US" dirty="0">
+                <a:latin typeface="Arial (Body)"/>
+              </a:rPr>
+              <a:t>This effectively measures how much more similar points are within each half compared to across </a:t>
+            </a:r>
+            <a:r>
+              <a:rPr lang="vi-VN" dirty="0">
+                <a:latin typeface="Arial (Body)"/>
+              </a:rPr>
+              <a:t>halves.</a:t>
+            </a:r>
+            <a:endParaRPr lang="en-US" dirty="0">
+              <a:latin typeface="Arial (Body)"/>
+            </a:endParaRPr>
+          </a:p>
+        </p:txBody>
+      </p:sp>
+      <p:pic>
+        <p:nvPicPr>
+          <p:cNvPr id="5" name="Picture 4">
+            <a:extLst>
+              <a:ext uri="{FF2B5EF4-FFF2-40B4-BE49-F238E27FC236}">
+                <a16:creationId xmlns:a16="http://schemas.microsoft.com/office/drawing/2014/main" id="{8DCB344C-F77B-7C3D-2256-644AF0A7E504}"/>
+              </a:ext>
+            </a:extLst>
+          </p:cNvPr>
+          <p:cNvPicPr>
+            <a:picLocks noChangeAspect="1"/>
+          </p:cNvPicPr>
+          <p:nvPr/>
+        </p:nvPicPr>
+        <p:blipFill>
+          <a:blip r:embed="rId3"/>
+          <a:stretch>
+            <a:fillRect/>
+          </a:stretch>
+        </p:blipFill>
+        <p:spPr>
+          <a:xfrm>
+            <a:off x="2552205" y="4992334"/>
+            <a:ext cx="7087589" cy="1705213"/>
+          </a:xfrm>
+          <a:prstGeom prst="rect">
+            <a:avLst/>
+          </a:prstGeom>
+        </p:spPr>
+      </p:pic>
+    </p:spTree>
+    <p:extLst>
+      <p:ext uri="{BB962C8B-B14F-4D97-AF65-F5344CB8AC3E}">
+        <p14:creationId xmlns:p14="http://schemas.microsoft.com/office/powerpoint/2010/main" val="2743483600"/>
+      </p:ext>
+    </p:extLst>
+  </p:cSld>
+  <p:clrMapOvr>
+    <a:masterClrMapping/>
+  </p:clrMapOvr>
+</p:sld>
+</file>
+
+<file path=ppt/slides/slide17.xml><?xml version="1.0" encoding="utf-8"?>
+<p:sld xmlns:a="http://schemas.openxmlformats.org/drawingml/2006/main" xmlns:r="http://schemas.openxmlformats.org/officeDocument/2006/relationships" xmlns:p="http://schemas.openxmlformats.org/presentationml/2006/main" show="0">
   <p:cSld>
     <p:spTree>
       <p:nvGrpSpPr>
@@ -8310,7 +9133,7 @@
 </p:sld>
 </file>
 
-<file path=ppt/slides/slide16.xml><?xml version="1.0" encoding="utf-8"?>
+<file path=ppt/slides/slide18.xml><?xml version="1.0" encoding="utf-8"?>
 <p:sld xmlns:a="http://schemas.openxmlformats.org/drawingml/2006/main" xmlns:r="http://schemas.openxmlformats.org/officeDocument/2006/relationships" xmlns:p="http://schemas.openxmlformats.org/presentationml/2006/main">
   <p:cSld>
     <p:spTree>
@@ -8386,7 +9209,7 @@
         </p:spPr>
         <p:txBody>
           <a:bodyPr>
-            <a:normAutofit lnSpcReduction="10000"/>
+            <a:normAutofit/>
           </a:bodyPr>
           <a:lstStyle/>
           <a:p>
@@ -8401,138 +9224,93 @@
               <a:buChar char="•"/>
             </a:pPr>
             <a:r>
-              <a:rPr lang="en-US" dirty="0"/>
+              <a:rPr lang="en-US" dirty="0">
+                <a:latin typeface="Arial (Body)"/>
+              </a:rPr>
               <a:t>This convolves the statistics with the same weight vector:</a:t>
             </a:r>
           </a:p>
           <a:p>
-            <a:pPr>
+            <a:pPr lvl="1">
               <a:spcBef>
                 <a:spcPts val="150"/>
               </a:spcBef>
               <a:spcAft>
                 <a:spcPts val="150"/>
               </a:spcAft>
-              <a:buFont typeface="Arial" panose="020B0604020202020204" pitchFamily="34" charset="0"/>
-              <a:buChar char="•"/>
             </a:pPr>
             <a:r>
               <a:rPr lang="en-US" dirty="0">
                 <a:effectLst/>
+                <a:latin typeface="Arial (Body)"/>
               </a:rPr>
               <a:t>The convolution further enhances change points by applying the same weighting pattern</a:t>
             </a:r>
           </a:p>
           <a:p>
-            <a:pPr>
+            <a:pPr lvl="1">
               <a:spcBef>
                 <a:spcPts val="150"/>
               </a:spcBef>
               <a:spcAft>
                 <a:spcPts val="150"/>
               </a:spcAft>
-              <a:buFont typeface="Arial" panose="020B0604020202020204" pitchFamily="34" charset="0"/>
-              <a:buChar char="•"/>
             </a:pPr>
             <a:r>
               <a:rPr lang="en-US" dirty="0">
                 <a:effectLst/>
+                <a:latin typeface="Arial (Body)"/>
               </a:rPr>
-              <a:t>Length of </a:t>
+              <a:t>Length of shape = (n-2</a:t>
+            </a:r>
+            <a:r>
+              <a:rPr lang="en-US" i="1" dirty="0">
+                <a:effectLst/>
+                <a:latin typeface="Arial (Body)"/>
+              </a:rPr>
+              <a:t>l1) + (2</a:t>
             </a:r>
             <a:r>
               <a:rPr lang="en-US" dirty="0">
                 <a:effectLst/>
-                <a:latin typeface="Consolas" panose="020B0609020204030204" pitchFamily="49" charset="0"/>
-              </a:rPr>
-              <a:t>shape</a:t>
-            </a:r>
-            <a:r>
-              <a:rPr lang="en-US" dirty="0">
-                <a:effectLst/>
-              </a:rPr>
-              <a:t> = (n-2</a:t>
-            </a:r>
-            <a:r>
-              <a:rPr lang="en-US" i="1" dirty="0">
-                <a:effectLst/>
-              </a:rPr>
-              <a:t>l1) + (2</a:t>
-            </a:r>
-            <a:r>
-              <a:rPr lang="en-US" dirty="0">
-                <a:effectLst/>
+                <a:latin typeface="Arial (Body)"/>
               </a:rPr>
               <a:t>l1-1) = n-1</a:t>
             </a:r>
           </a:p>
           <a:p>
-            <a:pPr>
+            <a:pPr lvl="1">
               <a:spcBef>
                 <a:spcPts val="150"/>
               </a:spcBef>
               <a:spcAft>
                 <a:spcPts val="150"/>
               </a:spcAft>
-              <a:buFont typeface="Arial" panose="020B0604020202020204" pitchFamily="34" charset="0"/>
-              <a:buChar char="•"/>
             </a:pPr>
             <a:r>
               <a:rPr lang="en-US" dirty="0">
                 <a:effectLst/>
+                <a:latin typeface="Arial (Body)"/>
               </a:rPr>
               <a:t>It smooths the signal while preserving the significant peaks</a:t>
             </a:r>
           </a:p>
           <a:p>
-            <a:pPr>
+            <a:pPr lvl="1">
               <a:spcBef>
                 <a:spcPts val="150"/>
               </a:spcBef>
               <a:spcAft>
                 <a:spcPts val="150"/>
               </a:spcAft>
-              <a:buFont typeface="Arial" panose="020B0604020202020204" pitchFamily="34" charset="0"/>
-              <a:buChar char="•"/>
             </a:pPr>
             <a:r>
               <a:rPr lang="en-US" dirty="0">
                 <a:effectLst/>
+                <a:latin typeface="Arial (Body)"/>
               </a:rPr>
               <a:t>Peaks in this signal correspond to potential distribution change points</a:t>
             </a:r>
-          </a:p>
-          <a:p>
-            <a:pPr>
-              <a:buNone/>
-            </a:pPr>
-            <a:r>
-              <a:rPr lang="en-US" dirty="0"/>
-              <a:t>Example:</a:t>
-            </a:r>
-          </a:p>
-          <a:p>
-            <a:pPr>
-              <a:buNone/>
-            </a:pPr>
-            <a:r>
-              <a:rPr lang="en-US" dirty="0"/>
-              <a:t>If </a:t>
-            </a:r>
-            <a:r>
-              <a:rPr lang="en-US" dirty="0">
-                <a:effectLst/>
-                <a:latin typeface="Consolas" panose="020B0609020204030204" pitchFamily="49" charset="0"/>
-              </a:rPr>
-              <a:t>stat</a:t>
-            </a:r>
-            <a:r>
-              <a:rPr lang="en-US" dirty="0"/>
-              <a:t> shows increased values around position 10, convolution will create a distinctive peak pattern that's easier to detect in the next step.</a:t>
-            </a:r>
-            <a:endParaRPr lang="en-US" dirty="0">
-              <a:latin typeface="Arial (Body)"/>
-            </a:endParaRPr>
           </a:p>
         </p:txBody>
       </p:sp>
@@ -8549,7 +9327,7 @@
 </p:sld>
 </file>
 
-<file path=ppt/slides/slide17.xml><?xml version="1.0" encoding="utf-8"?>
+<file path=ppt/slides/slide19.xml><?xml version="1.0" encoding="utf-8"?>
 <p:sld xmlns:a="http://schemas.openxmlformats.org/drawingml/2006/main" xmlns:r="http://schemas.openxmlformats.org/officeDocument/2006/relationships" xmlns:p="http://schemas.openxmlformats.org/presentationml/2006/main">
   <p:cSld>
     <p:spTree>
@@ -8625,7 +9403,7 @@
         </p:spPr>
         <p:txBody>
           <a:bodyPr>
-            <a:normAutofit fontScale="92500" lnSpcReduction="10000"/>
+            <a:normAutofit/>
           </a:bodyPr>
           <a:lstStyle/>
           <a:p>
@@ -8640,32 +9418,68 @@
               <a:buChar char="•"/>
             </a:pPr>
             <a:r>
-              <a:rPr lang="en-US" dirty="0"/>
-              <a:t>This multiplies adjacent values in the shape </a:t>
-            </a:r>
-            <a:r>
-              <a:rPr lang="en-US" dirty="0" err="1"/>
-              <a:t>signal:</a:t>
-            </a:r>
+              <a:rPr lang="en-US" dirty="0">
+                <a:latin typeface="Arial (Body)"/>
+              </a:rPr>
+              <a:t>This multiplies adjacent values in the shape signal:</a:t>
+            </a:r>
+          </a:p>
+          <a:p>
+            <a:pPr lvl="1">
+              <a:spcBef>
+                <a:spcPts val="150"/>
+              </a:spcBef>
+              <a:spcAft>
+                <a:spcPts val="150"/>
+              </a:spcAft>
+            </a:pPr>
+            <a:r>
+              <a:rPr lang="en-US" dirty="0">
+                <a:effectLst/>
+                <a:latin typeface="Arial (Body)"/>
+              </a:rPr>
+              <a:t>shape[:-1] = all values except the last one</a:t>
+            </a:r>
+          </a:p>
+          <a:p>
+            <a:pPr lvl="1">
+              <a:spcBef>
+                <a:spcPts val="150"/>
+              </a:spcBef>
+              <a:spcAft>
+                <a:spcPts val="150"/>
+              </a:spcAft>
+            </a:pPr>
+            <a:r>
+              <a:rPr lang="en-US" dirty="0">
+                <a:effectLst/>
+                <a:latin typeface="Arial (Body)"/>
+              </a:rPr>
+              <a:t>shape[1:] = all values except the first one</a:t>
+            </a:r>
+          </a:p>
+          <a:p>
+            <a:pPr lvl="1">
+              <a:spcBef>
+                <a:spcPts val="150"/>
+              </a:spcBef>
+              <a:spcAft>
+                <a:spcPts val="150"/>
+              </a:spcAft>
+            </a:pPr>
             <a:r>
               <a:rPr lang="en-US" dirty="0" err="1">
                 <a:effectLst/>
-                <a:latin typeface="Consolas" panose="020B0609020204030204" pitchFamily="49" charset="0"/>
+                <a:latin typeface="Arial (Body)"/>
               </a:rPr>
-              <a:t>shape</a:t>
+              <a:t>shape_prime</a:t>
             </a:r>
             <a:r>
               <a:rPr lang="en-US" dirty="0">
                 <a:effectLst/>
-                <a:latin typeface="Consolas" panose="020B0609020204030204" pitchFamily="49" charset="0"/>
+                <a:latin typeface="Arial (Body)"/>
               </a:rPr>
-              <a:t>[:-1]</a:t>
-            </a:r>
-            <a:r>
-              <a:rPr lang="en-US" dirty="0">
-                <a:effectLst/>
-              </a:rPr>
-              <a:t> = all values except the last one</a:t>
+              <a:t> = element-wise product of these vectors</a:t>
             </a:r>
           </a:p>
           <a:p>
@@ -8682,116 +9496,10 @@
             <a:r>
               <a:rPr lang="en-US" dirty="0">
                 <a:effectLst/>
-                <a:latin typeface="Consolas" panose="020B0609020204030204" pitchFamily="49" charset="0"/>
-              </a:rPr>
-              <a:t>shape[1:]</a:t>
-            </a:r>
-            <a:r>
-              <a:rPr lang="en-US" dirty="0">
-                <a:effectLst/>
-              </a:rPr>
-              <a:t> = all values except the first one</a:t>
-            </a:r>
-          </a:p>
-          <a:p>
-            <a:pPr>
-              <a:spcBef>
-                <a:spcPts val="150"/>
-              </a:spcBef>
-              <a:spcAft>
-                <a:spcPts val="150"/>
-              </a:spcAft>
-              <a:buFont typeface="Arial" panose="020B0604020202020204" pitchFamily="34" charset="0"/>
-              <a:buChar char="•"/>
-            </a:pPr>
-            <a:r>
-              <a:rPr lang="en-US" dirty="0" err="1">
-                <a:effectLst/>
-                <a:latin typeface="Consolas" panose="020B0609020204030204" pitchFamily="49" charset="0"/>
-              </a:rPr>
-              <a:t>shape_prime</a:t>
-            </a:r>
-            <a:r>
-              <a:rPr lang="en-US" dirty="0">
-                <a:effectLst/>
-              </a:rPr>
-              <a:t> = element-wise product of these vectors</a:t>
-            </a:r>
-          </a:p>
-          <a:p>
-            <a:pPr>
-              <a:spcBef>
-                <a:spcPts val="150"/>
-              </a:spcBef>
-              <a:spcAft>
-                <a:spcPts val="150"/>
-              </a:spcAft>
-              <a:buFont typeface="Arial" panose="020B0604020202020204" pitchFamily="34" charset="0"/>
-              <a:buChar char="•"/>
-            </a:pPr>
-            <a:r>
-              <a:rPr lang="en-US" dirty="0">
-                <a:effectLst/>
+                <a:latin typeface="Arial (Body)"/>
               </a:rPr>
               <a:t>When adjacent values have different signs, their product will be negative</a:t>
             </a:r>
-          </a:p>
-          <a:p>
-            <a:pPr>
-              <a:buNone/>
-            </a:pPr>
-            <a:r>
-              <a:rPr lang="en-US" dirty="0"/>
-              <a:t>Example:</a:t>
-            </a:r>
-          </a:p>
-          <a:p>
-            <a:pPr>
-              <a:buNone/>
-            </a:pPr>
-            <a:r>
-              <a:rPr lang="en-US" dirty="0"/>
-              <a:t>If </a:t>
-            </a:r>
-            <a:r>
-              <a:rPr lang="en-US" dirty="0">
-                <a:effectLst/>
-                <a:latin typeface="Consolas" panose="020B0609020204030204" pitchFamily="49" charset="0"/>
-              </a:rPr>
-              <a:t>shape</a:t>
-            </a:r>
-            <a:r>
-              <a:rPr lang="en-US" dirty="0"/>
-              <a:t> = [0.1, 0.3, 0.5, 0.2, -0.1, -0.3, -0.2, 0.1]</a:t>
-            </a:r>
-          </a:p>
-          <a:p>
-            <a:pPr>
-              <a:buNone/>
-            </a:pPr>
-            <a:r>
-              <a:rPr lang="en-US" dirty="0" err="1">
-                <a:effectLst/>
-                <a:latin typeface="Consolas" panose="020B0609020204030204" pitchFamily="49" charset="0"/>
-              </a:rPr>
-              <a:t>shape_prime</a:t>
-            </a:r>
-            <a:r>
-              <a:rPr lang="en-US" dirty="0"/>
-              <a:t> = [0.03, 0.15, 0.1, -0.02, 0.03, 0.06, -0.02]</a:t>
-            </a:r>
-          </a:p>
-          <a:p>
-            <a:pPr>
-              <a:buNone/>
-            </a:pPr>
-            <a:r>
-              <a:rPr lang="en-US" dirty="0"/>
-              <a:t>Negative values (-0.02, -0.02) indicate sign changes at positions 3→4 and 6→7.</a:t>
-            </a:r>
-            <a:endParaRPr lang="en-US" dirty="0">
-              <a:latin typeface="Arial (Body)"/>
-            </a:endParaRPr>
           </a:p>
         </p:txBody>
       </p:sp>
@@ -8799,647 +9507,6 @@
     <p:extLst>
       <p:ext uri="{BB962C8B-B14F-4D97-AF65-F5344CB8AC3E}">
         <p14:creationId xmlns:p14="http://schemas.microsoft.com/office/powerpoint/2010/main" val="683143087"/>
-      </p:ext>
-    </p:extLst>
-  </p:cSld>
-  <p:clrMapOvr>
-    <a:masterClrMapping/>
-  </p:clrMapOvr>
-</p:sld>
-</file>
-
-<file path=ppt/slides/slide18.xml><?xml version="1.0" encoding="utf-8"?>
-<p:sld xmlns:a="http://schemas.openxmlformats.org/drawingml/2006/main" xmlns:r="http://schemas.openxmlformats.org/officeDocument/2006/relationships" xmlns:p="http://schemas.openxmlformats.org/presentationml/2006/main">
-  <p:cSld>
-    <p:spTree>
-      <p:nvGrpSpPr>
-        <p:cNvPr id="1" name="">
-          <a:extLst>
-            <a:ext uri="{FF2B5EF4-FFF2-40B4-BE49-F238E27FC236}">
-              <a16:creationId xmlns:a16="http://schemas.microsoft.com/office/drawing/2014/main" id="{BB6E93B6-448E-EE23-42F2-69770FCDB9C3}"/>
-            </a:ext>
-          </a:extLst>
-        </p:cNvPr>
-        <p:cNvGrpSpPr/>
-        <p:nvPr/>
-      </p:nvGrpSpPr>
-      <p:grpSpPr>
-        <a:xfrm>
-          <a:off x="0" y="0"/>
-          <a:ext cx="0" cy="0"/>
-          <a:chOff x="0" y="0"/>
-          <a:chExt cx="0" cy="0"/>
-        </a:xfrm>
-      </p:grpSpPr>
-      <p:sp>
-        <p:nvSpPr>
-          <p:cNvPr id="2" name="Title 1">
-            <a:extLst>
-              <a:ext uri="{FF2B5EF4-FFF2-40B4-BE49-F238E27FC236}">
-                <a16:creationId xmlns:a16="http://schemas.microsoft.com/office/drawing/2014/main" id="{62EFCE74-6E48-79B9-7441-E1D00B40EEA0}"/>
-              </a:ext>
-            </a:extLst>
-          </p:cNvPr>
-          <p:cNvSpPr>
-            <a:spLocks noGrp="1"/>
-          </p:cNvSpPr>
-          <p:nvPr>
-            <p:ph type="title"/>
-          </p:nvPr>
-        </p:nvSpPr>
-        <p:spPr/>
-        <p:txBody>
-          <a:bodyPr/>
-          <a:lstStyle/>
-          <a:p>
-            <a:r>
-              <a:rPr lang="en-US" dirty="0" err="1"/>
-              <a:t>ShapeDD</a:t>
-            </a:r>
-            <a:endParaRPr lang="en-US" dirty="0"/>
-          </a:p>
-        </p:txBody>
-      </p:sp>
-      <p:sp>
-        <p:nvSpPr>
-          <p:cNvPr id="3" name="Content Placeholder 2">
-            <a:extLst>
-              <a:ext uri="{FF2B5EF4-FFF2-40B4-BE49-F238E27FC236}">
-                <a16:creationId xmlns:a16="http://schemas.microsoft.com/office/drawing/2014/main" id="{003B7287-669E-B886-4B17-BDE2EEB81DF1}"/>
-              </a:ext>
-            </a:extLst>
-          </p:cNvPr>
-          <p:cNvSpPr>
-            <a:spLocks noGrp="1"/>
-          </p:cNvSpPr>
-          <p:nvPr>
-            <p:ph idx="1"/>
-          </p:nvPr>
-        </p:nvSpPr>
-        <p:spPr>
-          <a:xfrm>
-            <a:off x="838200" y="1837127"/>
-            <a:ext cx="10515600" cy="4351338"/>
-          </a:xfrm>
-        </p:spPr>
-        <p:txBody>
-          <a:bodyPr>
-            <a:normAutofit fontScale="62500" lnSpcReduction="20000"/>
-          </a:bodyPr>
-          <a:lstStyle/>
-          <a:p>
-            <a:pPr>
-              <a:spcBef>
-                <a:spcPts val="150"/>
-              </a:spcBef>
-              <a:spcAft>
-                <a:spcPts val="150"/>
-              </a:spcAft>
-              <a:buFont typeface="+mj-lt"/>
-              <a:buAutoNum type="arabicPeriod"/>
-            </a:pPr>
-            <a:r>
-              <a:rPr lang="en-US" dirty="0"/>
-              <a:t>For each detected change </a:t>
-            </a:r>
-            <a:r>
-              <a:rPr lang="en-US" dirty="0" err="1"/>
-              <a:t>point:</a:t>
-            </a:r>
-            <a:r>
-              <a:rPr lang="en-US" dirty="0" err="1">
-                <a:effectLst/>
-              </a:rPr>
-              <a:t>We</a:t>
-            </a:r>
-            <a:r>
-              <a:rPr lang="en-US" dirty="0">
-                <a:effectLst/>
-              </a:rPr>
-              <a:t> only process those where </a:t>
-            </a:r>
-            <a:r>
-              <a:rPr lang="en-US" dirty="0">
-                <a:effectLst/>
-                <a:latin typeface="Consolas" panose="020B0609020204030204" pitchFamily="49" charset="0"/>
-              </a:rPr>
-              <a:t>shape[pos] &gt; 0</a:t>
-            </a:r>
-            <a:r>
-              <a:rPr lang="en-US" dirty="0">
-                <a:effectLst/>
-              </a:rPr>
-              <a:t> (transitions from positive to negative)</a:t>
-            </a:r>
-          </a:p>
-          <a:p>
-            <a:pPr>
-              <a:spcBef>
-                <a:spcPts val="150"/>
-              </a:spcBef>
-              <a:spcAft>
-                <a:spcPts val="150"/>
-              </a:spcAft>
-              <a:buFont typeface="+mj-lt"/>
-              <a:buAutoNum type="arabicPeriod" startAt="2"/>
-            </a:pPr>
-            <a:r>
-              <a:rPr lang="en-US" dirty="0">
-                <a:effectLst/>
-              </a:rPr>
-              <a:t>We store the shape value in the first column of </a:t>
-            </a:r>
-            <a:r>
-              <a:rPr lang="en-US" dirty="0">
-                <a:effectLst/>
-                <a:latin typeface="Consolas" panose="020B0609020204030204" pitchFamily="49" charset="0"/>
-              </a:rPr>
-              <a:t>res</a:t>
-            </a:r>
-            <a:endParaRPr lang="en-US" dirty="0">
-              <a:effectLst/>
-            </a:endParaRPr>
-          </a:p>
-          <a:p>
-            <a:pPr>
-              <a:spcBef>
-                <a:spcPts val="150"/>
-              </a:spcBef>
-              <a:spcAft>
-                <a:spcPts val="150"/>
-              </a:spcAft>
-              <a:buFont typeface="+mj-lt"/>
-              <a:buAutoNum type="arabicPeriod" startAt="3"/>
-            </a:pPr>
-            <a:r>
-              <a:rPr lang="en-US" dirty="0">
-                <a:effectLst/>
-              </a:rPr>
-              <a:t>We define a window of size </a:t>
-            </a:r>
-            <a:r>
-              <a:rPr lang="en-US" dirty="0">
-                <a:effectLst/>
-                <a:latin typeface="Consolas" panose="020B0609020204030204" pitchFamily="49" charset="0"/>
-              </a:rPr>
-              <a:t>l2</a:t>
-            </a:r>
-            <a:r>
-              <a:rPr lang="en-US" dirty="0">
-                <a:effectLst/>
-              </a:rPr>
-              <a:t> centered at the change point</a:t>
-            </a:r>
-          </a:p>
-          <a:p>
-            <a:pPr>
-              <a:spcBef>
-                <a:spcPts val="150"/>
-              </a:spcBef>
-              <a:spcAft>
-                <a:spcPts val="150"/>
-              </a:spcAft>
-              <a:buFont typeface="+mj-lt"/>
-              <a:buAutoNum type="arabicPeriod" startAt="4"/>
-            </a:pPr>
-            <a:r>
-              <a:rPr lang="en-US" dirty="0">
-                <a:effectLst/>
-              </a:rPr>
-              <a:t>We call the MMD function to perform a statistical test:</a:t>
-            </a:r>
-          </a:p>
-          <a:p>
-            <a:pPr>
-              <a:spcBef>
-                <a:spcPts val="150"/>
-              </a:spcBef>
-              <a:spcAft>
-                <a:spcPts val="150"/>
-              </a:spcAft>
-              <a:buFont typeface="Arial" panose="020B0604020202020204" pitchFamily="34" charset="0"/>
-              <a:buChar char="•"/>
-            </a:pPr>
-            <a:r>
-              <a:rPr lang="en-US" dirty="0">
-                <a:effectLst/>
-              </a:rPr>
-              <a:t>It compares the distribution of points before and after position </a:t>
-            </a:r>
-            <a:r>
-              <a:rPr lang="en-US" dirty="0">
-                <a:effectLst/>
-                <a:latin typeface="Consolas" panose="020B0609020204030204" pitchFamily="49" charset="0"/>
-              </a:rPr>
-              <a:t>pos-a</a:t>
-            </a:r>
-            <a:r>
-              <a:rPr lang="en-US" dirty="0">
-                <a:effectLst/>
-              </a:rPr>
-              <a:t> within the window</a:t>
-            </a:r>
-          </a:p>
-          <a:p>
-            <a:pPr>
-              <a:spcBef>
-                <a:spcPts val="150"/>
-              </a:spcBef>
-              <a:spcAft>
-                <a:spcPts val="150"/>
-              </a:spcAft>
-              <a:buFont typeface="Arial" panose="020B0604020202020204" pitchFamily="34" charset="0"/>
-              <a:buChar char="•"/>
-            </a:pPr>
-            <a:r>
-              <a:rPr lang="en-US" dirty="0">
-                <a:effectLst/>
-              </a:rPr>
-              <a:t>Returns [MMD statistic, p-value]</a:t>
-            </a:r>
-          </a:p>
-          <a:p>
-            <a:pPr>
-              <a:spcBef>
-                <a:spcPts val="150"/>
-              </a:spcBef>
-              <a:spcAft>
-                <a:spcPts val="150"/>
-              </a:spcAft>
-              <a:buFont typeface="Arial" panose="020B0604020202020204" pitchFamily="34" charset="0"/>
-              <a:buChar char="•"/>
-            </a:pPr>
-            <a:r>
-              <a:rPr lang="en-US" dirty="0">
-                <a:effectLst/>
-              </a:rPr>
-              <a:t>These are stored in columns 1 and 2 of </a:t>
-            </a:r>
-            <a:r>
-              <a:rPr lang="en-US" dirty="0">
-                <a:effectLst/>
-                <a:latin typeface="Consolas" panose="020B0609020204030204" pitchFamily="49" charset="0"/>
-              </a:rPr>
-              <a:t>res</a:t>
-            </a:r>
-            <a:endParaRPr lang="en-US" dirty="0">
-              <a:effectLst/>
-            </a:endParaRPr>
-          </a:p>
-          <a:p>
-            <a:pPr>
-              <a:spcBef>
-                <a:spcPts val="150"/>
-              </a:spcBef>
-              <a:spcAft>
-                <a:spcPts val="150"/>
-              </a:spcAft>
-              <a:buFont typeface="Arial" panose="020B0604020202020204" pitchFamily="34" charset="0"/>
-              <a:buChar char="•"/>
-            </a:pPr>
-            <a:r>
-              <a:rPr lang="en-US" dirty="0" err="1"/>
-              <a:t>Example:For</a:t>
-            </a:r>
-            <a:r>
-              <a:rPr lang="en-US" dirty="0"/>
-              <a:t> a change point at position 10:</a:t>
-            </a:r>
-            <a:r>
-              <a:rPr lang="en-US" dirty="0">
-                <a:effectLst/>
-              </a:rPr>
-              <a:t>Window: points 7-13 (assuming l2=6)</a:t>
-            </a:r>
-          </a:p>
-          <a:p>
-            <a:pPr>
-              <a:spcBef>
-                <a:spcPts val="150"/>
-              </a:spcBef>
-              <a:spcAft>
-                <a:spcPts val="150"/>
-              </a:spcAft>
-              <a:buFont typeface="Arial" panose="020B0604020202020204" pitchFamily="34" charset="0"/>
-              <a:buChar char="•"/>
-            </a:pPr>
-            <a:r>
-              <a:rPr lang="en-US" dirty="0">
-                <a:effectLst/>
-              </a:rPr>
-              <a:t>MMD test compares points 7-9 vs. 10-13</a:t>
-            </a:r>
-          </a:p>
-          <a:p>
-            <a:pPr>
-              <a:spcBef>
-                <a:spcPts val="150"/>
-              </a:spcBef>
-              <a:spcAft>
-                <a:spcPts val="150"/>
-              </a:spcAft>
-              <a:buFont typeface="Arial" panose="020B0604020202020204" pitchFamily="34" charset="0"/>
-              <a:buChar char="•"/>
-            </a:pPr>
-            <a:r>
-              <a:rPr lang="en-US" dirty="0">
-                <a:effectLst/>
-              </a:rPr>
-              <a:t>If p-value is low (e.g., 0.01), we have strong evidence of concept drift</a:t>
-            </a:r>
-          </a:p>
-          <a:p>
-            <a:pPr>
-              <a:spcBef>
-                <a:spcPts val="150"/>
-              </a:spcBef>
-              <a:spcAft>
-                <a:spcPts val="150"/>
-              </a:spcAft>
-              <a:buFont typeface="Arial" panose="020B0604020202020204" pitchFamily="34" charset="0"/>
-              <a:buChar char="•"/>
-            </a:pPr>
-            <a:r>
-              <a:rPr lang="en-US" dirty="0">
-                <a:effectLst/>
-              </a:rPr>
-              <a:t>Result row at position 10: [</a:t>
-            </a:r>
-            <a:r>
-              <a:rPr lang="en-US" dirty="0" err="1">
-                <a:effectLst/>
-              </a:rPr>
-              <a:t>shape_value</a:t>
-            </a:r>
-            <a:r>
-              <a:rPr lang="en-US" dirty="0">
-                <a:effectLst/>
-              </a:rPr>
-              <a:t>, </a:t>
-            </a:r>
-            <a:r>
-              <a:rPr lang="en-US" dirty="0" err="1">
-                <a:effectLst/>
-              </a:rPr>
-              <a:t>mmd_statistic</a:t>
-            </a:r>
-            <a:r>
-              <a:rPr lang="en-US" dirty="0">
-                <a:effectLst/>
-              </a:rPr>
-              <a:t>, 0.01]</a:t>
-            </a:r>
-          </a:p>
-          <a:p>
-            <a:pPr>
-              <a:spcBef>
-                <a:spcPts val="150"/>
-              </a:spcBef>
-              <a:spcAft>
-                <a:spcPts val="150"/>
-              </a:spcAft>
-              <a:buFont typeface="+mj-lt"/>
-              <a:buAutoNum type="arabicPeriod"/>
-            </a:pPr>
-            <a:r>
-              <a:rPr lang="en-US" dirty="0"/>
-              <a:t>The final </a:t>
-            </a:r>
-            <a:r>
-              <a:rPr lang="en-US" dirty="0">
-                <a:effectLst/>
-                <a:latin typeface="Consolas" panose="020B0609020204030204" pitchFamily="49" charset="0"/>
-              </a:rPr>
-              <a:t>res</a:t>
-            </a:r>
-            <a:r>
-              <a:rPr lang="en-US" dirty="0"/>
-              <a:t> matrix gives three key pieces of information for each data </a:t>
-            </a:r>
-            <a:r>
-              <a:rPr lang="en-US" dirty="0" err="1"/>
-              <a:t>point:</a:t>
-            </a:r>
-            <a:r>
-              <a:rPr lang="en-US" dirty="0" err="1">
-                <a:effectLst/>
-              </a:rPr>
-              <a:t>Shape</a:t>
-            </a:r>
-            <a:r>
-              <a:rPr lang="en-US" dirty="0">
-                <a:effectLst/>
-              </a:rPr>
-              <a:t> value (strength of the change signal)</a:t>
-            </a:r>
-          </a:p>
-          <a:p>
-            <a:pPr>
-              <a:spcBef>
-                <a:spcPts val="150"/>
-              </a:spcBef>
-              <a:spcAft>
-                <a:spcPts val="150"/>
-              </a:spcAft>
-              <a:buFont typeface="+mj-lt"/>
-              <a:buAutoNum type="arabicPeriod" startAt="2"/>
-            </a:pPr>
-            <a:r>
-              <a:rPr lang="en-US" dirty="0">
-                <a:effectLst/>
-              </a:rPr>
-              <a:t>MMD statistic (distance between distributions)</a:t>
-            </a:r>
-          </a:p>
-          <a:p>
-            <a:pPr>
-              <a:spcBef>
-                <a:spcPts val="150"/>
-              </a:spcBef>
-              <a:spcAft>
-                <a:spcPts val="150"/>
-              </a:spcAft>
-              <a:buFont typeface="+mj-lt"/>
-              <a:buAutoNum type="arabicPeriod" startAt="3"/>
-            </a:pPr>
-            <a:r>
-              <a:rPr lang="en-US" dirty="0">
-                <a:effectLst/>
-              </a:rPr>
-              <a:t>p-value (statistical significance)</a:t>
-            </a:r>
-          </a:p>
-          <a:p>
-            <a:pPr>
-              <a:buNone/>
-            </a:pPr>
-            <a:r>
-              <a:rPr lang="en-US" dirty="0"/>
-              <a:t>Points with high shape values and low p-values represent the most reliable concept drift points.</a:t>
-            </a:r>
-            <a:endParaRPr lang="en-US" dirty="0">
-              <a:latin typeface="Arial (Body)"/>
-            </a:endParaRPr>
-          </a:p>
-        </p:txBody>
-      </p:sp>
-    </p:spTree>
-    <p:extLst>
-      <p:ext uri="{BB962C8B-B14F-4D97-AF65-F5344CB8AC3E}">
-        <p14:creationId xmlns:p14="http://schemas.microsoft.com/office/powerpoint/2010/main" val="2234376617"/>
-      </p:ext>
-    </p:extLst>
-  </p:cSld>
-  <p:clrMapOvr>
-    <a:masterClrMapping/>
-  </p:clrMapOvr>
-</p:sld>
-</file>
-
-<file path=ppt/slides/slide19.xml><?xml version="1.0" encoding="utf-8"?>
-<p:sld xmlns:a="http://schemas.openxmlformats.org/drawingml/2006/main" xmlns:r="http://schemas.openxmlformats.org/officeDocument/2006/relationships" xmlns:p="http://schemas.openxmlformats.org/presentationml/2006/main" show="0">
-  <p:cSld>
-    <p:spTree>
-      <p:nvGrpSpPr>
-        <p:cNvPr id="1" name="">
-          <a:extLst>
-            <a:ext uri="{FF2B5EF4-FFF2-40B4-BE49-F238E27FC236}">
-              <a16:creationId xmlns:a16="http://schemas.microsoft.com/office/drawing/2014/main" id="{5AED1AB2-F7D0-92AE-62E9-DF6A72910F5C}"/>
-            </a:ext>
-          </a:extLst>
-        </p:cNvPr>
-        <p:cNvGrpSpPr/>
-        <p:nvPr/>
-      </p:nvGrpSpPr>
-      <p:grpSpPr>
-        <a:xfrm>
-          <a:off x="0" y="0"/>
-          <a:ext cx="0" cy="0"/>
-          <a:chOff x="0" y="0"/>
-          <a:chExt cx="0" cy="0"/>
-        </a:xfrm>
-      </p:grpSpPr>
-      <p:sp>
-        <p:nvSpPr>
-          <p:cNvPr id="2" name="Title 1">
-            <a:extLst>
-              <a:ext uri="{FF2B5EF4-FFF2-40B4-BE49-F238E27FC236}">
-                <a16:creationId xmlns:a16="http://schemas.microsoft.com/office/drawing/2014/main" id="{69ECEC5E-CE17-7977-95A1-029FF9B4622E}"/>
-              </a:ext>
-            </a:extLst>
-          </p:cNvPr>
-          <p:cNvSpPr>
-            <a:spLocks noGrp="1"/>
-          </p:cNvSpPr>
-          <p:nvPr>
-            <p:ph type="title"/>
-          </p:nvPr>
-        </p:nvSpPr>
-        <p:spPr/>
-        <p:txBody>
-          <a:bodyPr/>
-          <a:lstStyle/>
-          <a:p>
-            <a:r>
-              <a:rPr lang="en-US" dirty="0" err="1"/>
-              <a:t>ShapeDD</a:t>
-            </a:r>
-            <a:endParaRPr lang="en-US" dirty="0"/>
-          </a:p>
-        </p:txBody>
-      </p:sp>
-      <p:sp>
-        <p:nvSpPr>
-          <p:cNvPr id="3" name="Content Placeholder 2">
-            <a:extLst>
-              <a:ext uri="{FF2B5EF4-FFF2-40B4-BE49-F238E27FC236}">
-                <a16:creationId xmlns:a16="http://schemas.microsoft.com/office/drawing/2014/main" id="{D887D8D2-7474-F0F6-3039-A68F8289326C}"/>
-              </a:ext>
-            </a:extLst>
-          </p:cNvPr>
-          <p:cNvSpPr>
-            <a:spLocks noGrp="1"/>
-          </p:cNvSpPr>
-          <p:nvPr>
-            <p:ph idx="1"/>
-          </p:nvPr>
-        </p:nvSpPr>
-        <p:spPr>
-          <a:xfrm>
-            <a:off x="838200" y="1837127"/>
-            <a:ext cx="10515600" cy="4351338"/>
-          </a:xfrm>
-        </p:spPr>
-        <p:txBody>
-          <a:bodyPr>
-            <a:normAutofit/>
-          </a:bodyPr>
-          <a:lstStyle/>
-          <a:p>
-            <a:r>
-              <a:rPr lang="en-US" dirty="0">
-                <a:latin typeface="Arial (Body)"/>
-              </a:rPr>
-              <a:t>Calculating the </a:t>
-            </a:r>
-            <a:r>
-              <a:rPr lang="vi-VN" dirty="0">
-                <a:latin typeface="Arial (Body)"/>
-              </a:rPr>
-              <a:t>e</a:t>
-            </a:r>
-            <a:r>
-              <a:rPr lang="en-US" dirty="0" err="1"/>
-              <a:t>lement</a:t>
-            </a:r>
-            <a:r>
-              <a:rPr lang="en-US" dirty="0"/>
-              <a:t>-wise multiplication</a:t>
-            </a:r>
-            <a:r>
-              <a:rPr lang="vi-VN" dirty="0"/>
-              <a:t> between W and K</a:t>
-            </a:r>
-            <a:endParaRPr lang="vi-VN" dirty="0">
-              <a:latin typeface="Arial (Body)"/>
-            </a:endParaRPr>
-          </a:p>
-        </p:txBody>
-      </p:sp>
-      <p:pic>
-        <p:nvPicPr>
-          <p:cNvPr id="8" name="Picture 7">
-            <a:extLst>
-              <a:ext uri="{FF2B5EF4-FFF2-40B4-BE49-F238E27FC236}">
-                <a16:creationId xmlns:a16="http://schemas.microsoft.com/office/drawing/2014/main" id="{96064EC2-BB41-2D29-07A9-85089371C623}"/>
-              </a:ext>
-            </a:extLst>
-          </p:cNvPr>
-          <p:cNvPicPr>
-            <a:picLocks noChangeAspect="1"/>
-          </p:cNvPicPr>
-          <p:nvPr/>
-        </p:nvPicPr>
-        <p:blipFill>
-          <a:blip r:embed="rId3"/>
-          <a:stretch>
-            <a:fillRect/>
-          </a:stretch>
-        </p:blipFill>
-        <p:spPr>
-          <a:xfrm>
-            <a:off x="1564256" y="2421212"/>
-            <a:ext cx="9063487" cy="3183167"/>
-          </a:xfrm>
-          <a:prstGeom prst="rect">
-            <a:avLst/>
-          </a:prstGeom>
-        </p:spPr>
-      </p:pic>
-    </p:spTree>
-    <p:extLst>
-      <p:ext uri="{BB962C8B-B14F-4D97-AF65-F5344CB8AC3E}">
-        <p14:creationId xmlns:p14="http://schemas.microsoft.com/office/powerpoint/2010/main" val="3056561995"/>
       </p:ext>
     </p:extLst>
   </p:cSld>
@@ -9598,6 +9665,483 @@
 </file>
 
 <file path=ppt/slides/slide20.xml><?xml version="1.0" encoding="utf-8"?>
+<p:sld xmlns:a="http://schemas.openxmlformats.org/drawingml/2006/main" xmlns:r="http://schemas.openxmlformats.org/officeDocument/2006/relationships" xmlns:p="http://schemas.openxmlformats.org/presentationml/2006/main">
+  <p:cSld>
+    <p:spTree>
+      <p:nvGrpSpPr>
+        <p:cNvPr id="1" name="">
+          <a:extLst>
+            <a:ext uri="{FF2B5EF4-FFF2-40B4-BE49-F238E27FC236}">
+              <a16:creationId xmlns:a16="http://schemas.microsoft.com/office/drawing/2014/main" id="{BB6E93B6-448E-EE23-42F2-69770FCDB9C3}"/>
+            </a:ext>
+          </a:extLst>
+        </p:cNvPr>
+        <p:cNvGrpSpPr/>
+        <p:nvPr/>
+      </p:nvGrpSpPr>
+      <p:grpSpPr>
+        <a:xfrm>
+          <a:off x="0" y="0"/>
+          <a:ext cx="0" cy="0"/>
+          <a:chOff x="0" y="0"/>
+          <a:chExt cx="0" cy="0"/>
+        </a:xfrm>
+      </p:grpSpPr>
+      <p:sp>
+        <p:nvSpPr>
+          <p:cNvPr id="2" name="Title 1">
+            <a:extLst>
+              <a:ext uri="{FF2B5EF4-FFF2-40B4-BE49-F238E27FC236}">
+                <a16:creationId xmlns:a16="http://schemas.microsoft.com/office/drawing/2014/main" id="{62EFCE74-6E48-79B9-7441-E1D00B40EEA0}"/>
+              </a:ext>
+            </a:extLst>
+          </p:cNvPr>
+          <p:cNvSpPr>
+            <a:spLocks noGrp="1"/>
+          </p:cNvSpPr>
+          <p:nvPr>
+            <p:ph type="title"/>
+          </p:nvPr>
+        </p:nvSpPr>
+        <p:spPr/>
+        <p:txBody>
+          <a:bodyPr/>
+          <a:lstStyle/>
+          <a:p>
+            <a:r>
+              <a:rPr lang="en-US" dirty="0" err="1"/>
+              <a:t>ShapeDD</a:t>
+            </a:r>
+            <a:endParaRPr lang="en-US" dirty="0"/>
+          </a:p>
+        </p:txBody>
+      </p:sp>
+      <p:sp>
+        <p:nvSpPr>
+          <p:cNvPr id="3" name="Content Placeholder 2">
+            <a:extLst>
+              <a:ext uri="{FF2B5EF4-FFF2-40B4-BE49-F238E27FC236}">
+                <a16:creationId xmlns:a16="http://schemas.microsoft.com/office/drawing/2014/main" id="{003B7287-669E-B886-4B17-BDE2EEB81DF1}"/>
+              </a:ext>
+            </a:extLst>
+          </p:cNvPr>
+          <p:cNvSpPr>
+            <a:spLocks noGrp="1"/>
+          </p:cNvSpPr>
+          <p:nvPr>
+            <p:ph idx="1"/>
+          </p:nvPr>
+        </p:nvSpPr>
+        <p:spPr>
+          <a:xfrm>
+            <a:off x="838200" y="1434352"/>
+            <a:ext cx="10515600" cy="4867835"/>
+          </a:xfrm>
+        </p:spPr>
+        <p:txBody>
+          <a:bodyPr>
+            <a:normAutofit lnSpcReduction="10000"/>
+          </a:bodyPr>
+          <a:lstStyle/>
+          <a:p>
+            <a:pPr marL="0" indent="0">
+              <a:spcBef>
+                <a:spcPts val="150"/>
+              </a:spcBef>
+              <a:spcAft>
+                <a:spcPts val="150"/>
+              </a:spcAft>
+              <a:buNone/>
+            </a:pPr>
+            <a:r>
+              <a:rPr lang="en-US" sz="2400" dirty="0">
+                <a:latin typeface="Arial (Body)"/>
+              </a:rPr>
+              <a:t>Validate the potential </a:t>
+            </a:r>
+            <a:r>
+              <a:rPr lang="en-US" sz="2400">
+                <a:latin typeface="Arial (Body)"/>
+              </a:rPr>
+              <a:t>change point </a:t>
+            </a:r>
+            <a:r>
+              <a:rPr lang="en-US" sz="2400" dirty="0">
+                <a:latin typeface="Arial (Body)"/>
+              </a:rPr>
+              <a:t>using MMD again.</a:t>
+            </a:r>
+          </a:p>
+          <a:p>
+            <a:pPr marL="0" indent="0">
+              <a:spcBef>
+                <a:spcPts val="150"/>
+              </a:spcBef>
+              <a:spcAft>
+                <a:spcPts val="150"/>
+              </a:spcAft>
+              <a:buNone/>
+            </a:pPr>
+            <a:r>
+              <a:rPr lang="en-US" sz="2400" dirty="0">
+                <a:latin typeface="Arial (Body)"/>
+              </a:rPr>
+              <a:t>For each detected change point:</a:t>
+            </a:r>
+          </a:p>
+          <a:p>
+            <a:pPr>
+              <a:spcBef>
+                <a:spcPts val="150"/>
+              </a:spcBef>
+              <a:spcAft>
+                <a:spcPts val="150"/>
+              </a:spcAft>
+            </a:pPr>
+            <a:r>
+              <a:rPr lang="en-US" sz="2400" dirty="0">
+                <a:effectLst/>
+                <a:latin typeface="Arial (Body)"/>
+              </a:rPr>
+              <a:t>Process those where shape transitions from positive to negative.</a:t>
+            </a:r>
+          </a:p>
+          <a:p>
+            <a:pPr>
+              <a:spcBef>
+                <a:spcPts val="150"/>
+              </a:spcBef>
+              <a:spcAft>
+                <a:spcPts val="150"/>
+              </a:spcAft>
+            </a:pPr>
+            <a:r>
+              <a:rPr lang="en-US" sz="2400" dirty="0">
+                <a:effectLst/>
+                <a:latin typeface="Arial (Body)"/>
+              </a:rPr>
+              <a:t>Define a window of size l2 centered at the change point</a:t>
+            </a:r>
+          </a:p>
+          <a:p>
+            <a:pPr>
+              <a:spcBef>
+                <a:spcPts val="150"/>
+              </a:spcBef>
+              <a:spcAft>
+                <a:spcPts val="150"/>
+              </a:spcAft>
+            </a:pPr>
+            <a:r>
+              <a:rPr lang="en-US" sz="2400" dirty="0">
+                <a:effectLst/>
+                <a:latin typeface="Arial (Body)"/>
+              </a:rPr>
+              <a:t>Call the MMD function to perform a statistical test:</a:t>
+            </a:r>
+          </a:p>
+          <a:p>
+            <a:pPr marL="0" indent="0">
+              <a:spcBef>
+                <a:spcPts val="150"/>
+              </a:spcBef>
+              <a:spcAft>
+                <a:spcPts val="150"/>
+              </a:spcAft>
+              <a:buNone/>
+            </a:pPr>
+            <a:r>
+              <a:rPr lang="en-US" sz="2400" dirty="0">
+                <a:effectLst/>
+                <a:latin typeface="Arial (Body)"/>
+              </a:rPr>
+              <a:t>It compares the distribution of points before and after position.</a:t>
+            </a:r>
+          </a:p>
+          <a:p>
+            <a:pPr lvl="1">
+              <a:spcBef>
+                <a:spcPts val="150"/>
+              </a:spcBef>
+              <a:spcAft>
+                <a:spcPts val="150"/>
+              </a:spcAft>
+            </a:pPr>
+            <a:r>
+              <a:rPr lang="en-US" dirty="0">
+                <a:latin typeface="Arial (Body)"/>
+              </a:rPr>
+              <a:t>Create a window around the potential change point.</a:t>
+            </a:r>
+          </a:p>
+          <a:p>
+            <a:pPr lvl="1">
+              <a:spcBef>
+                <a:spcPts val="150"/>
+              </a:spcBef>
+              <a:spcAft>
+                <a:spcPts val="150"/>
+              </a:spcAft>
+            </a:pPr>
+            <a:r>
+              <a:rPr lang="en-US" dirty="0">
+                <a:effectLst/>
+                <a:latin typeface="Arial (Body)"/>
+              </a:rPr>
+              <a:t>Computes MMD statistics for the actual split and all permutations</a:t>
+            </a:r>
+          </a:p>
+          <a:p>
+            <a:pPr lvl="1">
+              <a:spcBef>
+                <a:spcPts val="150"/>
+              </a:spcBef>
+              <a:spcAft>
+                <a:spcPts val="150"/>
+              </a:spcAft>
+            </a:pPr>
+            <a:r>
+              <a:rPr lang="en-US" dirty="0">
+                <a:effectLst/>
+                <a:latin typeface="Arial (Body)"/>
+              </a:rPr>
+              <a:t>First value (s[0]): actual MMD statistic and the remaining values: MMD statistics under the null hypothesis (no difference)</a:t>
+            </a:r>
+          </a:p>
+          <a:p>
+            <a:pPr lvl="1">
+              <a:spcBef>
+                <a:spcPts val="150"/>
+              </a:spcBef>
+              <a:spcAft>
+                <a:spcPts val="150"/>
+              </a:spcAft>
+            </a:pPr>
+            <a:r>
+              <a:rPr lang="en-US" dirty="0">
+                <a:effectLst/>
+                <a:latin typeface="Arial (Body)"/>
+              </a:rPr>
+              <a:t>Counts how many permutation statistics exceed the actual statistic</a:t>
+            </a:r>
+          </a:p>
+          <a:p>
+            <a:pPr lvl="1">
+              <a:spcBef>
+                <a:spcPts val="150"/>
+              </a:spcBef>
+              <a:spcAft>
+                <a:spcPts val="150"/>
+              </a:spcAft>
+            </a:pPr>
+            <a:r>
+              <a:rPr lang="en-US" dirty="0">
+                <a:effectLst/>
+                <a:latin typeface="Arial (Body)"/>
+              </a:rPr>
+              <a:t>Divides by </a:t>
+            </a:r>
+            <a:r>
+              <a:rPr lang="en-US" dirty="0" err="1">
+                <a:effectLst/>
+                <a:latin typeface="Arial (Body)"/>
+              </a:rPr>
+              <a:t>n_perm</a:t>
+            </a:r>
+            <a:r>
+              <a:rPr lang="en-US" dirty="0">
+                <a:effectLst/>
+                <a:latin typeface="Arial (Body)"/>
+              </a:rPr>
+              <a:t> to get the p-value</a:t>
+            </a:r>
+          </a:p>
+          <a:p>
+            <a:pPr lvl="1">
+              <a:spcBef>
+                <a:spcPts val="150"/>
+              </a:spcBef>
+              <a:spcAft>
+                <a:spcPts val="150"/>
+              </a:spcAft>
+            </a:pPr>
+            <a:r>
+              <a:rPr lang="en-US" dirty="0">
+                <a:effectLst/>
+                <a:latin typeface="Arial (Body)"/>
+              </a:rPr>
+              <a:t>Lower p-values indicate stronger evidence of distribution difference</a:t>
+            </a:r>
+          </a:p>
+        </p:txBody>
+      </p:sp>
+    </p:spTree>
+    <p:extLst>
+      <p:ext uri="{BB962C8B-B14F-4D97-AF65-F5344CB8AC3E}">
+        <p14:creationId xmlns:p14="http://schemas.microsoft.com/office/powerpoint/2010/main" val="2234376617"/>
+      </p:ext>
+    </p:extLst>
+  </p:cSld>
+  <p:clrMapOvr>
+    <a:masterClrMapping/>
+  </p:clrMapOvr>
+</p:sld>
+</file>
+
+<file path=ppt/slides/slide21.xml><?xml version="1.0" encoding="utf-8"?>
+<p:sld xmlns:a="http://schemas.openxmlformats.org/drawingml/2006/main" xmlns:r="http://schemas.openxmlformats.org/officeDocument/2006/relationships" xmlns:p="http://schemas.openxmlformats.org/presentationml/2006/main" show="0">
+  <p:cSld>
+    <p:spTree>
+      <p:nvGrpSpPr>
+        <p:cNvPr id="1" name="">
+          <a:extLst>
+            <a:ext uri="{FF2B5EF4-FFF2-40B4-BE49-F238E27FC236}">
+              <a16:creationId xmlns:a16="http://schemas.microsoft.com/office/drawing/2014/main" id="{5AED1AB2-F7D0-92AE-62E9-DF6A72910F5C}"/>
+            </a:ext>
+          </a:extLst>
+        </p:cNvPr>
+        <p:cNvGrpSpPr/>
+        <p:nvPr/>
+      </p:nvGrpSpPr>
+      <p:grpSpPr>
+        <a:xfrm>
+          <a:off x="0" y="0"/>
+          <a:ext cx="0" cy="0"/>
+          <a:chOff x="0" y="0"/>
+          <a:chExt cx="0" cy="0"/>
+        </a:xfrm>
+      </p:grpSpPr>
+      <p:sp>
+        <p:nvSpPr>
+          <p:cNvPr id="2" name="Title 1">
+            <a:extLst>
+              <a:ext uri="{FF2B5EF4-FFF2-40B4-BE49-F238E27FC236}">
+                <a16:creationId xmlns:a16="http://schemas.microsoft.com/office/drawing/2014/main" id="{69ECEC5E-CE17-7977-95A1-029FF9B4622E}"/>
+              </a:ext>
+            </a:extLst>
+          </p:cNvPr>
+          <p:cNvSpPr>
+            <a:spLocks noGrp="1"/>
+          </p:cNvSpPr>
+          <p:nvPr>
+            <p:ph type="title"/>
+          </p:nvPr>
+        </p:nvSpPr>
+        <p:spPr/>
+        <p:txBody>
+          <a:bodyPr/>
+          <a:lstStyle/>
+          <a:p>
+            <a:r>
+              <a:rPr lang="en-US" dirty="0" err="1"/>
+              <a:t>ShapeDD</a:t>
+            </a:r>
+            <a:endParaRPr lang="en-US" dirty="0"/>
+          </a:p>
+        </p:txBody>
+      </p:sp>
+      <p:sp>
+        <p:nvSpPr>
+          <p:cNvPr id="3" name="Content Placeholder 2">
+            <a:extLst>
+              <a:ext uri="{FF2B5EF4-FFF2-40B4-BE49-F238E27FC236}">
+                <a16:creationId xmlns:a16="http://schemas.microsoft.com/office/drawing/2014/main" id="{D887D8D2-7474-F0F6-3039-A68F8289326C}"/>
+              </a:ext>
+            </a:extLst>
+          </p:cNvPr>
+          <p:cNvSpPr>
+            <a:spLocks noGrp="1"/>
+          </p:cNvSpPr>
+          <p:nvPr>
+            <p:ph idx="1"/>
+          </p:nvPr>
+        </p:nvSpPr>
+        <p:spPr>
+          <a:xfrm>
+            <a:off x="838200" y="1837127"/>
+            <a:ext cx="10515600" cy="4351338"/>
+          </a:xfrm>
+        </p:spPr>
+        <p:txBody>
+          <a:bodyPr>
+            <a:normAutofit/>
+          </a:bodyPr>
+          <a:lstStyle/>
+          <a:p>
+            <a:r>
+              <a:rPr lang="en-US" dirty="0">
+                <a:latin typeface="Arial (Body)"/>
+              </a:rPr>
+              <a:t>Calculating the </a:t>
+            </a:r>
+            <a:r>
+              <a:rPr lang="vi-VN" dirty="0">
+                <a:latin typeface="Arial (Body)"/>
+              </a:rPr>
+              <a:t>e</a:t>
+            </a:r>
+            <a:r>
+              <a:rPr lang="en-US" dirty="0" err="1"/>
+              <a:t>lement</a:t>
+            </a:r>
+            <a:r>
+              <a:rPr lang="en-US" dirty="0"/>
+              <a:t>-wise multiplication</a:t>
+            </a:r>
+            <a:r>
+              <a:rPr lang="vi-VN" dirty="0"/>
+              <a:t> between W and K</a:t>
+            </a:r>
+            <a:endParaRPr lang="vi-VN" dirty="0">
+              <a:latin typeface="Arial (Body)"/>
+            </a:endParaRPr>
+          </a:p>
+        </p:txBody>
+      </p:sp>
+      <p:pic>
+        <p:nvPicPr>
+          <p:cNvPr id="8" name="Picture 7">
+            <a:extLst>
+              <a:ext uri="{FF2B5EF4-FFF2-40B4-BE49-F238E27FC236}">
+                <a16:creationId xmlns:a16="http://schemas.microsoft.com/office/drawing/2014/main" id="{96064EC2-BB41-2D29-07A9-85089371C623}"/>
+              </a:ext>
+            </a:extLst>
+          </p:cNvPr>
+          <p:cNvPicPr>
+            <a:picLocks noChangeAspect="1"/>
+          </p:cNvPicPr>
+          <p:nvPr/>
+        </p:nvPicPr>
+        <p:blipFill>
+          <a:blip r:embed="rId3"/>
+          <a:stretch>
+            <a:fillRect/>
+          </a:stretch>
+        </p:blipFill>
+        <p:spPr>
+          <a:xfrm>
+            <a:off x="1564256" y="2421212"/>
+            <a:ext cx="9063487" cy="3183167"/>
+          </a:xfrm>
+          <a:prstGeom prst="rect">
+            <a:avLst/>
+          </a:prstGeom>
+        </p:spPr>
+      </p:pic>
+    </p:spTree>
+    <p:extLst>
+      <p:ext uri="{BB962C8B-B14F-4D97-AF65-F5344CB8AC3E}">
+        <p14:creationId xmlns:p14="http://schemas.microsoft.com/office/powerpoint/2010/main" val="3056561995"/>
+      </p:ext>
+    </p:extLst>
+  </p:cSld>
+  <p:clrMapOvr>
+    <a:masterClrMapping/>
+  </p:clrMapOvr>
+</p:sld>
+</file>
+
+<file path=ppt/slides/slide22.xml><?xml version="1.0" encoding="utf-8"?>
 <p:sld xmlns:a="http://schemas.openxmlformats.org/drawingml/2006/main" xmlns:r="http://schemas.openxmlformats.org/officeDocument/2006/relationships" xmlns:p="http://schemas.openxmlformats.org/presentationml/2006/main">
   <p:cSld>
     <p:spTree>

</xml_diff>

<commit_message>
[Update] Update script report and ppt
</commit_message>
<xml_diff>
--- a/report/Algorithm.pptx
+++ b/report/Algorithm.pptx
@@ -218,7 +218,7 @@
           <a:p>
             <a:fld id="{81B028E4-0D91-47C6-89A1-18BFD5B08F93}" type="datetimeFigureOut">
               <a:rPr lang="en-US" smtClean="0"/>
-              <a:t>5/12/2025</a:t>
+              <a:t>5/17/2025</a:t>
             </a:fld>
             <a:endParaRPr lang="en-US"/>
           </a:p>
@@ -1855,7 +1855,7 @@
           <a:p>
             <a:fld id="{729DB911-48E5-4251-B130-A1A5C205802B}" type="datetimeFigureOut">
               <a:rPr lang="en-US" smtClean="0"/>
-              <a:t>5/12/2025</a:t>
+              <a:t>5/17/2025</a:t>
             </a:fld>
             <a:endParaRPr lang="en-US"/>
           </a:p>
@@ -2053,7 +2053,7 @@
           <a:p>
             <a:fld id="{729DB911-48E5-4251-B130-A1A5C205802B}" type="datetimeFigureOut">
               <a:rPr lang="en-US" smtClean="0"/>
-              <a:t>5/12/2025</a:t>
+              <a:t>5/17/2025</a:t>
             </a:fld>
             <a:endParaRPr lang="en-US"/>
           </a:p>
@@ -2261,7 +2261,7 @@
           <a:p>
             <a:fld id="{729DB911-48E5-4251-B130-A1A5C205802B}" type="datetimeFigureOut">
               <a:rPr lang="en-US" smtClean="0"/>
-              <a:t>5/12/2025</a:t>
+              <a:t>5/17/2025</a:t>
             </a:fld>
             <a:endParaRPr lang="en-US"/>
           </a:p>
@@ -2459,7 +2459,7 @@
           <a:p>
             <a:fld id="{729DB911-48E5-4251-B130-A1A5C205802B}" type="datetimeFigureOut">
               <a:rPr lang="en-US" smtClean="0"/>
-              <a:t>5/12/2025</a:t>
+              <a:t>5/17/2025</a:t>
             </a:fld>
             <a:endParaRPr lang="en-US"/>
           </a:p>
@@ -2734,7 +2734,7 @@
           <a:p>
             <a:fld id="{729DB911-48E5-4251-B130-A1A5C205802B}" type="datetimeFigureOut">
               <a:rPr lang="en-US" smtClean="0"/>
-              <a:t>5/12/2025</a:t>
+              <a:t>5/17/2025</a:t>
             </a:fld>
             <a:endParaRPr lang="en-US"/>
           </a:p>
@@ -2999,7 +2999,7 @@
           <a:p>
             <a:fld id="{729DB911-48E5-4251-B130-A1A5C205802B}" type="datetimeFigureOut">
               <a:rPr lang="en-US" smtClean="0"/>
-              <a:t>5/12/2025</a:t>
+              <a:t>5/17/2025</a:t>
             </a:fld>
             <a:endParaRPr lang="en-US"/>
           </a:p>
@@ -3411,7 +3411,7 @@
           <a:p>
             <a:fld id="{729DB911-48E5-4251-B130-A1A5C205802B}" type="datetimeFigureOut">
               <a:rPr lang="en-US" smtClean="0"/>
-              <a:t>5/12/2025</a:t>
+              <a:t>5/17/2025</a:t>
             </a:fld>
             <a:endParaRPr lang="en-US"/>
           </a:p>
@@ -3552,7 +3552,7 @@
           <a:p>
             <a:fld id="{729DB911-48E5-4251-B130-A1A5C205802B}" type="datetimeFigureOut">
               <a:rPr lang="en-US" smtClean="0"/>
-              <a:t>5/12/2025</a:t>
+              <a:t>5/17/2025</a:t>
             </a:fld>
             <a:endParaRPr lang="en-US"/>
           </a:p>
@@ -3665,7 +3665,7 @@
           <a:p>
             <a:fld id="{729DB911-48E5-4251-B130-A1A5C205802B}" type="datetimeFigureOut">
               <a:rPr lang="en-US" smtClean="0"/>
-              <a:t>5/12/2025</a:t>
+              <a:t>5/17/2025</a:t>
             </a:fld>
             <a:endParaRPr lang="en-US"/>
           </a:p>
@@ -3976,7 +3976,7 @@
           <a:p>
             <a:fld id="{729DB911-48E5-4251-B130-A1A5C205802B}" type="datetimeFigureOut">
               <a:rPr lang="en-US" smtClean="0"/>
-              <a:t>5/12/2025</a:t>
+              <a:t>5/17/2025</a:t>
             </a:fld>
             <a:endParaRPr lang="en-US"/>
           </a:p>
@@ -4264,7 +4264,7 @@
           <a:p>
             <a:fld id="{729DB911-48E5-4251-B130-A1A5C205802B}" type="datetimeFigureOut">
               <a:rPr lang="en-US" smtClean="0"/>
-              <a:t>5/12/2025</a:t>
+              <a:t>5/17/2025</a:t>
             </a:fld>
             <a:endParaRPr lang="en-US"/>
           </a:p>
@@ -4505,7 +4505,7 @@
           <a:p>
             <a:fld id="{729DB911-48E5-4251-B130-A1A5C205802B}" type="datetimeFigureOut">
               <a:rPr lang="en-US" smtClean="0"/>
-              <a:t>5/12/2025</a:t>
+              <a:t>5/17/2025</a:t>
             </a:fld>
             <a:endParaRPr lang="en-US"/>
           </a:p>
@@ -5281,8 +5281,8 @@
           </a:p>
         </p:txBody>
       </p:sp>
-      <mc:AlternateContent xmlns:mc="http://schemas.openxmlformats.org/markup-compatibility/2006">
-        <mc:Choice xmlns:a14="http://schemas.microsoft.com/office/drawing/2010/main" Requires="a14">
+      <mc:AlternateContent xmlns:mc="http://schemas.openxmlformats.org/markup-compatibility/2006" xmlns:a14="http://schemas.microsoft.com/office/drawing/2010/main">
+        <mc:Choice Requires="a14">
           <p:sp>
             <p:nvSpPr>
               <p:cNvPr id="3" name="Content Placeholder 2">
@@ -5694,7 +5694,7 @@
             </p:txBody>
           </p:sp>
         </mc:Choice>
-        <mc:Fallback>
+        <mc:Fallback xmlns="">
           <p:sp>
             <p:nvSpPr>
               <p:cNvPr id="3" name="Content Placeholder 2">
@@ -12593,8 +12593,8 @@
           </a:p>
         </p:txBody>
       </p:sp>
-      <mc:AlternateContent xmlns:mc="http://schemas.openxmlformats.org/markup-compatibility/2006" xmlns:a14="http://schemas.microsoft.com/office/drawing/2010/main">
-        <mc:Choice Requires="a14">
+      <mc:AlternateContent xmlns:mc="http://schemas.openxmlformats.org/markup-compatibility/2006">
+        <mc:Choice xmlns:a14="http://schemas.microsoft.com/office/drawing/2010/main" Requires="a14">
           <p:sp>
             <p:nvSpPr>
               <p:cNvPr id="3" name="Content Placeholder 2">
@@ -12983,7 +12983,19 @@
                   <a:rPr lang="vi-VN" dirty="0">
                     <a:latin typeface="Arial (Body)"/>
                   </a:rPr>
-                  <a:t>Việc tìm sup⁡sup này rất khó trong thực tế, vì ta phải thử vô số hàm 𝑓f. Điều này gần như không khả thi về mặt tính toán.</a:t>
+                  <a:t>Việc tìm sup⁡sup này rất khó trong thực tế, vì ta phải thử vô số </a:t>
+                </a:r>
+                <a:r>
+                  <a:rPr lang="vi-VN">
+                    <a:latin typeface="Arial (Body)"/>
+                  </a:rPr>
+                  <a:t>hàm 𝑓. </a:t>
+                </a:r>
+                <a:r>
+                  <a:rPr lang="vi-VN" dirty="0">
+                    <a:latin typeface="Arial (Body)"/>
+                  </a:rPr>
+                  <a:t>Điều này gần như không khả thi về mặt tính toán.</a:t>
                 </a:r>
                 <a:endParaRPr lang="en-US" dirty="0">
                   <a:latin typeface="Arial (Body)"/>
@@ -12992,7 +13004,7 @@
             </p:txBody>
           </p:sp>
         </mc:Choice>
-        <mc:Fallback xmlns="">
+        <mc:Fallback>
           <p:sp>
             <p:nvSpPr>
               <p:cNvPr id="3" name="Content Placeholder 2">

</xml_diff>

<commit_message>
[Update] Update report, slides and some improvement in the notebook file
</commit_message>
<xml_diff>
--- a/report/Algorithm.pptx
+++ b/report/Algorithm.pptx
@@ -218,7 +218,7 @@
           <a:p>
             <a:fld id="{81B028E4-0D91-47C6-89A1-18BFD5B08F93}" type="datetimeFigureOut">
               <a:rPr lang="en-US" smtClean="0"/>
-              <a:t>5/17/2025</a:t>
+              <a:t>5/24/2025</a:t>
             </a:fld>
             <a:endParaRPr lang="en-US"/>
           </a:p>
@@ -1855,7 +1855,7 @@
           <a:p>
             <a:fld id="{729DB911-48E5-4251-B130-A1A5C205802B}" type="datetimeFigureOut">
               <a:rPr lang="en-US" smtClean="0"/>
-              <a:t>5/17/2025</a:t>
+              <a:t>5/24/2025</a:t>
             </a:fld>
             <a:endParaRPr lang="en-US"/>
           </a:p>
@@ -2053,7 +2053,7 @@
           <a:p>
             <a:fld id="{729DB911-48E5-4251-B130-A1A5C205802B}" type="datetimeFigureOut">
               <a:rPr lang="en-US" smtClean="0"/>
-              <a:t>5/17/2025</a:t>
+              <a:t>5/24/2025</a:t>
             </a:fld>
             <a:endParaRPr lang="en-US"/>
           </a:p>
@@ -2261,7 +2261,7 @@
           <a:p>
             <a:fld id="{729DB911-48E5-4251-B130-A1A5C205802B}" type="datetimeFigureOut">
               <a:rPr lang="en-US" smtClean="0"/>
-              <a:t>5/17/2025</a:t>
+              <a:t>5/24/2025</a:t>
             </a:fld>
             <a:endParaRPr lang="en-US"/>
           </a:p>
@@ -2459,7 +2459,7 @@
           <a:p>
             <a:fld id="{729DB911-48E5-4251-B130-A1A5C205802B}" type="datetimeFigureOut">
               <a:rPr lang="en-US" smtClean="0"/>
-              <a:t>5/17/2025</a:t>
+              <a:t>5/24/2025</a:t>
             </a:fld>
             <a:endParaRPr lang="en-US"/>
           </a:p>
@@ -2734,7 +2734,7 @@
           <a:p>
             <a:fld id="{729DB911-48E5-4251-B130-A1A5C205802B}" type="datetimeFigureOut">
               <a:rPr lang="en-US" smtClean="0"/>
-              <a:t>5/17/2025</a:t>
+              <a:t>5/24/2025</a:t>
             </a:fld>
             <a:endParaRPr lang="en-US"/>
           </a:p>
@@ -2999,7 +2999,7 @@
           <a:p>
             <a:fld id="{729DB911-48E5-4251-B130-A1A5C205802B}" type="datetimeFigureOut">
               <a:rPr lang="en-US" smtClean="0"/>
-              <a:t>5/17/2025</a:t>
+              <a:t>5/24/2025</a:t>
             </a:fld>
             <a:endParaRPr lang="en-US"/>
           </a:p>
@@ -3411,7 +3411,7 @@
           <a:p>
             <a:fld id="{729DB911-48E5-4251-B130-A1A5C205802B}" type="datetimeFigureOut">
               <a:rPr lang="en-US" smtClean="0"/>
-              <a:t>5/17/2025</a:t>
+              <a:t>5/24/2025</a:t>
             </a:fld>
             <a:endParaRPr lang="en-US"/>
           </a:p>
@@ -3552,7 +3552,7 @@
           <a:p>
             <a:fld id="{729DB911-48E5-4251-B130-A1A5C205802B}" type="datetimeFigureOut">
               <a:rPr lang="en-US" smtClean="0"/>
-              <a:t>5/17/2025</a:t>
+              <a:t>5/24/2025</a:t>
             </a:fld>
             <a:endParaRPr lang="en-US"/>
           </a:p>
@@ -3665,7 +3665,7 @@
           <a:p>
             <a:fld id="{729DB911-48E5-4251-B130-A1A5C205802B}" type="datetimeFigureOut">
               <a:rPr lang="en-US" smtClean="0"/>
-              <a:t>5/17/2025</a:t>
+              <a:t>5/24/2025</a:t>
             </a:fld>
             <a:endParaRPr lang="en-US"/>
           </a:p>
@@ -3976,7 +3976,7 @@
           <a:p>
             <a:fld id="{729DB911-48E5-4251-B130-A1A5C205802B}" type="datetimeFigureOut">
               <a:rPr lang="en-US" smtClean="0"/>
-              <a:t>5/17/2025</a:t>
+              <a:t>5/24/2025</a:t>
             </a:fld>
             <a:endParaRPr lang="en-US"/>
           </a:p>
@@ -4264,7 +4264,7 @@
           <a:p>
             <a:fld id="{729DB911-48E5-4251-B130-A1A5C205802B}" type="datetimeFigureOut">
               <a:rPr lang="en-US" smtClean="0"/>
-              <a:t>5/17/2025</a:t>
+              <a:t>5/24/2025</a:t>
             </a:fld>
             <a:endParaRPr lang="en-US"/>
           </a:p>
@@ -4505,7 +4505,7 @@
           <a:p>
             <a:fld id="{729DB911-48E5-4251-B130-A1A5C205802B}" type="datetimeFigureOut">
               <a:rPr lang="en-US" smtClean="0"/>
-              <a:t>5/17/2025</a:t>
+              <a:t>5/24/2025</a:t>
             </a:fld>
             <a:endParaRPr lang="en-US"/>
           </a:p>
@@ -4943,10 +4943,47 @@
           <a:bodyPr/>
           <a:lstStyle/>
           <a:p>
-            <a:r>
-              <a:rPr lang="en-US" dirty="0"/>
-              <a:t>Algorithm</a:t>
-            </a:r>
+            <a:pPr marL="172720" marR="0" indent="-90170" algn="ctr">
+              <a:lnSpc>
+                <a:spcPct val="127000"/>
+              </a:lnSpc>
+              <a:spcBef>
+                <a:spcPts val="1200"/>
+              </a:spcBef>
+              <a:spcAft>
+                <a:spcPts val="1060"/>
+              </a:spcAft>
+            </a:pPr>
+            <a:r>
+              <a:rPr lang="en-US" sz="1800" b="1" dirty="0">
+                <a:solidFill>
+                  <a:srgbClr val="000000"/>
+                </a:solidFill>
+                <a:effectLst/>
+                <a:latin typeface="Times New Roman" panose="02020603050405020304" pitchFamily="18" charset="0"/>
+                <a:ea typeface="Arial" panose="020B0604020202020204" pitchFamily="34" charset="0"/>
+              </a:rPr>
+              <a:t>PHÁT</a:t>
+            </a:r>
+            <a:r>
+              <a:rPr lang="vi-VN" sz="1800" b="1" dirty="0">
+                <a:solidFill>
+                  <a:srgbClr val="000000"/>
+                </a:solidFill>
+                <a:effectLst/>
+                <a:latin typeface="Times New Roman" panose="02020603050405020304" pitchFamily="18" charset="0"/>
+                <a:ea typeface="Arial" panose="020B0604020202020204" pitchFamily="34" charset="0"/>
+              </a:rPr>
+              <a:t> HIỆN CONCEPT DRIFT SỬ DỤNG SHAPE DRIFT DETECTOR TRONG GIAI ĐOẠN XỬ LÝ DỮ LIỆU</a:t>
+            </a:r>
+            <a:endParaRPr lang="en-US" sz="1800" dirty="0">
+              <a:solidFill>
+                <a:srgbClr val="000000"/>
+              </a:solidFill>
+              <a:effectLst/>
+              <a:latin typeface="Calibri" panose="020F0502020204030204" pitchFamily="34" charset="0"/>
+              <a:ea typeface="Calibri" panose="020F0502020204030204" pitchFamily="34" charset="0"/>
+            </a:endParaRPr>
           </a:p>
         </p:txBody>
       </p:sp>
@@ -4978,6 +5015,43 @@
           </a:p>
         </p:txBody>
       </p:sp>
+      <p:pic>
+        <p:nvPicPr>
+          <p:cNvPr id="4" name="Picture 3" descr="A blue and black logo&#10;&#10;Description automatically generated">
+            <a:extLst>
+              <a:ext uri="{FF2B5EF4-FFF2-40B4-BE49-F238E27FC236}">
+                <a16:creationId xmlns:a16="http://schemas.microsoft.com/office/drawing/2014/main" id="{B140174D-C828-6CCB-A2DC-8B45EBC029A4}"/>
+              </a:ext>
+            </a:extLst>
+          </p:cNvPr>
+          <p:cNvPicPr>
+            <a:picLocks noChangeAspect="1"/>
+          </p:cNvPicPr>
+          <p:nvPr/>
+        </p:nvPicPr>
+        <p:blipFill>
+          <a:blip r:embed="rId2" cstate="print">
+            <a:extLst>
+              <a:ext uri="{28A0092B-C50C-407E-A947-70E740481C1C}">
+                <a14:useLocalDpi xmlns:a14="http://schemas.microsoft.com/office/drawing/2010/main" val="0"/>
+              </a:ext>
+            </a:extLst>
+          </a:blip>
+          <a:srcRect/>
+          <a:stretch>
+            <a:fillRect/>
+          </a:stretch>
+        </p:blipFill>
+        <p:spPr>
+          <a:xfrm>
+            <a:off x="10840720" y="0"/>
+            <a:ext cx="1351280" cy="1287780"/>
+          </a:xfrm>
+          <a:prstGeom prst="rect">
+            <a:avLst/>
+          </a:prstGeom>
+        </p:spPr>
+      </p:pic>
     </p:spTree>
     <p:extLst>
       <p:ext uri="{BB962C8B-B14F-4D97-AF65-F5344CB8AC3E}">
@@ -10272,6 +10346,53 @@
           </a:p>
         </p:txBody>
       </p:sp>
+      <p:pic>
+        <p:nvPicPr>
+          <p:cNvPr id="1026" name="Picture 2" descr="Concept Drift Adaptation Methods under the Deep Learning Framework: A  Literature Review">
+            <a:extLst>
+              <a:ext uri="{FF2B5EF4-FFF2-40B4-BE49-F238E27FC236}">
+                <a16:creationId xmlns:a16="http://schemas.microsoft.com/office/drawing/2014/main" id="{0E9D07F9-D07D-976E-8613-2ED6D58CB9FE}"/>
+              </a:ext>
+            </a:extLst>
+          </p:cNvPr>
+          <p:cNvPicPr>
+            <a:picLocks noChangeAspect="1" noChangeArrowheads="1"/>
+          </p:cNvPicPr>
+          <p:nvPr/>
+        </p:nvPicPr>
+        <p:blipFill>
+          <a:blip r:embed="rId3">
+            <a:extLst>
+              <a:ext uri="{28A0092B-C50C-407E-A947-70E740481C1C}">
+                <a14:useLocalDpi xmlns:a14="http://schemas.microsoft.com/office/drawing/2010/main" val="0"/>
+              </a:ext>
+            </a:extLst>
+          </a:blip>
+          <a:srcRect/>
+          <a:stretch>
+            <a:fillRect/>
+          </a:stretch>
+        </p:blipFill>
+        <p:spPr bwMode="auto">
+          <a:xfrm>
+            <a:off x="0" y="161925"/>
+            <a:ext cx="12192000" cy="6534150"/>
+          </a:xfrm>
+          <a:prstGeom prst="rect">
+            <a:avLst/>
+          </a:prstGeom>
+          <a:noFill/>
+          <a:extLst>
+            <a:ext uri="{909E8E84-426E-40DD-AFC4-6F175D3DCCD1}">
+              <a14:hiddenFill xmlns:a14="http://schemas.microsoft.com/office/drawing/2010/main">
+                <a:solidFill>
+                  <a:srgbClr val="FFFFFF"/>
+                </a:solidFill>
+              </a14:hiddenFill>
+            </a:ext>
+          </a:extLst>
+        </p:spPr>
+      </p:pic>
     </p:spTree>
     <p:extLst>
       <p:ext uri="{BB962C8B-B14F-4D97-AF65-F5344CB8AC3E}">
@@ -10640,14 +10761,13 @@
         </p:nvPicPr>
         <p:blipFill>
           <a:blip r:embed="rId2"/>
-          <a:stretch>
-            <a:fillRect/>
-          </a:stretch>
+          <a:srcRect l="1719"/>
+          <a:stretch/>
         </p:blipFill>
         <p:spPr>
           <a:xfrm>
-            <a:off x="2933223" y="3088762"/>
-            <a:ext cx="6325553" cy="3404113"/>
+            <a:off x="3041964" y="3088762"/>
+            <a:ext cx="6216812" cy="3404113"/>
           </a:xfrm>
           <a:prstGeom prst="rect">
             <a:avLst/>
@@ -12593,8 +12713,8 @@
           </a:p>
         </p:txBody>
       </p:sp>
-      <mc:AlternateContent xmlns:mc="http://schemas.openxmlformats.org/markup-compatibility/2006">
-        <mc:Choice xmlns:a14="http://schemas.microsoft.com/office/drawing/2010/main" Requires="a14">
+      <mc:AlternateContent xmlns:mc="http://schemas.openxmlformats.org/markup-compatibility/2006" xmlns:a14="http://schemas.microsoft.com/office/drawing/2010/main">
+        <mc:Choice Requires="a14">
           <p:sp>
             <p:nvSpPr>
               <p:cNvPr id="3" name="Content Placeholder 2">
@@ -13004,7 +13124,7 @@
             </p:txBody>
           </p:sp>
         </mc:Choice>
-        <mc:Fallback>
+        <mc:Fallback xmlns="">
           <p:sp>
             <p:nvSpPr>
               <p:cNvPr id="3" name="Content Placeholder 2">

</xml_diff>